<commit_message>
Fixing screenshots and animations
</commit_message>
<xml_diff>
--- a/Courses/Software-Sciences/Module-3-Databases-New/13-MS-Access/11-MS-Access-Queries-Forms-Reports.pptx
+++ b/Courses/Software-Sciences/Module-3-Databases-New/13-MS-Access/11-MS-Access-Queries-Forms-Reports.pptx
@@ -319,7 +319,7 @@
           <a:p>
             <a:fld id="{4E087215-0C8F-4762-A664-737A353EC9A4}" type="datetimeFigureOut">
               <a:rPr lang="bg-BG" smtClean="0"/>
-              <a:t>26.11.2023 г.</a:t>
+              <a:t>30.11.2023 г.</a:t>
             </a:fld>
             <a:endParaRPr lang="bg-BG"/>
           </a:p>
@@ -515,7 +515,7 @@
           <a:p>
             <a:fld id="{72D84649-876A-46C9-8472-14CB09C070D8}" type="datetimeFigureOut">
               <a:rPr lang="en-US" smtClean="0"/>
-              <a:t>26-Nov-23</a:t>
+              <a:t>11/30/2023</a:t>
             </a:fld>
             <a:endParaRPr lang="en-US"/>
           </a:p>
@@ -8447,8 +8447,8 @@
         </p:blipFill>
         <p:spPr bwMode="auto">
           <a:xfrm>
-            <a:off x="10684725" y="1386225"/>
-            <a:ext cx="1068305" cy="1068305"/>
+            <a:off x="9561000" y="1177541"/>
+            <a:ext cx="1447149" cy="1447149"/>
           </a:xfrm>
           <a:prstGeom prst="rect">
             <a:avLst/>
@@ -8498,36 +8498,6 @@
           </a:p>
         </p:txBody>
       </p:sp>
-      <p:pic>
-        <p:nvPicPr>
-          <p:cNvPr id="22" name="Picture 21">
-            <a:extLst>
-              <a:ext uri="{FF2B5EF4-FFF2-40B4-BE49-F238E27FC236}">
-                <a16:creationId xmlns:a16="http://schemas.microsoft.com/office/drawing/2014/main" id="{923545EE-3227-2526-F1F5-FC8CC548C11A}"/>
-              </a:ext>
-            </a:extLst>
-          </p:cNvPr>
-          <p:cNvPicPr>
-            <a:picLocks noChangeAspect="1"/>
-          </p:cNvPicPr>
-          <p:nvPr/>
-        </p:nvPicPr>
-        <p:blipFill>
-          <a:blip r:embed="rId4"/>
-          <a:stretch>
-            <a:fillRect/>
-          </a:stretch>
-        </p:blipFill>
-        <p:spPr>
-          <a:xfrm>
-            <a:off x="9201000" y="1376824"/>
-            <a:ext cx="1162560" cy="1164826"/>
-          </a:xfrm>
-          <a:prstGeom prst="rect">
-            <a:avLst/>
-          </a:prstGeom>
-        </p:spPr>
-      </p:pic>
       <p:grpSp>
         <p:nvGrpSpPr>
           <p:cNvPr id="24" name="Group 23">
@@ -8639,7 +8609,7 @@
             <p:nvPr/>
           </p:nvPicPr>
           <p:blipFill>
-            <a:blip r:embed="rId5"/>
+            <a:blip r:embed="rId4"/>
             <a:stretch>
               <a:fillRect/>
             </a:stretch>
@@ -8669,7 +8639,7 @@
             <p:nvPr/>
           </p:nvPicPr>
           <p:blipFill>
-            <a:blip r:embed="rId6"/>
+            <a:blip r:embed="rId5"/>
             <a:stretch>
               <a:fillRect/>
             </a:stretch>
@@ -8706,7 +8676,7 @@
             <p:nvPr/>
           </p:nvPicPr>
           <p:blipFill>
-            <a:blip r:embed="rId7"/>
+            <a:blip r:embed="rId6"/>
             <a:stretch>
               <a:fillRect/>
             </a:stretch>
@@ -19846,21 +19816,21 @@
           <a:lstStyle/>
           <a:p>
             <a:r>
-              <a:rPr lang="bg-BG" dirty="0"/>
+              <a:rPr lang="bg-BG" sz="3200" dirty="0"/>
               <a:t>Изберете</a:t>
             </a:r>
             <a:r>
-              <a:rPr lang="en-US" dirty="0"/>
+              <a:rPr lang="en-US" sz="3200" dirty="0"/>
               <a:t> </a:t>
             </a:r>
             <a:r>
-              <a:rPr lang="en-US" dirty="0">
+              <a:rPr lang="en-US" sz="3200" dirty="0">
                 <a:latin typeface="Consolas" pitchFamily="49" charset="0"/>
               </a:rPr>
               <a:t>[</a:t>
             </a:r>
             <a:r>
-              <a:rPr lang="en-US" b="1" dirty="0">
+              <a:rPr lang="en-US" sz="3200" b="1" dirty="0">
                 <a:solidFill>
                   <a:schemeClr val="bg1"/>
                 </a:solidFill>
@@ -19869,23 +19839,23 @@
               <a:t>Create</a:t>
             </a:r>
             <a:r>
-              <a:rPr lang="en-US" dirty="0">
+              <a:rPr lang="en-US" sz="3200" dirty="0">
                 <a:latin typeface="Consolas" pitchFamily="49" charset="0"/>
               </a:rPr>
               <a:t>]</a:t>
             </a:r>
             <a:r>
-              <a:rPr lang="en-US" dirty="0"/>
+              <a:rPr lang="en-US" sz="3200" dirty="0"/>
               <a:t> &gt; </a:t>
             </a:r>
             <a:r>
-              <a:rPr lang="en-US" dirty="0">
+              <a:rPr lang="en-US" sz="3200" dirty="0">
                 <a:latin typeface="Consolas" pitchFamily="49" charset="0"/>
               </a:rPr>
               <a:t>[</a:t>
             </a:r>
             <a:r>
-              <a:rPr lang="en-US" b="1" dirty="0">
+              <a:rPr lang="en-US" sz="3200" b="1" dirty="0">
                 <a:solidFill>
                   <a:schemeClr val="bg1"/>
                 </a:solidFill>
@@ -19894,7 +19864,7 @@
               <a:t>Query</a:t>
             </a:r>
             <a:r>
-              <a:rPr lang="en-US" b="1" dirty="0">
+              <a:rPr lang="en-US" sz="3200" b="1" dirty="0">
                 <a:solidFill>
                   <a:schemeClr val="bg1"/>
                 </a:solidFill>
@@ -19902,7 +19872,7 @@
               <a:t> </a:t>
             </a:r>
             <a:r>
-              <a:rPr lang="en-US" b="1" dirty="0">
+              <a:rPr lang="en-US" sz="3200" b="1" dirty="0">
                 <a:solidFill>
                   <a:schemeClr val="bg1"/>
                 </a:solidFill>
@@ -19911,29 +19881,35 @@
               <a:t>Wizard</a:t>
             </a:r>
             <a:r>
-              <a:rPr lang="en-US" dirty="0">
+              <a:rPr lang="en-US" sz="3200" dirty="0">
                 <a:latin typeface="Consolas" pitchFamily="49" charset="0"/>
               </a:rPr>
               <a:t>]</a:t>
             </a:r>
           </a:p>
           <a:p>
-            <a:r>
-              <a:rPr lang="bg-BG" dirty="0"/>
+            <a:endParaRPr lang="en-US" sz="3200" dirty="0"/>
+          </a:p>
+          <a:p>
+            <a:endParaRPr lang="en-US" sz="3200" dirty="0"/>
+          </a:p>
+          <a:p>
+            <a:r>
+              <a:rPr lang="bg-BG" sz="3200" dirty="0"/>
               <a:t>Изберете</a:t>
             </a:r>
             <a:r>
-              <a:rPr lang="en-US" dirty="0"/>
+              <a:rPr lang="en-US" sz="3200" dirty="0"/>
               <a:t> </a:t>
             </a:r>
             <a:r>
-              <a:rPr lang="en-US" dirty="0">
+              <a:rPr lang="en-US" sz="3200" dirty="0">
                 <a:latin typeface="Consolas" pitchFamily="49" charset="0"/>
               </a:rPr>
               <a:t>[</a:t>
             </a:r>
             <a:r>
-              <a:rPr lang="en-US" b="1" dirty="0">
+              <a:rPr lang="en-US" sz="3200" b="1" dirty="0">
                 <a:solidFill>
                   <a:schemeClr val="bg1"/>
                 </a:solidFill>
@@ -19942,11 +19918,11 @@
               <a:t>Simple</a:t>
             </a:r>
             <a:r>
-              <a:rPr lang="en-US" dirty="0"/>
+              <a:rPr lang="en-US" sz="3200" dirty="0"/>
               <a:t> </a:t>
             </a:r>
             <a:r>
-              <a:rPr lang="en-US" b="1" dirty="0">
+              <a:rPr lang="en-US" sz="3200" b="1" dirty="0">
                 <a:solidFill>
                   <a:schemeClr val="bg1"/>
                 </a:solidFill>
@@ -19955,31 +19931,31 @@
               <a:t>Query</a:t>
             </a:r>
             <a:r>
-              <a:rPr lang="en-US" dirty="0">
+              <a:rPr lang="en-US" sz="3200" dirty="0">
                 <a:latin typeface="Consolas" pitchFamily="49" charset="0"/>
               </a:rPr>
               <a:t>]</a:t>
             </a:r>
             <a:r>
-              <a:rPr lang="en-US" dirty="0"/>
+              <a:rPr lang="en-US" sz="3200" dirty="0"/>
               <a:t> </a:t>
             </a:r>
             <a:r>
-              <a:rPr lang="bg-BG" dirty="0"/>
+              <a:rPr lang="bg-BG" sz="3200" dirty="0"/>
               <a:t>и натиснете</a:t>
             </a:r>
             <a:r>
-              <a:rPr lang="en-US" dirty="0"/>
+              <a:rPr lang="en-US" sz="3200" dirty="0"/>
               <a:t> </a:t>
             </a:r>
             <a:r>
-              <a:rPr lang="en-US" dirty="0">
+              <a:rPr lang="en-US" sz="3200" dirty="0">
                 <a:latin typeface="Consolas" pitchFamily="49" charset="0"/>
               </a:rPr>
               <a:t>[</a:t>
             </a:r>
             <a:r>
-              <a:rPr lang="en-US" b="1" dirty="0">
+              <a:rPr lang="en-US" sz="3200" b="1" dirty="0">
                 <a:solidFill>
                   <a:schemeClr val="bg1"/>
                 </a:solidFill>
@@ -19988,33 +19964,27 @@
               <a:t>OK</a:t>
             </a:r>
             <a:r>
-              <a:rPr lang="en-US" dirty="0">
+              <a:rPr lang="en-US" sz="3200" dirty="0">
                 <a:latin typeface="Consolas" pitchFamily="49" charset="0"/>
               </a:rPr>
               <a:t>]</a:t>
             </a:r>
-            <a:endParaRPr lang="bg-BG" dirty="0"/>
-          </a:p>
-          <a:p>
-            <a:endParaRPr lang="en-US" dirty="0"/>
-          </a:p>
-          <a:p>
-            <a:endParaRPr lang="en-US" dirty="0"/>
-          </a:p>
-          <a:p>
-            <a:r>
-              <a:rPr lang="ru-RU" dirty="0"/>
+            <a:endParaRPr lang="en-US" sz="3200" dirty="0"/>
+          </a:p>
+          <a:p>
+            <a:r>
+              <a:rPr lang="ru-RU" sz="3200" dirty="0"/>
               <a:t>Изберете таблицата, която съдържа полето</a:t>
             </a:r>
           </a:p>
           <a:p>
             <a:pPr lvl="1"/>
             <a:r>
-              <a:rPr lang="ru-RU" dirty="0"/>
+              <a:rPr lang="ru-RU" sz="2800" dirty="0"/>
               <a:t>Добавете наличните полета (</a:t>
             </a:r>
             <a:r>
-              <a:rPr lang="en-US" b="1" dirty="0">
+              <a:rPr lang="en-US" sz="2800" b="1" dirty="0">
                 <a:solidFill>
                   <a:schemeClr val="bg1"/>
                 </a:solidFill>
@@ -20023,34 +19993,34 @@
               <a:t>Available Fields</a:t>
             </a:r>
             <a:r>
-              <a:rPr lang="bg-BG" dirty="0"/>
+              <a:rPr lang="bg-BG" sz="2800" dirty="0"/>
               <a:t>)</a:t>
             </a:r>
             <a:r>
-              <a:rPr lang="ru-RU" dirty="0"/>
+              <a:rPr lang="ru-RU" sz="2800" dirty="0"/>
               <a:t>,</a:t>
             </a:r>
             <a:br>
-              <a:rPr lang="en-US" dirty="0"/>
+              <a:rPr lang="en-US" sz="2800" dirty="0"/>
             </a:br>
             <a:r>
-              <a:rPr lang="ru-RU" dirty="0" err="1"/>
+              <a:rPr lang="ru-RU" sz="2800" dirty="0" err="1"/>
               <a:t>които</a:t>
             </a:r>
             <a:r>
-              <a:rPr lang="ru-RU" dirty="0"/>
+              <a:rPr lang="ru-RU" sz="2800" dirty="0"/>
               <a:t> искате към избрани полета</a:t>
             </a:r>
             <a:r>
-              <a:rPr lang="en-US" dirty="0"/>
+              <a:rPr lang="en-US" sz="2800" dirty="0"/>
               <a:t> </a:t>
             </a:r>
             <a:r>
-              <a:rPr lang="ru-RU" dirty="0"/>
+              <a:rPr lang="ru-RU" sz="2800" dirty="0"/>
               <a:t>(</a:t>
             </a:r>
             <a:r>
-              <a:rPr lang="en-US" b="1" dirty="0">
+              <a:rPr lang="en-US" sz="2800" b="1" dirty="0">
                 <a:solidFill>
                   <a:schemeClr val="bg1"/>
                 </a:solidFill>
@@ -20059,25 +20029,25 @@
               <a:t>Selected Fields</a:t>
             </a:r>
             <a:r>
-              <a:rPr lang="bg-BG" dirty="0"/>
+              <a:rPr lang="bg-BG" sz="2800" dirty="0"/>
               <a:t>)</a:t>
             </a:r>
-            <a:endParaRPr lang="en-US" dirty="0"/>
+            <a:endParaRPr lang="en-US" sz="2800" dirty="0"/>
           </a:p>
           <a:p>
             <a:pPr lvl="1"/>
             <a:r>
-              <a:rPr lang="ru-RU" dirty="0"/>
+              <a:rPr lang="ru-RU" sz="2800" dirty="0"/>
               <a:t>Изберете </a:t>
             </a:r>
             <a:r>
-              <a:rPr lang="en-US" dirty="0">
+              <a:rPr lang="en-US" sz="2800" dirty="0">
                 <a:latin typeface="Consolas" pitchFamily="49" charset="0"/>
               </a:rPr>
               <a:t>[</a:t>
             </a:r>
             <a:r>
-              <a:rPr lang="en-US" b="1" dirty="0">
+              <a:rPr lang="en-US" sz="2800" b="1" dirty="0">
                 <a:solidFill>
                   <a:schemeClr val="bg1"/>
                 </a:solidFill>
@@ -20086,12 +20056,12 @@
               <a:t>Next</a:t>
             </a:r>
             <a:r>
-              <a:rPr lang="en-US" dirty="0">
+              <a:rPr lang="en-US" sz="2800" dirty="0">
                 <a:latin typeface="Consolas" pitchFamily="49" charset="0"/>
               </a:rPr>
               <a:t>]</a:t>
             </a:r>
-            <a:endParaRPr lang="en-US" dirty="0"/>
+            <a:endParaRPr lang="en-US" sz="2800" dirty="0"/>
           </a:p>
         </p:txBody>
       </p:sp>
@@ -20146,7 +20116,7 @@
         </p:blipFill>
         <p:spPr bwMode="auto">
           <a:xfrm>
-            <a:off x="10567218" y="3892819"/>
+            <a:off x="10146000" y="5184000"/>
             <a:ext cx="1206600" cy="1206600"/>
           </a:xfrm>
           <a:prstGeom prst="rect">
@@ -20219,12 +20189,19 @@
         </p:blipFill>
         <p:spPr>
           <a:xfrm>
-            <a:off x="741000" y="2624137"/>
-            <a:ext cx="4276725" cy="1609725"/>
+            <a:off x="2316000" y="1809000"/>
+            <a:ext cx="3645000" cy="1371949"/>
           </a:xfrm>
           <a:prstGeom prst="rect">
             <a:avLst/>
           </a:prstGeom>
+          <a:ln>
+            <a:solidFill>
+              <a:schemeClr val="bg2">
+                <a:lumMod val="75000"/>
+              </a:schemeClr>
+            </a:solidFill>
+          </a:ln>
         </p:spPr>
       </p:pic>
       <p:pic>
@@ -20249,8 +20226,8 @@
         </p:blipFill>
         <p:spPr>
           <a:xfrm>
-            <a:off x="8622332" y="1449000"/>
-            <a:ext cx="3312767" cy="2190944"/>
+            <a:off x="8531495" y="2281500"/>
+            <a:ext cx="3470103" cy="2295000"/>
           </a:xfrm>
           <a:prstGeom prst="rect">
             <a:avLst/>
@@ -20311,9 +20288,36 @@
                                         <p:tgtEl>
                                           <p:spTgt spid="3">
                                             <p:txEl>
-                                              <p:pRg st="1" end="1"/>
+                                              <p:pRg st="3" end="3"/>
                                             </p:txEl>
                                           </p:spTgt>
+                                        </p:tgtEl>
+                                        <p:attrNameLst>
+                                          <p:attrName>style.visibility</p:attrName>
+                                        </p:attrNameLst>
+                                      </p:cBhvr>
+                                      <p:to>
+                                        <p:strVal val="visible"/>
+                                      </p:to>
+                                    </p:set>
+                                  </p:childTnLst>
+                                </p:cTn>
+                              </p:par>
+                              <p:par>
+                                <p:cTn id="7" presetID="1" presetClass="entr" presetSubtype="0" fill="hold" nodeType="withEffect">
+                                  <p:stCondLst>
+                                    <p:cond delay="0"/>
+                                  </p:stCondLst>
+                                  <p:childTnLst>
+                                    <p:set>
+                                      <p:cBhvr>
+                                        <p:cTn id="8" dur="1" fill="hold">
+                                          <p:stCondLst>
+                                            <p:cond delay="0"/>
+                                          </p:stCondLst>
+                                        </p:cTn>
+                                        <p:tgtEl>
+                                          <p:spTgt spid="8"/>
                                         </p:tgtEl>
                                         <p:attrNameLst>
                                           <p:attrName>style.visibility</p:attrName>
@@ -20333,26 +20337,26 @@
                     </p:cTn>
                   </p:par>
                   <p:par>
-                    <p:cTn id="7" fill="hold">
+                    <p:cTn id="9" fill="hold">
                       <p:stCondLst>
                         <p:cond delay="indefinite"/>
                       </p:stCondLst>
                       <p:childTnLst>
                         <p:par>
-                          <p:cTn id="8" fill="hold">
+                          <p:cTn id="10" fill="hold">
                             <p:stCondLst>
                               <p:cond delay="0"/>
                             </p:stCondLst>
                             <p:childTnLst>
                               <p:par>
-                                <p:cTn id="9" presetID="1" presetClass="entr" presetSubtype="0" fill="hold" nodeType="clickEffect">
+                                <p:cTn id="11" presetID="1" presetClass="entr" presetSubtype="0" fill="hold" nodeType="clickEffect">
                                   <p:stCondLst>
                                     <p:cond delay="0"/>
                                   </p:stCondLst>
                                   <p:childTnLst>
                                     <p:set>
                                       <p:cBhvr>
-                                        <p:cTn id="10" dur="1" fill="hold">
+                                        <p:cTn id="12" dur="1" fill="hold">
                                           <p:stCondLst>
                                             <p:cond delay="0"/>
                                           </p:stCondLst>
@@ -20376,14 +20380,14 @@
                                 </p:cTn>
                               </p:par>
                               <p:par>
-                                <p:cTn id="11" presetID="1" presetClass="entr" presetSubtype="0" fill="hold" nodeType="withEffect">
+                                <p:cTn id="13" presetID="1" presetClass="entr" presetSubtype="0" fill="hold" nodeType="withEffect">
                                   <p:stCondLst>
                                     <p:cond delay="0"/>
                                   </p:stCondLst>
                                   <p:childTnLst>
                                     <p:set>
                                       <p:cBhvr>
-                                        <p:cTn id="12" dur="1" fill="hold">
+                                        <p:cTn id="14" dur="1" fill="hold">
                                           <p:stCondLst>
                                             <p:cond delay="0"/>
                                           </p:stCondLst>
@@ -20413,26 +20417,26 @@
                     </p:cTn>
                   </p:par>
                   <p:par>
-                    <p:cTn id="13" fill="hold">
+                    <p:cTn id="15" fill="hold">
                       <p:stCondLst>
                         <p:cond delay="indefinite"/>
                       </p:stCondLst>
                       <p:childTnLst>
                         <p:par>
-                          <p:cTn id="14" fill="hold">
+                          <p:cTn id="16" fill="hold">
                             <p:stCondLst>
                               <p:cond delay="0"/>
                             </p:stCondLst>
                             <p:childTnLst>
                               <p:par>
-                                <p:cTn id="15" presetID="1" presetClass="entr" presetSubtype="0" fill="hold" nodeType="clickEffect">
+                                <p:cTn id="17" presetID="1" presetClass="entr" presetSubtype="0" fill="hold" nodeType="clickEffect">
                                   <p:stCondLst>
                                     <p:cond delay="0"/>
                                   </p:stCondLst>
                                   <p:childTnLst>
                                     <p:set>
                                       <p:cBhvr>
-                                        <p:cTn id="16" dur="1" fill="hold">
+                                        <p:cTn id="18" dur="1" fill="hold">
                                           <p:stCondLst>
                                             <p:cond delay="0"/>
                                           </p:stCondLst>

</xml_diff>

<commit_message>
Fixes and updates on slides for MS Access
</commit_message>
<xml_diff>
--- a/Courses/Software-Sciences/Module-3-Databases-New/13-MS-Access/11-MS-Access-Queries-Forms-Reports.pptx
+++ b/Courses/Software-Sciences/Module-3-Databases-New/13-MS-Access/11-MS-Access-Queries-Forms-Reports.pptx
@@ -5,10 +5,10 @@
     <p:sldMasterId id="2147483675" r:id="rId1"/>
   </p:sldMasterIdLst>
   <p:notesMasterIdLst>
-    <p:notesMasterId r:id="rId33"/>
+    <p:notesMasterId r:id="rId34"/>
   </p:notesMasterIdLst>
   <p:handoutMasterIdLst>
-    <p:handoutMasterId r:id="rId34"/>
+    <p:handoutMasterId r:id="rId35"/>
   </p:handoutMasterIdLst>
   <p:sldIdLst>
     <p:sldId id="503" r:id="rId2"/>
@@ -21,27 +21,28 @@
     <p:sldId id="565" r:id="rId9"/>
     <p:sldId id="566" r:id="rId10"/>
     <p:sldId id="586" r:id="rId11"/>
-    <p:sldId id="588" r:id="rId12"/>
-    <p:sldId id="555" r:id="rId13"/>
-    <p:sldId id="557" r:id="rId14"/>
-    <p:sldId id="587" r:id="rId15"/>
-    <p:sldId id="559" r:id="rId16"/>
-    <p:sldId id="560" r:id="rId17"/>
-    <p:sldId id="542" r:id="rId18"/>
-    <p:sldId id="543" r:id="rId19"/>
-    <p:sldId id="544" r:id="rId20"/>
-    <p:sldId id="545" r:id="rId21"/>
-    <p:sldId id="546" r:id="rId22"/>
-    <p:sldId id="548" r:id="rId23"/>
-    <p:sldId id="549" r:id="rId24"/>
-    <p:sldId id="550" r:id="rId25"/>
-    <p:sldId id="551" r:id="rId26"/>
-    <p:sldId id="552" r:id="rId27"/>
-    <p:sldId id="553" r:id="rId28"/>
-    <p:sldId id="554" r:id="rId29"/>
-    <p:sldId id="349" r:id="rId30"/>
-    <p:sldId id="504" r:id="rId31"/>
-    <p:sldId id="505" r:id="rId32"/>
+    <p:sldId id="594" r:id="rId12"/>
+    <p:sldId id="588" r:id="rId13"/>
+    <p:sldId id="555" r:id="rId14"/>
+    <p:sldId id="557" r:id="rId15"/>
+    <p:sldId id="587" r:id="rId16"/>
+    <p:sldId id="559" r:id="rId17"/>
+    <p:sldId id="560" r:id="rId18"/>
+    <p:sldId id="542" r:id="rId19"/>
+    <p:sldId id="543" r:id="rId20"/>
+    <p:sldId id="544" r:id="rId21"/>
+    <p:sldId id="545" r:id="rId22"/>
+    <p:sldId id="546" r:id="rId23"/>
+    <p:sldId id="548" r:id="rId24"/>
+    <p:sldId id="549" r:id="rId25"/>
+    <p:sldId id="550" r:id="rId26"/>
+    <p:sldId id="551" r:id="rId27"/>
+    <p:sldId id="552" r:id="rId28"/>
+    <p:sldId id="553" r:id="rId29"/>
+    <p:sldId id="554" r:id="rId30"/>
+    <p:sldId id="349" r:id="rId31"/>
+    <p:sldId id="504" r:id="rId32"/>
+    <p:sldId id="505" r:id="rId33"/>
   </p:sldIdLst>
   <p:sldSz cx="12192000" cy="6858000"/>
   <p:notesSz cx="6858000" cy="9144000"/>
@@ -163,6 +164,7 @@
             <p14:sldId id="565"/>
             <p14:sldId id="566"/>
             <p14:sldId id="586"/>
+            <p14:sldId id="594"/>
             <p14:sldId id="588"/>
           </p14:sldIdLst>
         </p14:section>
@@ -319,7 +321,7 @@
           <a:p>
             <a:fld id="{4E087215-0C8F-4762-A664-737A353EC9A4}" type="datetimeFigureOut">
               <a:rPr lang="bg-BG" smtClean="0"/>
-              <a:t>30.11.2023 г.</a:t>
+              <a:t>9.12.2023 г.</a:t>
             </a:fld>
             <a:endParaRPr lang="bg-BG"/>
           </a:p>
@@ -515,7 +517,7 @@
           <a:p>
             <a:fld id="{72D84649-876A-46C9-8472-14CB09C070D8}" type="datetimeFigureOut">
               <a:rPr lang="en-US" smtClean="0"/>
-              <a:t>11/30/2023</a:t>
+              <a:t>12/9/2023</a:t>
             </a:fld>
             <a:endParaRPr lang="en-US"/>
           </a:p>
@@ -1285,7 +1287,7 @@
             <a:fld id="{2BF067CD-8E6B-4360-9AA8-C5DF2A48A6D1}" type="slidenum">
               <a:rPr lang="en-US" smtClean="0"/>
               <a:pPr/>
-              <a:t>13</a:t>
+              <a:t>14</a:t>
             </a:fld>
             <a:endParaRPr lang="en-US" dirty="0"/>
           </a:p>
@@ -1427,7 +1429,7 @@
             <a:fld id="{2BF067CD-8E6B-4360-9AA8-C5DF2A48A6D1}" type="slidenum">
               <a:rPr lang="en-US" smtClean="0"/>
               <a:pPr/>
-              <a:t>14</a:t>
+              <a:t>15</a:t>
             </a:fld>
             <a:endParaRPr lang="en-US" dirty="0"/>
           </a:p>
@@ -1569,7 +1571,7 @@
             <a:fld id="{2BF067CD-8E6B-4360-9AA8-C5DF2A48A6D1}" type="slidenum">
               <a:rPr lang="en-US" smtClean="0"/>
               <a:pPr/>
-              <a:t>15</a:t>
+              <a:t>16</a:t>
             </a:fld>
             <a:endParaRPr lang="en-US" dirty="0"/>
           </a:p>
@@ -1711,7 +1713,7 @@
             <a:fld id="{2BF067CD-8E6B-4360-9AA8-C5DF2A48A6D1}" type="slidenum">
               <a:rPr lang="en-US" smtClean="0"/>
               <a:pPr/>
-              <a:t>23</a:t>
+              <a:t>24</a:t>
             </a:fld>
             <a:endParaRPr lang="en-US" dirty="0"/>
           </a:p>
@@ -1957,7 +1959,7 @@
             <a:fld id="{3EBA5BD7-F043-4D1B-AA17-CD412FC534DE}" type="slidenum">
               <a:rPr lang="en-US" smtClean="0"/>
               <a:pPr/>
-              <a:t>29</a:t>
+              <a:t>30</a:t>
             </a:fld>
             <a:endParaRPr lang="en-US" dirty="0"/>
           </a:p>
@@ -2203,7 +2205,7 @@
             <a:fld id="{3EBA5BD7-F043-4D1B-AA17-CD412FC534DE}" type="slidenum">
               <a:rPr lang="en-US" smtClean="0"/>
               <a:pPr/>
-              <a:t>30</a:t>
+              <a:t>31</a:t>
             </a:fld>
             <a:endParaRPr lang="en-US" dirty="0"/>
           </a:p>
@@ -2449,7 +2451,7 @@
             <a:fld id="{3EBA5BD7-F043-4D1B-AA17-CD412FC534DE}" type="slidenum">
               <a:rPr lang="en-US" smtClean="0"/>
               <a:pPr/>
-              <a:t>31</a:t>
+              <a:t>32</a:t>
             </a:fld>
             <a:endParaRPr lang="en-US" dirty="0"/>
           </a:p>
@@ -7884,7 +7886,65 @@
           <a:bodyPr/>
           <a:lstStyle/>
           <a:p>
-            <a:endParaRPr lang="en-US"/>
+            <a:r>
+              <a:rPr lang="bg-BG" dirty="0"/>
+              <a:t>Избираме </a:t>
+            </a:r>
+            <a:r>
+              <a:rPr lang="en-US" dirty="0"/>
+              <a:t>[</a:t>
+            </a:r>
+            <a:r>
+              <a:rPr lang="en-US" b="1" dirty="0">
+                <a:latin typeface="Consolas" panose="020B0609020204030204" pitchFamily="49" charset="0"/>
+              </a:rPr>
+              <a:t>Detail</a:t>
+            </a:r>
+            <a:r>
+              <a:rPr lang="en-US" dirty="0"/>
+              <a:t>] </a:t>
+            </a:r>
+            <a:r>
+              <a:rPr lang="bg-BG" dirty="0"/>
+              <a:t>и натискаме </a:t>
+            </a:r>
+            <a:r>
+              <a:rPr lang="en-US" dirty="0"/>
+              <a:t>[</a:t>
+            </a:r>
+            <a:r>
+              <a:rPr lang="en-US" b="1" dirty="0">
+                <a:latin typeface="Consolas" panose="020B0609020204030204" pitchFamily="49" charset="0"/>
+              </a:rPr>
+              <a:t>Next &gt;</a:t>
+            </a:r>
+            <a:r>
+              <a:rPr lang="en-US" dirty="0"/>
+              <a:t>]</a:t>
+            </a:r>
+          </a:p>
+          <a:p>
+            <a:r>
+              <a:rPr lang="bg-BG" dirty="0"/>
+              <a:t>Натискаме </a:t>
+            </a:r>
+            <a:r>
+              <a:rPr lang="en-US" dirty="0"/>
+              <a:t>[</a:t>
+            </a:r>
+            <a:r>
+              <a:rPr lang="en-US" b="1" dirty="0">
+                <a:latin typeface="Consolas" panose="020B0609020204030204" pitchFamily="49" charset="0"/>
+              </a:rPr>
+              <a:t>Finish</a:t>
+            </a:r>
+            <a:r>
+              <a:rPr lang="en-US" dirty="0"/>
+              <a:t>]</a:t>
+            </a:r>
+          </a:p>
+          <a:p>
+            <a:endParaRPr lang="en-US" dirty="0"/>
           </a:p>
         </p:txBody>
       </p:sp>
@@ -7923,13 +7983,209 @@
             </a:r>
             <a:r>
               <a:rPr lang="en-US" dirty="0"/>
-              <a:t> </a:t>
-            </a:r>
-            <a:r>
-              <a:rPr lang="bg-BG" dirty="0"/>
-              <a:t>– резултат</a:t>
-            </a:r>
-            <a:endParaRPr lang="en-US" dirty="0"/>
+              <a:t> (3)</a:t>
+            </a:r>
+          </a:p>
+        </p:txBody>
+      </p:sp>
+      <p:pic>
+        <p:nvPicPr>
+          <p:cNvPr id="6" name="Picture 5">
+            <a:extLst>
+              <a:ext uri="{FF2B5EF4-FFF2-40B4-BE49-F238E27FC236}">
+                <a16:creationId xmlns:a16="http://schemas.microsoft.com/office/drawing/2014/main" id="{EDF1CFF7-15F1-88FB-222B-D7F38B941F59}"/>
+              </a:ext>
+            </a:extLst>
+          </p:cNvPr>
+          <p:cNvPicPr>
+            <a:picLocks noChangeAspect="1"/>
+          </p:cNvPicPr>
+          <p:nvPr/>
+        </p:nvPicPr>
+        <p:blipFill>
+          <a:blip r:embed="rId2"/>
+          <a:stretch>
+            <a:fillRect/>
+          </a:stretch>
+        </p:blipFill>
+        <p:spPr>
+          <a:xfrm>
+            <a:off x="651001" y="2619627"/>
+            <a:ext cx="4995692" cy="3914373"/>
+          </a:xfrm>
+          <a:prstGeom prst="rect">
+            <a:avLst/>
+          </a:prstGeom>
+          <a:ln>
+            <a:solidFill>
+              <a:schemeClr val="bg2">
+                <a:lumMod val="75000"/>
+              </a:schemeClr>
+            </a:solidFill>
+          </a:ln>
+        </p:spPr>
+      </p:pic>
+      <p:sp>
+        <p:nvSpPr>
+          <p:cNvPr id="7" name="Rectangle: Rounded Corners 17">
+            <a:extLst>
+              <a:ext uri="{FF2B5EF4-FFF2-40B4-BE49-F238E27FC236}">
+                <a16:creationId xmlns:a16="http://schemas.microsoft.com/office/drawing/2014/main" id="{DD5B1285-89A4-5B74-44AE-09D6AD758B9C}"/>
+              </a:ext>
+            </a:extLst>
+          </p:cNvPr>
+          <p:cNvSpPr/>
+          <p:nvPr/>
+        </p:nvSpPr>
+        <p:spPr>
+          <a:xfrm>
+            <a:off x="2406000" y="3284691"/>
+            <a:ext cx="3150000" cy="270000"/>
+          </a:xfrm>
+          <a:prstGeom prst="roundRect">
+            <a:avLst>
+              <a:gd name="adj" fmla="val 5385"/>
+            </a:avLst>
+          </a:prstGeom>
+          <a:noFill/>
+          <a:ln w="57150">
+            <a:solidFill>
+              <a:schemeClr val="tx1"/>
+            </a:solidFill>
+            <a:prstDash val="solid"/>
+          </a:ln>
+        </p:spPr>
+        <p:style>
+          <a:lnRef idx="2">
+            <a:schemeClr val="accent1">
+              <a:shade val="50000"/>
+            </a:schemeClr>
+          </a:lnRef>
+          <a:fillRef idx="1">
+            <a:schemeClr val="accent1"/>
+          </a:fillRef>
+          <a:effectRef idx="0">
+            <a:schemeClr val="accent1"/>
+          </a:effectRef>
+          <a:fontRef idx="minor">
+            <a:schemeClr val="lt1"/>
+          </a:fontRef>
+        </p:style>
+        <p:txBody>
+          <a:bodyPr rtlCol="0" anchor="t"/>
+          <a:lstStyle/>
+          <a:p>
+            <a:pPr algn="ctr"/>
+            <a:endParaRPr lang="en-US" sz="2799" b="1" dirty="0">
+              <a:solidFill>
+                <a:srgbClr val="FBEEDC"/>
+              </a:solidFill>
+              <a:effectLst>
+                <a:outerShdw blurRad="38100" dist="38100" dir="2700000" algn="tl">
+                  <a:srgbClr val="000000">
+                    <a:alpha val="43137"/>
+                  </a:srgbClr>
+                </a:outerShdw>
+              </a:effectLst>
+              <a:latin typeface="Consolas" panose="020B0609020204030204" pitchFamily="49" charset="0"/>
+            </a:endParaRPr>
+          </a:p>
+        </p:txBody>
+      </p:sp>
+      <p:pic>
+        <p:nvPicPr>
+          <p:cNvPr id="10" name="Picture 9">
+            <a:extLst>
+              <a:ext uri="{FF2B5EF4-FFF2-40B4-BE49-F238E27FC236}">
+                <a16:creationId xmlns:a16="http://schemas.microsoft.com/office/drawing/2014/main" id="{78BE5DA7-5DD1-2F27-986C-6F432D9AF0F4}"/>
+              </a:ext>
+            </a:extLst>
+          </p:cNvPr>
+          <p:cNvPicPr>
+            <a:picLocks noChangeAspect="1"/>
+          </p:cNvPicPr>
+          <p:nvPr/>
+        </p:nvPicPr>
+        <p:blipFill>
+          <a:blip r:embed="rId3"/>
+          <a:stretch>
+            <a:fillRect/>
+          </a:stretch>
+        </p:blipFill>
+        <p:spPr>
+          <a:xfrm>
+            <a:off x="6757339" y="2619627"/>
+            <a:ext cx="4995691" cy="3895128"/>
+          </a:xfrm>
+          <a:prstGeom prst="rect">
+            <a:avLst/>
+          </a:prstGeom>
+        </p:spPr>
+      </p:pic>
+      <p:sp>
+        <p:nvSpPr>
+          <p:cNvPr id="11" name="Rectangle: Rounded Corners 17">
+            <a:extLst>
+              <a:ext uri="{FF2B5EF4-FFF2-40B4-BE49-F238E27FC236}">
+                <a16:creationId xmlns:a16="http://schemas.microsoft.com/office/drawing/2014/main" id="{9D8E04F6-E003-375C-B85F-9E14CD3A99CA}"/>
+              </a:ext>
+            </a:extLst>
+          </p:cNvPr>
+          <p:cNvSpPr/>
+          <p:nvPr/>
+        </p:nvSpPr>
+        <p:spPr>
+          <a:xfrm>
+            <a:off x="11001000" y="6159279"/>
+            <a:ext cx="752030" cy="270000"/>
+          </a:xfrm>
+          <a:prstGeom prst="roundRect">
+            <a:avLst>
+              <a:gd name="adj" fmla="val 5385"/>
+            </a:avLst>
+          </a:prstGeom>
+          <a:noFill/>
+          <a:ln w="57150">
+            <a:solidFill>
+              <a:schemeClr val="tx1"/>
+            </a:solidFill>
+            <a:prstDash val="solid"/>
+          </a:ln>
+        </p:spPr>
+        <p:style>
+          <a:lnRef idx="2">
+            <a:schemeClr val="accent1">
+              <a:shade val="50000"/>
+            </a:schemeClr>
+          </a:lnRef>
+          <a:fillRef idx="1">
+            <a:schemeClr val="accent1"/>
+          </a:fillRef>
+          <a:effectRef idx="0">
+            <a:schemeClr val="accent1"/>
+          </a:effectRef>
+          <a:fontRef idx="minor">
+            <a:schemeClr val="lt1"/>
+          </a:fontRef>
+        </p:style>
+        <p:txBody>
+          <a:bodyPr rtlCol="0" anchor="t"/>
+          <a:lstStyle/>
+          <a:p>
+            <a:pPr algn="ctr"/>
+            <a:endParaRPr lang="en-US" sz="2799" b="1" dirty="0">
+              <a:solidFill>
+                <a:srgbClr val="FBEEDC"/>
+              </a:solidFill>
+              <a:effectLst>
+                <a:outerShdw blurRad="38100" dist="38100" dir="2700000" algn="tl">
+                  <a:srgbClr val="000000">
+                    <a:alpha val="43137"/>
+                  </a:srgbClr>
+                </a:outerShdw>
+              </a:effectLst>
+              <a:latin typeface="Consolas" panose="020B0609020204030204" pitchFamily="49" charset="0"/>
+            </a:endParaRPr>
           </a:p>
         </p:txBody>
       </p:sp>
@@ -7951,10 +8207,674 @@
       <p:transition spd="slow" advClick="0" advTm="5000"/>
     </mc:Fallback>
   </mc:AlternateContent>
+  <p:timing>
+    <p:tnLst>
+      <p:par>
+        <p:cTn id="1" dur="indefinite" restart="never" nodeType="tmRoot">
+          <p:childTnLst>
+            <p:seq concurrent="1" nextAc="seek">
+              <p:cTn id="2" dur="indefinite" nodeType="mainSeq">
+                <p:childTnLst>
+                  <p:par>
+                    <p:cTn id="3" fill="hold">
+                      <p:stCondLst>
+                        <p:cond delay="indefinite"/>
+                      </p:stCondLst>
+                      <p:childTnLst>
+                        <p:par>
+                          <p:cTn id="4" fill="hold">
+                            <p:stCondLst>
+                              <p:cond delay="0"/>
+                            </p:stCondLst>
+                            <p:childTnLst>
+                              <p:par>
+                                <p:cTn id="5" presetID="1" presetClass="entr" presetSubtype="0" fill="hold" grpId="0" nodeType="clickEffect">
+                                  <p:stCondLst>
+                                    <p:cond delay="0"/>
+                                  </p:stCondLst>
+                                  <p:childTnLst>
+                                    <p:set>
+                                      <p:cBhvr>
+                                        <p:cTn id="6" dur="1" fill="hold">
+                                          <p:stCondLst>
+                                            <p:cond delay="0"/>
+                                          </p:stCondLst>
+                                        </p:cTn>
+                                        <p:tgtEl>
+                                          <p:spTgt spid="7"/>
+                                        </p:tgtEl>
+                                        <p:attrNameLst>
+                                          <p:attrName>style.visibility</p:attrName>
+                                        </p:attrNameLst>
+                                      </p:cBhvr>
+                                      <p:to>
+                                        <p:strVal val="visible"/>
+                                      </p:to>
+                                    </p:set>
+                                  </p:childTnLst>
+                                </p:cTn>
+                              </p:par>
+                            </p:childTnLst>
+                          </p:cTn>
+                        </p:par>
+                      </p:childTnLst>
+                    </p:cTn>
+                  </p:par>
+                  <p:par>
+                    <p:cTn id="7" fill="hold">
+                      <p:stCondLst>
+                        <p:cond delay="indefinite"/>
+                      </p:stCondLst>
+                      <p:childTnLst>
+                        <p:par>
+                          <p:cTn id="8" fill="hold">
+                            <p:stCondLst>
+                              <p:cond delay="0"/>
+                            </p:stCondLst>
+                            <p:childTnLst>
+                              <p:par>
+                                <p:cTn id="9" presetID="1" presetClass="entr" presetSubtype="0" fill="hold" nodeType="clickEffect">
+                                  <p:stCondLst>
+                                    <p:cond delay="0"/>
+                                  </p:stCondLst>
+                                  <p:childTnLst>
+                                    <p:set>
+                                      <p:cBhvr>
+                                        <p:cTn id="10" dur="1" fill="hold">
+                                          <p:stCondLst>
+                                            <p:cond delay="0"/>
+                                          </p:stCondLst>
+                                        </p:cTn>
+                                        <p:tgtEl>
+                                          <p:spTgt spid="3">
+                                            <p:txEl>
+                                              <p:pRg st="1" end="1"/>
+                                            </p:txEl>
+                                          </p:spTgt>
+                                        </p:tgtEl>
+                                        <p:attrNameLst>
+                                          <p:attrName>style.visibility</p:attrName>
+                                        </p:attrNameLst>
+                                      </p:cBhvr>
+                                      <p:to>
+                                        <p:strVal val="visible"/>
+                                      </p:to>
+                                    </p:set>
+                                  </p:childTnLst>
+                                </p:cTn>
+                              </p:par>
+                              <p:par>
+                                <p:cTn id="11" presetID="1" presetClass="entr" presetSubtype="0" fill="hold" nodeType="withEffect">
+                                  <p:stCondLst>
+                                    <p:cond delay="0"/>
+                                  </p:stCondLst>
+                                  <p:childTnLst>
+                                    <p:set>
+                                      <p:cBhvr>
+                                        <p:cTn id="12" dur="1" fill="hold">
+                                          <p:stCondLst>
+                                            <p:cond delay="0"/>
+                                          </p:stCondLst>
+                                        </p:cTn>
+                                        <p:tgtEl>
+                                          <p:spTgt spid="10"/>
+                                        </p:tgtEl>
+                                        <p:attrNameLst>
+                                          <p:attrName>style.visibility</p:attrName>
+                                        </p:attrNameLst>
+                                      </p:cBhvr>
+                                      <p:to>
+                                        <p:strVal val="visible"/>
+                                      </p:to>
+                                    </p:set>
+                                  </p:childTnLst>
+                                </p:cTn>
+                              </p:par>
+                            </p:childTnLst>
+                          </p:cTn>
+                        </p:par>
+                      </p:childTnLst>
+                    </p:cTn>
+                  </p:par>
+                  <p:par>
+                    <p:cTn id="13" fill="hold">
+                      <p:stCondLst>
+                        <p:cond delay="indefinite"/>
+                      </p:stCondLst>
+                      <p:childTnLst>
+                        <p:par>
+                          <p:cTn id="14" fill="hold">
+                            <p:stCondLst>
+                              <p:cond delay="0"/>
+                            </p:stCondLst>
+                            <p:childTnLst>
+                              <p:par>
+                                <p:cTn id="15" presetID="1" presetClass="entr" presetSubtype="0" fill="hold" grpId="0" nodeType="clickEffect">
+                                  <p:stCondLst>
+                                    <p:cond delay="0"/>
+                                  </p:stCondLst>
+                                  <p:childTnLst>
+                                    <p:set>
+                                      <p:cBhvr>
+                                        <p:cTn id="16" dur="1" fill="hold">
+                                          <p:stCondLst>
+                                            <p:cond delay="0"/>
+                                          </p:stCondLst>
+                                        </p:cTn>
+                                        <p:tgtEl>
+                                          <p:spTgt spid="11"/>
+                                        </p:tgtEl>
+                                        <p:attrNameLst>
+                                          <p:attrName>style.visibility</p:attrName>
+                                        </p:attrNameLst>
+                                      </p:cBhvr>
+                                      <p:to>
+                                        <p:strVal val="visible"/>
+                                      </p:to>
+                                    </p:set>
+                                  </p:childTnLst>
+                                </p:cTn>
+                              </p:par>
+                            </p:childTnLst>
+                          </p:cTn>
+                        </p:par>
+                      </p:childTnLst>
+                    </p:cTn>
+                  </p:par>
+                </p:childTnLst>
+              </p:cTn>
+              <p:prevCondLst>
+                <p:cond evt="onPrev" delay="0">
+                  <p:tgtEl>
+                    <p:sldTgt/>
+                  </p:tgtEl>
+                </p:cond>
+              </p:prevCondLst>
+              <p:nextCondLst>
+                <p:cond evt="onNext" delay="0">
+                  <p:tgtEl>
+                    <p:sldTgt/>
+                  </p:tgtEl>
+                </p:cond>
+              </p:nextCondLst>
+            </p:seq>
+          </p:childTnLst>
+        </p:cTn>
+      </p:par>
+    </p:tnLst>
+    <p:bldLst>
+      <p:bldP spid="7" grpId="0" animBg="1"/>
+      <p:bldP spid="11" grpId="0" animBg="1"/>
+    </p:bldLst>
+  </p:timing>
 </p:sld>
 </file>
 
 <file path=ppt/slides/slide11.xml><?xml version="1.0" encoding="utf-8"?>
+<p:sld xmlns:a="http://schemas.openxmlformats.org/drawingml/2006/main" xmlns:r="http://schemas.openxmlformats.org/officeDocument/2006/relationships" xmlns:p="http://schemas.openxmlformats.org/presentationml/2006/main">
+  <p:cSld>
+    <p:spTree>
+      <p:nvGrpSpPr>
+        <p:cNvPr id="1" name=""/>
+        <p:cNvGrpSpPr/>
+        <p:nvPr/>
+      </p:nvGrpSpPr>
+      <p:grpSpPr>
+        <a:xfrm>
+          <a:off x="0" y="0"/>
+          <a:ext cx="0" cy="0"/>
+          <a:chOff x="0" y="0"/>
+          <a:chExt cx="0" cy="0"/>
+        </a:xfrm>
+      </p:grpSpPr>
+      <p:sp>
+        <p:nvSpPr>
+          <p:cNvPr id="2" name="Slide Number Placeholder 1">
+            <a:extLst>
+              <a:ext uri="{FF2B5EF4-FFF2-40B4-BE49-F238E27FC236}">
+                <a16:creationId xmlns:a16="http://schemas.microsoft.com/office/drawing/2014/main" id="{1D5808C6-F61C-C27E-D601-4ABB3DB66691}"/>
+              </a:ext>
+            </a:extLst>
+          </p:cNvPr>
+          <p:cNvSpPr>
+            <a:spLocks noGrp="1"/>
+          </p:cNvSpPr>
+          <p:nvPr>
+            <p:ph type="sldNum" sz="quarter" idx="5"/>
+          </p:nvPr>
+        </p:nvSpPr>
+        <p:spPr/>
+        <p:txBody>
+          <a:bodyPr/>
+          <a:lstStyle/>
+          <a:p>
+            <a:fld id="{2BF067CD-8E6B-4360-9AA8-C5DF2A48A6D1}" type="slidenum">
+              <a:rPr lang="en-US" noProof="0" smtClean="0"/>
+              <a:pPr/>
+              <a:t>11</a:t>
+            </a:fld>
+            <a:endParaRPr lang="en-US" noProof="0" dirty="0"/>
+          </a:p>
+        </p:txBody>
+      </p:sp>
+      <p:sp>
+        <p:nvSpPr>
+          <p:cNvPr id="3" name="Text Placeholder 2">
+            <a:extLst>
+              <a:ext uri="{FF2B5EF4-FFF2-40B4-BE49-F238E27FC236}">
+                <a16:creationId xmlns:a16="http://schemas.microsoft.com/office/drawing/2014/main" id="{4700B9F8-3476-7E19-00EE-20EC7D6D79A9}"/>
+              </a:ext>
+            </a:extLst>
+          </p:cNvPr>
+          <p:cNvSpPr>
+            <a:spLocks noGrp="1"/>
+          </p:cNvSpPr>
+          <p:nvPr>
+            <p:ph type="body" sz="quarter" idx="10"/>
+          </p:nvPr>
+        </p:nvSpPr>
+        <p:spPr/>
+        <p:txBody>
+          <a:bodyPr/>
+          <a:lstStyle/>
+          <a:p>
+            <a:endParaRPr lang="en-US" dirty="0"/>
+          </a:p>
+        </p:txBody>
+      </p:sp>
+      <p:sp>
+        <p:nvSpPr>
+          <p:cNvPr id="4" name="Title 3">
+            <a:extLst>
+              <a:ext uri="{FF2B5EF4-FFF2-40B4-BE49-F238E27FC236}">
+                <a16:creationId xmlns:a16="http://schemas.microsoft.com/office/drawing/2014/main" id="{690FA6E1-C985-B21C-0CAA-0C836D091B54}"/>
+              </a:ext>
+            </a:extLst>
+          </p:cNvPr>
+          <p:cNvSpPr>
+            <a:spLocks noGrp="1"/>
+          </p:cNvSpPr>
+          <p:nvPr>
+            <p:ph type="title"/>
+          </p:nvPr>
+        </p:nvSpPr>
+        <p:spPr/>
+        <p:txBody>
+          <a:bodyPr/>
+          <a:lstStyle/>
+          <a:p>
+            <a:r>
+              <a:rPr lang="bg-BG" dirty="0"/>
+              <a:t>Създаване на </a:t>
+            </a:r>
+            <a:r>
+              <a:rPr lang="en-US" dirty="0"/>
+              <a:t>SELECT </a:t>
+            </a:r>
+            <a:r>
+              <a:rPr lang="bg-BG" dirty="0"/>
+              <a:t>заявка</a:t>
+            </a:r>
+            <a:r>
+              <a:rPr lang="en-US" dirty="0"/>
+              <a:t> </a:t>
+            </a:r>
+            <a:r>
+              <a:rPr lang="bg-BG" dirty="0"/>
+              <a:t>– резултат</a:t>
+            </a:r>
+            <a:endParaRPr lang="en-US" dirty="0"/>
+          </a:p>
+        </p:txBody>
+      </p:sp>
+      <p:pic>
+        <p:nvPicPr>
+          <p:cNvPr id="6" name="Picture 5">
+            <a:extLst>
+              <a:ext uri="{FF2B5EF4-FFF2-40B4-BE49-F238E27FC236}">
+                <a16:creationId xmlns:a16="http://schemas.microsoft.com/office/drawing/2014/main" id="{75A51FE3-DC46-DDB9-0317-DB21F301F3EA}"/>
+              </a:ext>
+            </a:extLst>
+          </p:cNvPr>
+          <p:cNvPicPr>
+            <a:picLocks noChangeAspect="1"/>
+          </p:cNvPicPr>
+          <p:nvPr/>
+        </p:nvPicPr>
+        <p:blipFill>
+          <a:blip r:embed="rId2"/>
+          <a:stretch>
+            <a:fillRect/>
+          </a:stretch>
+        </p:blipFill>
+        <p:spPr>
+          <a:xfrm>
+            <a:off x="4171681" y="1540820"/>
+            <a:ext cx="3848637" cy="4839375"/>
+          </a:xfrm>
+          <a:prstGeom prst="rect">
+            <a:avLst/>
+          </a:prstGeom>
+        </p:spPr>
+      </p:pic>
+      <p:sp>
+        <p:nvSpPr>
+          <p:cNvPr id="7" name="AutoShape 7">
+            <a:extLst>
+              <a:ext uri="{FF2B5EF4-FFF2-40B4-BE49-F238E27FC236}">
+                <a16:creationId xmlns:a16="http://schemas.microsoft.com/office/drawing/2014/main" id="{B224ADAB-B804-4765-B4F0-EE465DD6DDC9}"/>
+              </a:ext>
+            </a:extLst>
+          </p:cNvPr>
+          <p:cNvSpPr>
+            <a:spLocks noChangeArrowheads="1"/>
+          </p:cNvSpPr>
+          <p:nvPr/>
+        </p:nvSpPr>
+        <p:spPr bwMode="auto">
+          <a:xfrm>
+            <a:off x="8166000" y="2259000"/>
+            <a:ext cx="3205597" cy="855000"/>
+          </a:xfrm>
+          <a:prstGeom prst="wedgeRoundRectCallout">
+            <a:avLst>
+              <a:gd name="adj1" fmla="val -53862"/>
+              <a:gd name="adj2" fmla="val -89584"/>
+              <a:gd name="adj3" fmla="val 16667"/>
+            </a:avLst>
+          </a:prstGeom>
+          <a:solidFill>
+            <a:schemeClr val="dk2">
+              <a:alpha val="80000"/>
+            </a:schemeClr>
+          </a:solidFill>
+          <a:ln w="19050">
+            <a:solidFill>
+              <a:schemeClr val="tx1">
+                <a:lumMod val="75000"/>
+                <a:alpha val="80000"/>
+              </a:schemeClr>
+            </a:solidFill>
+          </a:ln>
+          <a:effectLst/>
+        </p:spPr>
+        <p:style>
+          <a:lnRef idx="2">
+            <a:schemeClr val="accent1">
+              <a:shade val="50000"/>
+            </a:schemeClr>
+          </a:lnRef>
+          <a:fillRef idx="1001">
+            <a:schemeClr val="dk2"/>
+          </a:fillRef>
+          <a:effectRef idx="0">
+            <a:schemeClr val="accent1"/>
+          </a:effectRef>
+          <a:fontRef idx="minor">
+            <a:schemeClr val="lt1"/>
+          </a:fontRef>
+        </p:style>
+        <p:txBody>
+          <a:bodyPr rot="0" spcFirstLastPara="0" vertOverflow="overflow" horzOverflow="overflow" vert="horz" wrap="square" lIns="91416" tIns="45708" rIns="91416" bIns="45708" numCol="1" spcCol="0" rtlCol="0" fromWordArt="0" anchor="ctr" anchorCtr="0" forceAA="0" compatLnSpc="1">
+            <a:prstTxWarp prst="textNoShape">
+              <a:avLst/>
+            </a:prstTxWarp>
+            <a:noAutofit/>
+          </a:bodyPr>
+          <a:lstStyle/>
+          <a:p>
+            <a:pPr algn="ctr"/>
+            <a:r>
+              <a:rPr lang="bg-BG" sz="2399" b="1" noProof="1">
+                <a:solidFill>
+                  <a:srgbClr val="FFFFFF"/>
+                </a:solidFill>
+              </a:rPr>
+              <a:t>Избраните от нас колони</a:t>
+            </a:r>
+            <a:endParaRPr lang="en-US" sz="2399" b="1" noProof="1">
+              <a:solidFill>
+                <a:schemeClr val="bg1">
+                  <a:lumMod val="60000"/>
+                  <a:lumOff val="40000"/>
+                </a:schemeClr>
+              </a:solidFill>
+            </a:endParaRPr>
+          </a:p>
+        </p:txBody>
+      </p:sp>
+      <p:sp>
+        <p:nvSpPr>
+          <p:cNvPr id="8" name="AutoShape 7">
+            <a:extLst>
+              <a:ext uri="{FF2B5EF4-FFF2-40B4-BE49-F238E27FC236}">
+                <a16:creationId xmlns:a16="http://schemas.microsoft.com/office/drawing/2014/main" id="{BCF10122-37E0-BBE3-A1A2-87C25DB7A8A4}"/>
+              </a:ext>
+            </a:extLst>
+          </p:cNvPr>
+          <p:cNvSpPr>
+            <a:spLocks noChangeArrowheads="1"/>
+          </p:cNvSpPr>
+          <p:nvPr/>
+        </p:nvSpPr>
+        <p:spPr bwMode="auto">
+          <a:xfrm>
+            <a:off x="1641000" y="3654000"/>
+            <a:ext cx="2384999" cy="855000"/>
+          </a:xfrm>
+          <a:prstGeom prst="wedgeRoundRectCallout">
+            <a:avLst>
+              <a:gd name="adj1" fmla="val 62723"/>
+              <a:gd name="adj2" fmla="val -9109"/>
+              <a:gd name="adj3" fmla="val 16667"/>
+            </a:avLst>
+          </a:prstGeom>
+          <a:solidFill>
+            <a:schemeClr val="dk2">
+              <a:alpha val="80000"/>
+            </a:schemeClr>
+          </a:solidFill>
+          <a:ln w="19050">
+            <a:solidFill>
+              <a:schemeClr val="tx1">
+                <a:lumMod val="75000"/>
+                <a:alpha val="80000"/>
+              </a:schemeClr>
+            </a:solidFill>
+          </a:ln>
+          <a:effectLst/>
+        </p:spPr>
+        <p:style>
+          <a:lnRef idx="2">
+            <a:schemeClr val="accent1">
+              <a:shade val="50000"/>
+            </a:schemeClr>
+          </a:lnRef>
+          <a:fillRef idx="1001">
+            <a:schemeClr val="dk2"/>
+          </a:fillRef>
+          <a:effectRef idx="0">
+            <a:schemeClr val="accent1"/>
+          </a:effectRef>
+          <a:fontRef idx="minor">
+            <a:schemeClr val="lt1"/>
+          </a:fontRef>
+        </p:style>
+        <p:txBody>
+          <a:bodyPr rot="0" spcFirstLastPara="0" vertOverflow="overflow" horzOverflow="overflow" vert="horz" wrap="square" lIns="91416" tIns="45708" rIns="91416" bIns="45708" numCol="1" spcCol="0" rtlCol="0" fromWordArt="0" anchor="ctr" anchorCtr="0" forceAA="0" compatLnSpc="1">
+            <a:prstTxWarp prst="textNoShape">
+              <a:avLst/>
+            </a:prstTxWarp>
+            <a:noAutofit/>
+          </a:bodyPr>
+          <a:lstStyle/>
+          <a:p>
+            <a:pPr algn="ctr"/>
+            <a:r>
+              <a:rPr lang="bg-BG" sz="2399" b="1" noProof="1">
+                <a:solidFill>
+                  <a:srgbClr val="FFFFFF"/>
+                </a:solidFill>
+              </a:rPr>
+              <a:t>Всички записи</a:t>
+            </a:r>
+            <a:endParaRPr lang="en-US" sz="2399" b="1" noProof="1">
+              <a:solidFill>
+                <a:schemeClr val="bg1">
+                  <a:lumMod val="60000"/>
+                  <a:lumOff val="40000"/>
+                </a:schemeClr>
+              </a:solidFill>
+            </a:endParaRPr>
+          </a:p>
+        </p:txBody>
+      </p:sp>
+    </p:spTree>
+    <p:extLst>
+      <p:ext uri="{BB962C8B-B14F-4D97-AF65-F5344CB8AC3E}">
+        <p14:creationId xmlns:p14="http://schemas.microsoft.com/office/powerpoint/2010/main" val="2099675966"/>
+      </p:ext>
+    </p:extLst>
+  </p:cSld>
+  <p:clrMapOvr>
+    <a:masterClrMapping/>
+  </p:clrMapOvr>
+  <mc:AlternateContent xmlns:mc="http://schemas.openxmlformats.org/markup-compatibility/2006" xmlns:p14="http://schemas.microsoft.com/office/powerpoint/2010/main">
+    <mc:Choice Requires="p14">
+      <p:transition spd="slow" p14:dur="2000" advClick="0" advTm="5000"/>
+    </mc:Choice>
+    <mc:Fallback xmlns="">
+      <p:transition spd="slow" advClick="0" advTm="5000"/>
+    </mc:Fallback>
+  </mc:AlternateContent>
+  <p:timing>
+    <p:tnLst>
+      <p:par>
+        <p:cTn id="1" dur="indefinite" restart="never" nodeType="tmRoot">
+          <p:childTnLst>
+            <p:seq concurrent="1" nextAc="seek">
+              <p:cTn id="2" dur="indefinite" nodeType="mainSeq">
+                <p:childTnLst>
+                  <p:par>
+                    <p:cTn id="3" fill="hold">
+                      <p:stCondLst>
+                        <p:cond delay="indefinite"/>
+                      </p:stCondLst>
+                      <p:childTnLst>
+                        <p:par>
+                          <p:cTn id="4" fill="hold">
+                            <p:stCondLst>
+                              <p:cond delay="0"/>
+                            </p:stCondLst>
+                            <p:childTnLst>
+                              <p:par>
+                                <p:cTn id="5" presetID="1" presetClass="entr" presetSubtype="0" fill="hold" grpId="0" nodeType="clickEffect">
+                                  <p:stCondLst>
+                                    <p:cond delay="0"/>
+                                  </p:stCondLst>
+                                  <p:childTnLst>
+                                    <p:set>
+                                      <p:cBhvr>
+                                        <p:cTn id="6" dur="1" fill="hold">
+                                          <p:stCondLst>
+                                            <p:cond delay="0"/>
+                                          </p:stCondLst>
+                                        </p:cTn>
+                                        <p:tgtEl>
+                                          <p:spTgt spid="7"/>
+                                        </p:tgtEl>
+                                        <p:attrNameLst>
+                                          <p:attrName>style.visibility</p:attrName>
+                                        </p:attrNameLst>
+                                      </p:cBhvr>
+                                      <p:to>
+                                        <p:strVal val="visible"/>
+                                      </p:to>
+                                    </p:set>
+                                  </p:childTnLst>
+                                </p:cTn>
+                              </p:par>
+                            </p:childTnLst>
+                          </p:cTn>
+                        </p:par>
+                      </p:childTnLst>
+                    </p:cTn>
+                  </p:par>
+                  <p:par>
+                    <p:cTn id="7" fill="hold">
+                      <p:stCondLst>
+                        <p:cond delay="indefinite"/>
+                      </p:stCondLst>
+                      <p:childTnLst>
+                        <p:par>
+                          <p:cTn id="8" fill="hold">
+                            <p:stCondLst>
+                              <p:cond delay="0"/>
+                            </p:stCondLst>
+                            <p:childTnLst>
+                              <p:par>
+                                <p:cTn id="9" presetID="1" presetClass="entr" presetSubtype="0" fill="hold" grpId="0" nodeType="clickEffect">
+                                  <p:stCondLst>
+                                    <p:cond delay="0"/>
+                                  </p:stCondLst>
+                                  <p:childTnLst>
+                                    <p:set>
+                                      <p:cBhvr>
+                                        <p:cTn id="10" dur="1" fill="hold">
+                                          <p:stCondLst>
+                                            <p:cond delay="0"/>
+                                          </p:stCondLst>
+                                        </p:cTn>
+                                        <p:tgtEl>
+                                          <p:spTgt spid="8"/>
+                                        </p:tgtEl>
+                                        <p:attrNameLst>
+                                          <p:attrName>style.visibility</p:attrName>
+                                        </p:attrNameLst>
+                                      </p:cBhvr>
+                                      <p:to>
+                                        <p:strVal val="visible"/>
+                                      </p:to>
+                                    </p:set>
+                                  </p:childTnLst>
+                                </p:cTn>
+                              </p:par>
+                            </p:childTnLst>
+                          </p:cTn>
+                        </p:par>
+                      </p:childTnLst>
+                    </p:cTn>
+                  </p:par>
+                </p:childTnLst>
+              </p:cTn>
+              <p:prevCondLst>
+                <p:cond evt="onPrev" delay="0">
+                  <p:tgtEl>
+                    <p:sldTgt/>
+                  </p:tgtEl>
+                </p:cond>
+              </p:prevCondLst>
+              <p:nextCondLst>
+                <p:cond evt="onNext" delay="0">
+                  <p:tgtEl>
+                    <p:sldTgt/>
+                  </p:tgtEl>
+                </p:cond>
+              </p:nextCondLst>
+            </p:seq>
+          </p:childTnLst>
+        </p:cTn>
+      </p:par>
+    </p:tnLst>
+    <p:bldLst>
+      <p:bldP spid="7" grpId="0" animBg="1"/>
+      <p:bldP spid="8" grpId="0" animBg="1"/>
+    </p:bldLst>
+  </p:timing>
+</p:sld>
+</file>
+
+<file path=ppt/slides/slide12.xml><?xml version="1.0" encoding="utf-8"?>
 <p:sld xmlns:a="http://schemas.openxmlformats.org/drawingml/2006/main" xmlns:r="http://schemas.openxmlformats.org/officeDocument/2006/relationships" xmlns:p="http://schemas.openxmlformats.org/presentationml/2006/main">
   <p:cSld>
     <p:spTree>
@@ -7995,7 +8915,7 @@
             <a:fld id="{2BF067CD-8E6B-4360-9AA8-C5DF2A48A6D1}" type="slidenum">
               <a:rPr lang="en-US" noProof="0" smtClean="0"/>
               <a:pPr/>
-              <a:t>11</a:t>
+              <a:t>12</a:t>
             </a:fld>
             <a:endParaRPr lang="en-US" noProof="0" dirty="0"/>
           </a:p>
@@ -8022,7 +8942,93 @@
           <a:bodyPr/>
           <a:lstStyle/>
           <a:p>
-            <a:endParaRPr lang="en-US"/>
+            <a:r>
+              <a:rPr lang="bg-BG" dirty="0"/>
+              <a:t>Натискайки с </a:t>
+            </a:r>
+            <a:r>
+              <a:rPr lang="bg-BG" b="1" dirty="0"/>
+              <a:t>десния бутон </a:t>
+            </a:r>
+            <a:r>
+              <a:rPr lang="bg-BG" dirty="0"/>
+              <a:t>върху </a:t>
+            </a:r>
+            <a:r>
+              <a:rPr lang="bg-BG" b="1" dirty="0">
+                <a:solidFill>
+                  <a:schemeClr val="bg1"/>
+                </a:solidFill>
+              </a:rPr>
+              <a:t>новосъздадената заявка</a:t>
+            </a:r>
+            <a:r>
+              <a:rPr lang="bg-BG" dirty="0"/>
+              <a:t>, можем да изберем </a:t>
+            </a:r>
+            <a:r>
+              <a:rPr lang="bg-BG" b="1" dirty="0">
+                <a:solidFill>
+                  <a:schemeClr val="bg1"/>
+                </a:solidFill>
+              </a:rPr>
+              <a:t>опцията</a:t>
+            </a:r>
+            <a:r>
+              <a:rPr lang="bg-BG" dirty="0"/>
+              <a:t> </a:t>
+            </a:r>
+            <a:r>
+              <a:rPr lang="en-US" dirty="0"/>
+              <a:t>[</a:t>
+            </a:r>
+            <a:r>
+              <a:rPr lang="en-US" b="1" dirty="0">
+                <a:latin typeface="Consolas" panose="020B0609020204030204" pitchFamily="49" charset="0"/>
+              </a:rPr>
+              <a:t>SQL View</a:t>
+            </a:r>
+            <a:r>
+              <a:rPr lang="en-US" dirty="0"/>
+              <a:t>]</a:t>
+            </a:r>
+            <a:endParaRPr lang="bg-BG" dirty="0"/>
+          </a:p>
+          <a:p>
+            <a:pPr lvl="1"/>
+            <a:r>
+              <a:rPr lang="bg-BG" dirty="0"/>
+              <a:t>Тя ще покаже </a:t>
+            </a:r>
+            <a:r>
+              <a:rPr lang="en-US" b="1" dirty="0">
+                <a:solidFill>
+                  <a:schemeClr val="bg1"/>
+                </a:solidFill>
+              </a:rPr>
+              <a:t>SQL </a:t>
+            </a:r>
+            <a:r>
+              <a:rPr lang="bg-BG" b="1" dirty="0">
+                <a:solidFill>
+                  <a:schemeClr val="bg1"/>
+                </a:solidFill>
+              </a:rPr>
+              <a:t>скрипта </a:t>
+            </a:r>
+            <a:r>
+              <a:rPr lang="bg-BG" dirty="0"/>
+              <a:t>за извличане на редовете</a:t>
+            </a:r>
+            <a:r>
+              <a:rPr lang="en-US" dirty="0"/>
+              <a:t>:</a:t>
+            </a:r>
+            <a:endParaRPr lang="en-US" b="1" dirty="0">
+              <a:solidFill>
+                <a:schemeClr val="bg1"/>
+              </a:solidFill>
+            </a:endParaRPr>
           </a:p>
         </p:txBody>
       </p:sp>
@@ -8074,6 +9080,216 @@
           </a:p>
         </p:txBody>
       </p:sp>
+      <p:pic>
+        <p:nvPicPr>
+          <p:cNvPr id="6" name="Picture 5">
+            <a:extLst>
+              <a:ext uri="{FF2B5EF4-FFF2-40B4-BE49-F238E27FC236}">
+                <a16:creationId xmlns:a16="http://schemas.microsoft.com/office/drawing/2014/main" id="{92722336-2E2D-2191-7EAF-9EAF90CF614B}"/>
+              </a:ext>
+            </a:extLst>
+          </p:cNvPr>
+          <p:cNvPicPr>
+            <a:picLocks noChangeAspect="1"/>
+          </p:cNvPicPr>
+          <p:nvPr/>
+        </p:nvPicPr>
+        <p:blipFill>
+          <a:blip r:embed="rId2"/>
+          <a:stretch>
+            <a:fillRect/>
+          </a:stretch>
+        </p:blipFill>
+        <p:spPr>
+          <a:xfrm>
+            <a:off x="4903500" y="3114000"/>
+            <a:ext cx="2385000" cy="1900960"/>
+          </a:xfrm>
+          <a:prstGeom prst="rect">
+            <a:avLst/>
+          </a:prstGeom>
+          <a:ln>
+            <a:solidFill>
+              <a:schemeClr val="bg2">
+                <a:lumMod val="75000"/>
+              </a:schemeClr>
+            </a:solidFill>
+          </a:ln>
+        </p:spPr>
+      </p:pic>
+      <p:pic>
+        <p:nvPicPr>
+          <p:cNvPr id="8" name="Picture 7">
+            <a:extLst>
+              <a:ext uri="{FF2B5EF4-FFF2-40B4-BE49-F238E27FC236}">
+                <a16:creationId xmlns:a16="http://schemas.microsoft.com/office/drawing/2014/main" id="{E9B66412-A197-D73A-5404-301ACAE2F5D0}"/>
+              </a:ext>
+            </a:extLst>
+          </p:cNvPr>
+          <p:cNvPicPr>
+            <a:picLocks noChangeAspect="1"/>
+          </p:cNvPicPr>
+          <p:nvPr/>
+        </p:nvPicPr>
+        <p:blipFill>
+          <a:blip r:embed="rId3"/>
+          <a:stretch>
+            <a:fillRect/>
+          </a:stretch>
+        </p:blipFill>
+        <p:spPr>
+          <a:xfrm>
+            <a:off x="2083271" y="5922000"/>
+            <a:ext cx="8025457" cy="585000"/>
+          </a:xfrm>
+          <a:prstGeom prst="rect">
+            <a:avLst/>
+          </a:prstGeom>
+        </p:spPr>
+      </p:pic>
+      <p:sp>
+        <p:nvSpPr>
+          <p:cNvPr id="9" name="Arrow: Down 8">
+            <a:extLst>
+              <a:ext uri="{FF2B5EF4-FFF2-40B4-BE49-F238E27FC236}">
+                <a16:creationId xmlns:a16="http://schemas.microsoft.com/office/drawing/2014/main" id="{04A8EB62-3B4B-7840-1A64-646D60C414D3}"/>
+              </a:ext>
+            </a:extLst>
+          </p:cNvPr>
+          <p:cNvSpPr/>
+          <p:nvPr/>
+        </p:nvSpPr>
+        <p:spPr bwMode="auto">
+          <a:xfrm>
+            <a:off x="5825999" y="5156748"/>
+            <a:ext cx="540000" cy="658891"/>
+          </a:xfrm>
+          <a:prstGeom prst="downArrow">
+            <a:avLst/>
+          </a:prstGeom>
+          <a:solidFill>
+            <a:schemeClr val="dk2">
+              <a:alpha val="80000"/>
+            </a:schemeClr>
+          </a:solidFill>
+          <a:ln w="19050">
+            <a:solidFill>
+              <a:schemeClr val="tx1">
+                <a:lumMod val="75000"/>
+                <a:alpha val="80000"/>
+              </a:schemeClr>
+            </a:solidFill>
+          </a:ln>
+          <a:effectLst/>
+        </p:spPr>
+        <p:style>
+          <a:lnRef idx="2">
+            <a:schemeClr val="accent1">
+              <a:shade val="50000"/>
+            </a:schemeClr>
+          </a:lnRef>
+          <a:fillRef idx="1001">
+            <a:schemeClr val="dk2"/>
+          </a:fillRef>
+          <a:effectRef idx="0">
+            <a:schemeClr val="accent1"/>
+          </a:effectRef>
+          <a:fontRef idx="minor">
+            <a:schemeClr val="lt1"/>
+          </a:fontRef>
+        </p:style>
+        <p:txBody>
+          <a:bodyPr rot="0" spcFirstLastPara="0" vertOverflow="overflow" horzOverflow="overflow" vert="horz" wrap="square" lIns="91440" tIns="45720" rIns="91440" bIns="45720" numCol="1" spcCol="0" rtlCol="0" fromWordArt="0" anchor="ctr" anchorCtr="0" forceAA="0" compatLnSpc="1">
+            <a:prstTxWarp prst="textNoShape">
+              <a:avLst/>
+            </a:prstTxWarp>
+            <a:noAutofit/>
+          </a:bodyPr>
+          <a:lstStyle/>
+          <a:p>
+            <a:pPr algn="ctr"/>
+            <a:endParaRPr lang="en-US" sz="2800" b="1" dirty="0">
+              <a:solidFill>
+                <a:srgbClr val="FFFFFF"/>
+              </a:solidFill>
+              <a:effectLst>
+                <a:outerShdw blurRad="38100" dist="38100" dir="2700000" algn="tl">
+                  <a:srgbClr val="000000">
+                    <a:alpha val="43137"/>
+                  </a:srgbClr>
+                </a:outerShdw>
+              </a:effectLst>
+            </a:endParaRPr>
+          </a:p>
+        </p:txBody>
+      </p:sp>
+      <p:sp>
+        <p:nvSpPr>
+          <p:cNvPr id="10" name="Rectangle: Rounded Corners 17">
+            <a:extLst>
+              <a:ext uri="{FF2B5EF4-FFF2-40B4-BE49-F238E27FC236}">
+                <a16:creationId xmlns:a16="http://schemas.microsoft.com/office/drawing/2014/main" id="{C8D4A154-12DE-8BAF-1B70-D870C1D00EDD}"/>
+              </a:ext>
+            </a:extLst>
+          </p:cNvPr>
+          <p:cNvSpPr/>
+          <p:nvPr/>
+        </p:nvSpPr>
+        <p:spPr>
+          <a:xfrm>
+            <a:off x="5810340" y="4329000"/>
+            <a:ext cx="1230660" cy="234104"/>
+          </a:xfrm>
+          <a:prstGeom prst="roundRect">
+            <a:avLst>
+              <a:gd name="adj" fmla="val 5385"/>
+            </a:avLst>
+          </a:prstGeom>
+          <a:noFill/>
+          <a:ln w="57150">
+            <a:solidFill>
+              <a:schemeClr val="tx1"/>
+            </a:solidFill>
+            <a:prstDash val="solid"/>
+          </a:ln>
+        </p:spPr>
+        <p:style>
+          <a:lnRef idx="2">
+            <a:schemeClr val="accent1">
+              <a:shade val="50000"/>
+            </a:schemeClr>
+          </a:lnRef>
+          <a:fillRef idx="1">
+            <a:schemeClr val="accent1"/>
+          </a:fillRef>
+          <a:effectRef idx="0">
+            <a:schemeClr val="accent1"/>
+          </a:effectRef>
+          <a:fontRef idx="minor">
+            <a:schemeClr val="lt1"/>
+          </a:fontRef>
+        </p:style>
+        <p:txBody>
+          <a:bodyPr rtlCol="0" anchor="t"/>
+          <a:lstStyle/>
+          <a:p>
+            <a:pPr algn="ctr"/>
+            <a:endParaRPr lang="en-US" sz="2799" b="1" dirty="0">
+              <a:solidFill>
+                <a:srgbClr val="FBEEDC"/>
+              </a:solidFill>
+              <a:effectLst>
+                <a:outerShdw blurRad="38100" dist="38100" dir="2700000" algn="tl">
+                  <a:srgbClr val="000000">
+                    <a:alpha val="43137"/>
+                  </a:srgbClr>
+                </a:outerShdw>
+              </a:effectLst>
+              <a:latin typeface="Consolas" panose="020B0609020204030204" pitchFamily="49" charset="0"/>
+            </a:endParaRPr>
+          </a:p>
+        </p:txBody>
+      </p:sp>
     </p:spTree>
     <p:extLst>
       <p:ext uri="{BB962C8B-B14F-4D97-AF65-F5344CB8AC3E}">
@@ -8092,10 +9308,237 @@
       <p:transition spd="slow" advClick="0" advTm="5000"/>
     </mc:Fallback>
   </mc:AlternateContent>
+  <p:timing>
+    <p:tnLst>
+      <p:par>
+        <p:cTn id="1" dur="indefinite" restart="never" nodeType="tmRoot">
+          <p:childTnLst>
+            <p:seq concurrent="1" nextAc="seek">
+              <p:cTn id="2" dur="indefinite" nodeType="mainSeq">
+                <p:childTnLst>
+                  <p:par>
+                    <p:cTn id="3" fill="hold">
+                      <p:stCondLst>
+                        <p:cond delay="indefinite"/>
+                      </p:stCondLst>
+                      <p:childTnLst>
+                        <p:par>
+                          <p:cTn id="4" fill="hold">
+                            <p:stCondLst>
+                              <p:cond delay="0"/>
+                            </p:stCondLst>
+                            <p:childTnLst>
+                              <p:par>
+                                <p:cTn id="5" presetID="1" presetClass="entr" presetSubtype="0" fill="hold" nodeType="clickEffect">
+                                  <p:stCondLst>
+                                    <p:cond delay="0"/>
+                                  </p:stCondLst>
+                                  <p:childTnLst>
+                                    <p:set>
+                                      <p:cBhvr>
+                                        <p:cTn id="6" dur="1" fill="hold">
+                                          <p:stCondLst>
+                                            <p:cond delay="0"/>
+                                          </p:stCondLst>
+                                        </p:cTn>
+                                        <p:tgtEl>
+                                          <p:spTgt spid="3">
+                                            <p:txEl>
+                                              <p:pRg st="1" end="1"/>
+                                            </p:txEl>
+                                          </p:spTgt>
+                                        </p:tgtEl>
+                                        <p:attrNameLst>
+                                          <p:attrName>style.visibility</p:attrName>
+                                        </p:attrNameLst>
+                                      </p:cBhvr>
+                                      <p:to>
+                                        <p:strVal val="visible"/>
+                                      </p:to>
+                                    </p:set>
+                                  </p:childTnLst>
+                                </p:cTn>
+                              </p:par>
+                              <p:par>
+                                <p:cTn id="7" presetID="1" presetClass="entr" presetSubtype="0" fill="hold" nodeType="withEffect">
+                                  <p:stCondLst>
+                                    <p:cond delay="0"/>
+                                  </p:stCondLst>
+                                  <p:childTnLst>
+                                    <p:set>
+                                      <p:cBhvr>
+                                        <p:cTn id="8" dur="1" fill="hold">
+                                          <p:stCondLst>
+                                            <p:cond delay="0"/>
+                                          </p:stCondLst>
+                                        </p:cTn>
+                                        <p:tgtEl>
+                                          <p:spTgt spid="6"/>
+                                        </p:tgtEl>
+                                        <p:attrNameLst>
+                                          <p:attrName>style.visibility</p:attrName>
+                                        </p:attrNameLst>
+                                      </p:cBhvr>
+                                      <p:to>
+                                        <p:strVal val="visible"/>
+                                      </p:to>
+                                    </p:set>
+                                  </p:childTnLst>
+                                </p:cTn>
+                              </p:par>
+                            </p:childTnLst>
+                          </p:cTn>
+                        </p:par>
+                      </p:childTnLst>
+                    </p:cTn>
+                  </p:par>
+                  <p:par>
+                    <p:cTn id="9" fill="hold">
+                      <p:stCondLst>
+                        <p:cond delay="indefinite"/>
+                      </p:stCondLst>
+                      <p:childTnLst>
+                        <p:par>
+                          <p:cTn id="10" fill="hold">
+                            <p:stCondLst>
+                              <p:cond delay="0"/>
+                            </p:stCondLst>
+                            <p:childTnLst>
+                              <p:par>
+                                <p:cTn id="11" presetID="1" presetClass="entr" presetSubtype="0" fill="hold" grpId="0" nodeType="clickEffect">
+                                  <p:stCondLst>
+                                    <p:cond delay="0"/>
+                                  </p:stCondLst>
+                                  <p:childTnLst>
+                                    <p:set>
+                                      <p:cBhvr>
+                                        <p:cTn id="12" dur="1" fill="hold">
+                                          <p:stCondLst>
+                                            <p:cond delay="0"/>
+                                          </p:stCondLst>
+                                        </p:cTn>
+                                        <p:tgtEl>
+                                          <p:spTgt spid="10"/>
+                                        </p:tgtEl>
+                                        <p:attrNameLst>
+                                          <p:attrName>style.visibility</p:attrName>
+                                        </p:attrNameLst>
+                                      </p:cBhvr>
+                                      <p:to>
+                                        <p:strVal val="visible"/>
+                                      </p:to>
+                                    </p:set>
+                                  </p:childTnLst>
+                                </p:cTn>
+                              </p:par>
+                            </p:childTnLst>
+                          </p:cTn>
+                        </p:par>
+                      </p:childTnLst>
+                    </p:cTn>
+                  </p:par>
+                  <p:par>
+                    <p:cTn id="13" fill="hold">
+                      <p:stCondLst>
+                        <p:cond delay="indefinite"/>
+                      </p:stCondLst>
+                      <p:childTnLst>
+                        <p:par>
+                          <p:cTn id="14" fill="hold">
+                            <p:stCondLst>
+                              <p:cond delay="0"/>
+                            </p:stCondLst>
+                            <p:childTnLst>
+                              <p:par>
+                                <p:cTn id="15" presetID="1" presetClass="entr" presetSubtype="0" fill="hold" grpId="0" nodeType="clickEffect">
+                                  <p:stCondLst>
+                                    <p:cond delay="0"/>
+                                  </p:stCondLst>
+                                  <p:childTnLst>
+                                    <p:set>
+                                      <p:cBhvr>
+                                        <p:cTn id="16" dur="1" fill="hold">
+                                          <p:stCondLst>
+                                            <p:cond delay="0"/>
+                                          </p:stCondLst>
+                                        </p:cTn>
+                                        <p:tgtEl>
+                                          <p:spTgt spid="9"/>
+                                        </p:tgtEl>
+                                        <p:attrNameLst>
+                                          <p:attrName>style.visibility</p:attrName>
+                                        </p:attrNameLst>
+                                      </p:cBhvr>
+                                      <p:to>
+                                        <p:strVal val="visible"/>
+                                      </p:to>
+                                    </p:set>
+                                  </p:childTnLst>
+                                </p:cTn>
+                              </p:par>
+                              <p:par>
+                                <p:cTn id="17" presetID="1" presetClass="entr" presetSubtype="0" fill="hold" nodeType="withEffect">
+                                  <p:stCondLst>
+                                    <p:cond delay="0"/>
+                                  </p:stCondLst>
+                                  <p:childTnLst>
+                                    <p:set>
+                                      <p:cBhvr>
+                                        <p:cTn id="18" dur="1" fill="hold">
+                                          <p:stCondLst>
+                                            <p:cond delay="0"/>
+                                          </p:stCondLst>
+                                        </p:cTn>
+                                        <p:tgtEl>
+                                          <p:spTgt spid="8"/>
+                                        </p:tgtEl>
+                                        <p:attrNameLst>
+                                          <p:attrName>style.visibility</p:attrName>
+                                        </p:attrNameLst>
+                                      </p:cBhvr>
+                                      <p:to>
+                                        <p:strVal val="visible"/>
+                                      </p:to>
+                                    </p:set>
+                                  </p:childTnLst>
+                                </p:cTn>
+                              </p:par>
+                            </p:childTnLst>
+                          </p:cTn>
+                        </p:par>
+                      </p:childTnLst>
+                    </p:cTn>
+                  </p:par>
+                </p:childTnLst>
+              </p:cTn>
+              <p:prevCondLst>
+                <p:cond evt="onPrev" delay="0">
+                  <p:tgtEl>
+                    <p:sldTgt/>
+                  </p:tgtEl>
+                </p:cond>
+              </p:prevCondLst>
+              <p:nextCondLst>
+                <p:cond evt="onNext" delay="0">
+                  <p:tgtEl>
+                    <p:sldTgt/>
+                  </p:tgtEl>
+                </p:cond>
+              </p:nextCondLst>
+            </p:seq>
+          </p:childTnLst>
+        </p:cTn>
+      </p:par>
+    </p:tnLst>
+    <p:bldLst>
+      <p:bldP spid="9" grpId="0" animBg="1"/>
+      <p:bldP spid="10" grpId="0" animBg="1"/>
+    </p:bldLst>
+  </p:timing>
 </p:sld>
 </file>
 
-<file path=ppt/slides/slide12.xml><?xml version="1.0" encoding="utf-8"?>
+<file path=ppt/slides/slide13.xml><?xml version="1.0" encoding="utf-8"?>
 <p:sld xmlns:a="http://schemas.openxmlformats.org/drawingml/2006/main" xmlns:r="http://schemas.openxmlformats.org/officeDocument/2006/relationships" xmlns:p="http://schemas.openxmlformats.org/presentationml/2006/main">
   <p:cSld>
     <p:spTree>
@@ -8220,7 +9663,7 @@
 </p:sld>
 </file>
 
-<file path=ppt/slides/slide13.xml><?xml version="1.0" encoding="utf-8"?>
+<file path=ppt/slides/slide14.xml><?xml version="1.0" encoding="utf-8"?>
 <p:sld xmlns:a="http://schemas.openxmlformats.org/drawingml/2006/main" xmlns:r="http://schemas.openxmlformats.org/officeDocument/2006/relationships" xmlns:p="http://schemas.openxmlformats.org/presentationml/2006/main">
   <p:cSld>
     <p:spTree>
@@ -8492,7 +9935,7 @@
             <a:fld id="{2BF067CD-8E6B-4360-9AA8-C5DF2A48A6D1}" type="slidenum">
               <a:rPr lang="en-US" noProof="0" smtClean="0"/>
               <a:pPr/>
-              <a:t>13</a:t>
+              <a:t>14</a:t>
             </a:fld>
             <a:endParaRPr lang="en-US" noProof="0" dirty="0"/>
           </a:p>
@@ -9018,7 +10461,7 @@
 </p:sld>
 </file>
 
-<file path=ppt/slides/slide14.xml><?xml version="1.0" encoding="utf-8"?>
+<file path=ppt/slides/slide15.xml><?xml version="1.0" encoding="utf-8"?>
 <p:sld xmlns:a="http://schemas.openxmlformats.org/drawingml/2006/main" xmlns:r="http://schemas.openxmlformats.org/officeDocument/2006/relationships" xmlns:p="http://schemas.openxmlformats.org/presentationml/2006/main">
   <p:cSld>
     <p:spTree>
@@ -9174,7 +10617,7 @@
             <a:fld id="{2BF067CD-8E6B-4360-9AA8-C5DF2A48A6D1}" type="slidenum">
               <a:rPr lang="en-US" noProof="0" smtClean="0"/>
               <a:pPr/>
-              <a:t>14</a:t>
+              <a:t>15</a:t>
             </a:fld>
             <a:endParaRPr lang="en-US" noProof="0" dirty="0"/>
           </a:p>
@@ -9484,7 +10927,7 @@
 </p:sld>
 </file>
 
-<file path=ppt/slides/slide15.xml><?xml version="1.0" encoding="utf-8"?>
+<file path=ppt/slides/slide16.xml><?xml version="1.0" encoding="utf-8"?>
 <p:sld xmlns:a="http://schemas.openxmlformats.org/drawingml/2006/main" xmlns:r="http://schemas.openxmlformats.org/officeDocument/2006/relationships" xmlns:p="http://schemas.openxmlformats.org/presentationml/2006/main">
   <p:cSld>
     <p:spTree>
@@ -9596,7 +11039,7 @@
             <a:fld id="{2BF067CD-8E6B-4360-9AA8-C5DF2A48A6D1}" type="slidenum">
               <a:rPr lang="en-US" noProof="0" smtClean="0"/>
               <a:pPr/>
-              <a:t>15</a:t>
+              <a:t>16</a:t>
             </a:fld>
             <a:endParaRPr lang="en-US" noProof="0" dirty="0"/>
           </a:p>
@@ -9787,7 +11230,7 @@
 </p:sld>
 </file>
 
-<file path=ppt/slides/slide16.xml><?xml version="1.0" encoding="utf-8"?>
+<file path=ppt/slides/slide17.xml><?xml version="1.0" encoding="utf-8"?>
 <p:sld xmlns:a="http://schemas.openxmlformats.org/drawingml/2006/main" xmlns:r="http://schemas.openxmlformats.org/officeDocument/2006/relationships" xmlns:p="http://schemas.openxmlformats.org/presentationml/2006/main">
   <p:cSld>
     <p:spTree>
@@ -10141,170 +11584,86 @@
             <a:fld id="{2BF067CD-8E6B-4360-9AA8-C5DF2A48A6D1}" type="slidenum">
               <a:rPr lang="en-US" noProof="0" smtClean="0"/>
               <a:pPr/>
-              <a:t>16</a:t>
+              <a:t>17</a:t>
             </a:fld>
             <a:endParaRPr lang="en-US" noProof="0" dirty="0"/>
           </a:p>
         </p:txBody>
       </p:sp>
-      <p:sp>
-        <p:nvSpPr>
-          <p:cNvPr id="2" name="Rectangle: Rounded Corners 1">
+      <p:pic>
+        <p:nvPicPr>
+          <p:cNvPr id="8" name="Picture 7">
             <a:extLst>
               <a:ext uri="{FF2B5EF4-FFF2-40B4-BE49-F238E27FC236}">
-                <a16:creationId xmlns:a16="http://schemas.microsoft.com/office/drawing/2014/main" id="{333BD4EE-95B8-A08F-FA28-3C6DBEA2E2B9}"/>
+                <a16:creationId xmlns:a16="http://schemas.microsoft.com/office/drawing/2014/main" id="{327A4DF2-2437-2705-BE89-1439EC8497DC}"/>
               </a:ext>
             </a:extLst>
           </p:cNvPr>
-          <p:cNvSpPr/>
+          <p:cNvPicPr>
+            <a:picLocks noChangeAspect="1"/>
+          </p:cNvPicPr>
           <p:nvPr/>
-        </p:nvSpPr>
-        <p:spPr bwMode="auto">
+        </p:nvPicPr>
+        <p:blipFill>
+          <a:blip r:embed="rId3"/>
+          <a:stretch>
+            <a:fillRect/>
+          </a:stretch>
+        </p:blipFill>
+        <p:spPr>
           <a:xfrm>
-            <a:off x="5286000" y="3834000"/>
-            <a:ext cx="2790000" cy="1620000"/>
+            <a:off x="5515335" y="4039472"/>
+            <a:ext cx="2712206" cy="1421817"/>
           </a:xfrm>
-          <a:prstGeom prst="roundRect">
+          <a:prstGeom prst="rect">
             <a:avLst/>
           </a:prstGeom>
-          <a:solidFill>
-            <a:schemeClr val="dk2">
-              <a:alpha val="80000"/>
-            </a:schemeClr>
-          </a:solidFill>
-          <a:ln w="19050">
+          <a:ln>
             <a:solidFill>
-              <a:schemeClr val="tx1">
+              <a:schemeClr val="bg2">
                 <a:lumMod val="75000"/>
-                <a:alpha val="80000"/>
               </a:schemeClr>
             </a:solidFill>
           </a:ln>
-          <a:effectLst/>
         </p:spPr>
-        <p:style>
-          <a:lnRef idx="2">
-            <a:schemeClr val="accent1">
-              <a:shade val="50000"/>
-            </a:schemeClr>
-          </a:lnRef>
-          <a:fillRef idx="1001">
-            <a:schemeClr val="dk2"/>
-          </a:fillRef>
-          <a:effectRef idx="0">
-            <a:schemeClr val="accent1"/>
-          </a:effectRef>
-          <a:fontRef idx="minor">
-            <a:schemeClr val="lt1"/>
-          </a:fontRef>
-        </p:style>
-        <p:txBody>
-          <a:bodyPr rot="0" spcFirstLastPara="0" vertOverflow="overflow" horzOverflow="overflow" vert="horz" wrap="square" lIns="91440" tIns="45720" rIns="91440" bIns="45720" numCol="1" spcCol="0" rtlCol="0" fromWordArt="0" anchor="ctr" anchorCtr="0" forceAA="0" compatLnSpc="1">
-            <a:prstTxWarp prst="textNoShape">
-              <a:avLst/>
-            </a:prstTxWarp>
-            <a:noAutofit/>
-          </a:bodyPr>
-          <a:lstStyle/>
-          <a:p>
-            <a:pPr algn="ctr"/>
-            <a:r>
-              <a:rPr lang="en-US" sz="2800" b="1" dirty="0">
-                <a:solidFill>
-                  <a:srgbClr val="FFFFFF"/>
-                </a:solidFill>
-                <a:effectLst>
-                  <a:outerShdw blurRad="38100" dist="38100" dir="2700000" algn="tl">
-                    <a:srgbClr val="000000">
-                      <a:alpha val="43137"/>
-                    </a:srgbClr>
-                  </a:outerShdw>
-                </a:effectLst>
-              </a:rPr>
-              <a:t>TODO: screenshot (enter param 1)</a:t>
-            </a:r>
-          </a:p>
-        </p:txBody>
-      </p:sp>
-      <p:sp>
-        <p:nvSpPr>
-          <p:cNvPr id="6" name="Rectangle: Rounded Corners 5">
+      </p:pic>
+      <p:pic>
+        <p:nvPicPr>
+          <p:cNvPr id="10" name="Picture 9">
             <a:extLst>
               <a:ext uri="{FF2B5EF4-FFF2-40B4-BE49-F238E27FC236}">
-                <a16:creationId xmlns:a16="http://schemas.microsoft.com/office/drawing/2014/main" id="{98528990-31C2-7704-E3A1-73DB38FB2E0B}"/>
+                <a16:creationId xmlns:a16="http://schemas.microsoft.com/office/drawing/2014/main" id="{FC819EF5-B479-CA17-E4EE-4C981F06F635}"/>
               </a:ext>
             </a:extLst>
           </p:cNvPr>
-          <p:cNvSpPr/>
+          <p:cNvPicPr>
+            <a:picLocks noChangeAspect="1"/>
+          </p:cNvPicPr>
           <p:nvPr/>
-        </p:nvSpPr>
-        <p:spPr bwMode="auto">
+        </p:nvPicPr>
+        <p:blipFill>
+          <a:blip r:embed="rId4"/>
+          <a:stretch>
+            <a:fillRect/>
+          </a:stretch>
+        </p:blipFill>
+        <p:spPr>
           <a:xfrm>
-            <a:off x="8505123" y="3834000"/>
-            <a:ext cx="2790000" cy="1620000"/>
+            <a:off x="8886000" y="4039472"/>
+            <a:ext cx="2797237" cy="1423373"/>
           </a:xfrm>
-          <a:prstGeom prst="roundRect">
+          <a:prstGeom prst="rect">
             <a:avLst/>
           </a:prstGeom>
-          <a:solidFill>
-            <a:schemeClr val="dk2">
-              <a:alpha val="80000"/>
-            </a:schemeClr>
-          </a:solidFill>
-          <a:ln w="19050">
+          <a:ln>
             <a:solidFill>
-              <a:schemeClr val="tx1">
+              <a:schemeClr val="bg2">
                 <a:lumMod val="75000"/>
-                <a:alpha val="80000"/>
               </a:schemeClr>
             </a:solidFill>
           </a:ln>
-          <a:effectLst/>
         </p:spPr>
-        <p:style>
-          <a:lnRef idx="2">
-            <a:schemeClr val="accent1">
-              <a:shade val="50000"/>
-            </a:schemeClr>
-          </a:lnRef>
-          <a:fillRef idx="1001">
-            <a:schemeClr val="dk2"/>
-          </a:fillRef>
-          <a:effectRef idx="0">
-            <a:schemeClr val="accent1"/>
-          </a:effectRef>
-          <a:fontRef idx="minor">
-            <a:schemeClr val="lt1"/>
-          </a:fontRef>
-        </p:style>
-        <p:txBody>
-          <a:bodyPr rot="0" spcFirstLastPara="0" vertOverflow="overflow" horzOverflow="overflow" vert="horz" wrap="square" lIns="91440" tIns="45720" rIns="91440" bIns="45720" numCol="1" spcCol="0" rtlCol="0" fromWordArt="0" anchor="ctr" anchorCtr="0" forceAA="0" compatLnSpc="1">
-            <a:prstTxWarp prst="textNoShape">
-              <a:avLst/>
-            </a:prstTxWarp>
-            <a:noAutofit/>
-          </a:bodyPr>
-          <a:lstStyle/>
-          <a:p>
-            <a:pPr algn="ctr"/>
-            <a:r>
-              <a:rPr lang="en-US" sz="2800" b="1" dirty="0">
-                <a:solidFill>
-                  <a:srgbClr val="FFFFFF"/>
-                </a:solidFill>
-                <a:effectLst>
-                  <a:outerShdw blurRad="38100" dist="38100" dir="2700000" algn="tl">
-                    <a:srgbClr val="000000">
-                      <a:alpha val="43137"/>
-                    </a:srgbClr>
-                  </a:outerShdw>
-                </a:effectLst>
-              </a:rPr>
-              <a:t>TODO: screenshot (enter param 2)</a:t>
-            </a:r>
-          </a:p>
-        </p:txBody>
-      </p:sp>
+      </p:pic>
     </p:spTree>
     <p:extLst>
       <p:ext uri="{BB962C8B-B14F-4D97-AF65-F5344CB8AC3E}">
@@ -10407,6 +11766,78 @@
                       </p:childTnLst>
                     </p:cTn>
                   </p:par>
+                  <p:par>
+                    <p:cTn id="9" fill="hold">
+                      <p:stCondLst>
+                        <p:cond delay="indefinite"/>
+                      </p:stCondLst>
+                      <p:childTnLst>
+                        <p:par>
+                          <p:cTn id="10" fill="hold">
+                            <p:stCondLst>
+                              <p:cond delay="0"/>
+                            </p:stCondLst>
+                            <p:childTnLst>
+                              <p:par>
+                                <p:cTn id="11" presetID="1" presetClass="entr" presetSubtype="0" fill="hold" nodeType="clickEffect">
+                                  <p:stCondLst>
+                                    <p:cond delay="0"/>
+                                  </p:stCondLst>
+                                  <p:childTnLst>
+                                    <p:set>
+                                      <p:cBhvr>
+                                        <p:cTn id="12" dur="1" fill="hold">
+                                          <p:stCondLst>
+                                            <p:cond delay="0"/>
+                                          </p:stCondLst>
+                                        </p:cTn>
+                                        <p:tgtEl>
+                                          <p:spTgt spid="8"/>
+                                        </p:tgtEl>
+                                        <p:attrNameLst>
+                                          <p:attrName>style.visibility</p:attrName>
+                                        </p:attrNameLst>
+                                      </p:cBhvr>
+                                      <p:to>
+                                        <p:strVal val="visible"/>
+                                      </p:to>
+                                    </p:set>
+                                  </p:childTnLst>
+                                </p:cTn>
+                              </p:par>
+                              <p:par>
+                                <p:cTn id="13" presetID="1" presetClass="entr" presetSubtype="0" fill="hold" nodeType="withEffect">
+                                  <p:stCondLst>
+                                    <p:cond delay="0"/>
+                                  </p:stCondLst>
+                                  <p:childTnLst>
+                                    <p:set>
+                                      <p:cBhvr>
+                                        <p:cTn id="14" dur="1" fill="hold">
+                                          <p:stCondLst>
+                                            <p:cond delay="0"/>
+                                          </p:stCondLst>
+                                        </p:cTn>
+                                        <p:tgtEl>
+                                          <p:spTgt spid="10"/>
+                                        </p:tgtEl>
+                                        <p:attrNameLst>
+                                          <p:attrName>style.visibility</p:attrName>
+                                        </p:attrNameLst>
+                                      </p:cBhvr>
+                                      <p:to>
+                                        <p:strVal val="visible"/>
+                                      </p:to>
+                                    </p:set>
+                                  </p:childTnLst>
+                                </p:cTn>
+                              </p:par>
+                            </p:childTnLst>
+                          </p:cTn>
+                        </p:par>
+                      </p:childTnLst>
+                    </p:cTn>
+                  </p:par>
                 </p:childTnLst>
               </p:cTn>
               <p:prevCondLst>
@@ -10432,7 +11863,7 @@
 </p:sld>
 </file>
 
-<file path=ppt/slides/slide17.xml><?xml version="1.0" encoding="utf-8"?>
+<file path=ppt/slides/slide18.xml><?xml version="1.0" encoding="utf-8"?>
 <p:sld xmlns:a="http://schemas.openxmlformats.org/drawingml/2006/main" xmlns:r="http://schemas.openxmlformats.org/officeDocument/2006/relationships" xmlns:p="http://schemas.openxmlformats.org/presentationml/2006/main">
   <p:cSld>
     <p:spTree>
@@ -10552,7 +11983,7 @@
 </p:sld>
 </file>
 
-<file path=ppt/slides/slide18.xml><?xml version="1.0" encoding="utf-8"?>
+<file path=ppt/slides/slide19.xml><?xml version="1.0" encoding="utf-8"?>
 <p:sld xmlns:a="http://schemas.openxmlformats.org/drawingml/2006/main" xmlns:r="http://schemas.openxmlformats.org/officeDocument/2006/relationships" xmlns:p="http://schemas.openxmlformats.org/presentationml/2006/main">
   <p:cSld>
     <p:spTree>
@@ -10713,7 +12144,7 @@
             <a:fld id="{2BF067CD-8E6B-4360-9AA8-C5DF2A48A6D1}" type="slidenum">
               <a:rPr lang="en-US" noProof="0" smtClean="0"/>
               <a:pPr/>
-              <a:t>18</a:t>
+              <a:t>19</a:t>
             </a:fld>
             <a:endParaRPr lang="en-US" noProof="0" dirty="0"/>
           </a:p>
@@ -10777,7 +12208,575 @@
 </p:sld>
 </file>
 
-<file path=ppt/slides/slide19.xml><?xml version="1.0" encoding="utf-8"?>
+<file path=ppt/slides/slide2.xml><?xml version="1.0" encoding="utf-8"?>
+<p:sld xmlns:a="http://schemas.openxmlformats.org/drawingml/2006/main" xmlns:r="http://schemas.openxmlformats.org/officeDocument/2006/relationships" xmlns:p="http://schemas.openxmlformats.org/presentationml/2006/main">
+  <p:cSld>
+    <p:spTree>
+      <p:nvGrpSpPr>
+        <p:cNvPr id="1" name=""/>
+        <p:cNvGrpSpPr/>
+        <p:nvPr/>
+      </p:nvGrpSpPr>
+      <p:grpSpPr>
+        <a:xfrm>
+          <a:off x="0" y="0"/>
+          <a:ext cx="0" cy="0"/>
+          <a:chOff x="0" y="0"/>
+          <a:chExt cx="0" cy="0"/>
+        </a:xfrm>
+      </p:grpSpPr>
+      <p:sp>
+        <p:nvSpPr>
+          <p:cNvPr id="444419" name="Slide Body"/>
+          <p:cNvSpPr>
+            <a:spLocks noGrp="1" noChangeArrowheads="1"/>
+          </p:cNvSpPr>
+          <p:nvPr>
+            <p:ph type="body" sz="quarter" idx="13"/>
+          </p:nvPr>
+        </p:nvSpPr>
+        <p:spPr>
+          <a:xfrm>
+            <a:off x="291000" y="1224000"/>
+            <a:ext cx="8460000" cy="5520646"/>
+          </a:xfrm>
+        </p:spPr>
+        <p:txBody>
+          <a:bodyPr>
+            <a:noAutofit/>
+          </a:bodyPr>
+          <a:lstStyle/>
+          <a:p>
+            <a:pPr>
+              <a:spcBef>
+                <a:spcPts val="400"/>
+              </a:spcBef>
+              <a:buClr>
+                <a:srgbClr val="224464"/>
+              </a:buClr>
+            </a:pPr>
+            <a:r>
+              <a:rPr lang="ru-RU" sz="4000" dirty="0" err="1"/>
+              <a:t>Създаване</a:t>
+            </a:r>
+            <a:r>
+              <a:rPr lang="ru-RU" sz="4000" dirty="0"/>
+              <a:t> на </a:t>
+            </a:r>
+            <a:r>
+              <a:rPr lang="ru-RU" sz="4000" b="1" dirty="0">
+                <a:solidFill>
+                  <a:schemeClr val="bg1"/>
+                </a:solidFill>
+              </a:rPr>
+              <a:t>заявки</a:t>
+            </a:r>
+            <a:endParaRPr lang="en-US" sz="4000" b="1" dirty="0">
+              <a:solidFill>
+                <a:schemeClr val="bg1"/>
+              </a:solidFill>
+            </a:endParaRPr>
+          </a:p>
+          <a:p>
+            <a:pPr lvl="1">
+              <a:spcBef>
+                <a:spcPts val="400"/>
+              </a:spcBef>
+              <a:buClr>
+                <a:srgbClr val="224464"/>
+              </a:buClr>
+            </a:pPr>
+            <a:r>
+              <a:rPr lang="ru-RU" sz="4000" b="1" dirty="0">
+                <a:solidFill>
+                  <a:schemeClr val="bg1"/>
+                </a:solidFill>
+              </a:rPr>
+              <a:t>SQL</a:t>
+            </a:r>
+            <a:r>
+              <a:rPr lang="ru-RU" sz="4000" dirty="0"/>
+              <a:t> редактор / </a:t>
+            </a:r>
+            <a:r>
+              <a:rPr lang="ru-RU" sz="4000" b="1" dirty="0">
+                <a:solidFill>
+                  <a:schemeClr val="bg1"/>
+                </a:solidFill>
+              </a:rPr>
+              <a:t>визуален</a:t>
+            </a:r>
+            <a:r>
+              <a:rPr lang="ru-RU" sz="4000" dirty="0"/>
+              <a:t> редактор</a:t>
+            </a:r>
+          </a:p>
+          <a:p>
+            <a:pPr>
+              <a:spcBef>
+                <a:spcPts val="400"/>
+              </a:spcBef>
+              <a:buClr>
+                <a:srgbClr val="224464"/>
+              </a:buClr>
+            </a:pPr>
+            <a:r>
+              <a:rPr lang="bg-BG" sz="4000" dirty="0"/>
+              <a:t>Параметрични заявки</a:t>
+            </a:r>
+          </a:p>
+          <a:p>
+            <a:pPr>
+              <a:spcBef>
+                <a:spcPts val="400"/>
+              </a:spcBef>
+              <a:buClr>
+                <a:srgbClr val="224464"/>
+              </a:buClr>
+            </a:pPr>
+            <a:r>
+              <a:rPr lang="bg-BG" sz="4000" dirty="0"/>
+              <a:t>Формуляри (</a:t>
+            </a:r>
+            <a:r>
+              <a:rPr lang="en-US" sz="4000" b="1" dirty="0">
+                <a:solidFill>
+                  <a:schemeClr val="bg1"/>
+                </a:solidFill>
+              </a:rPr>
+              <a:t>forms</a:t>
+            </a:r>
+            <a:r>
+              <a:rPr lang="en-US" sz="4000" dirty="0"/>
+              <a:t>)</a:t>
+            </a:r>
+            <a:endParaRPr lang="bg-BG" sz="4000" dirty="0"/>
+          </a:p>
+          <a:p>
+            <a:pPr>
+              <a:spcBef>
+                <a:spcPts val="400"/>
+              </a:spcBef>
+              <a:buClr>
+                <a:srgbClr val="224464"/>
+              </a:buClr>
+            </a:pPr>
+            <a:r>
+              <a:rPr lang="bg-BG" sz="4000" dirty="0"/>
+              <a:t>Отчети </a:t>
+            </a:r>
+            <a:r>
+              <a:rPr lang="en-US" sz="4000" dirty="0"/>
+              <a:t>(</a:t>
+            </a:r>
+            <a:r>
+              <a:rPr lang="en-US" sz="4000" b="1" dirty="0">
+                <a:solidFill>
+                  <a:schemeClr val="bg1"/>
+                </a:solidFill>
+              </a:rPr>
+              <a:t>reports</a:t>
+            </a:r>
+            <a:r>
+              <a:rPr lang="en-US" sz="4000" dirty="0"/>
+              <a:t>)</a:t>
+            </a:r>
+            <a:endParaRPr lang="en-US" sz="4000" dirty="0">
+              <a:solidFill>
+                <a:schemeClr val="bg1"/>
+              </a:solidFill>
+            </a:endParaRPr>
+          </a:p>
+        </p:txBody>
+      </p:sp>
+      <p:sp>
+        <p:nvSpPr>
+          <p:cNvPr id="444418" name="Slide Title"/>
+          <p:cNvSpPr>
+            <a:spLocks noGrp="1" noChangeArrowheads="1"/>
+          </p:cNvSpPr>
+          <p:nvPr>
+            <p:ph type="title"/>
+          </p:nvPr>
+        </p:nvSpPr>
+        <p:spPr>
+          <a:xfrm>
+            <a:off x="190405" y="100750"/>
+            <a:ext cx="9669213" cy="882654"/>
+          </a:xfrm>
+        </p:spPr>
+        <p:txBody>
+          <a:bodyPr/>
+          <a:lstStyle/>
+          <a:p>
+            <a:r>
+              <a:rPr lang="bg-BG" dirty="0"/>
+              <a:t>Съдържание</a:t>
+            </a:r>
+          </a:p>
+        </p:txBody>
+      </p:sp>
+      <p:sp>
+        <p:nvSpPr>
+          <p:cNvPr id="2" name="Slide Number">
+            <a:extLst>
+              <a:ext uri="{FF2B5EF4-FFF2-40B4-BE49-F238E27FC236}">
+                <a16:creationId xmlns:a16="http://schemas.microsoft.com/office/drawing/2014/main" id="{395E6BD6-E492-39EC-6BB1-E61467EA7518}"/>
+              </a:ext>
+            </a:extLst>
+          </p:cNvPr>
+          <p:cNvSpPr txBox="1">
+            <a:spLocks/>
+          </p:cNvSpPr>
+          <p:nvPr/>
+        </p:nvSpPr>
+        <p:spPr>
+          <a:xfrm>
+            <a:off x="11753030" y="6507000"/>
+            <a:ext cx="367414" cy="297000"/>
+          </a:xfrm>
+          <a:prstGeom prst="rect">
+            <a:avLst/>
+          </a:prstGeom>
+        </p:spPr>
+        <p:txBody>
+          <a:bodyPr vert="horz" lIns="91440" tIns="45720" rIns="91440" bIns="45720" rtlCol="0" anchor="b"/>
+          <a:lstStyle>
+            <a:defPPr>
+              <a:defRPr lang="en-US"/>
+            </a:defPPr>
+            <a:lvl1pPr marL="0" algn="r" defTabSz="914400" rtl="0" eaLnBrk="1" latinLnBrk="0" hangingPunct="1">
+              <a:defRPr sz="1000" kern="1200">
+                <a:solidFill>
+                  <a:schemeClr val="tx1"/>
+                </a:solidFill>
+                <a:latin typeface="+mn-lt"/>
+                <a:ea typeface="+mn-ea"/>
+                <a:cs typeface="+mn-cs"/>
+              </a:defRPr>
+            </a:lvl1pPr>
+            <a:lvl2pPr marL="457200" algn="l" defTabSz="914400" rtl="0" eaLnBrk="1" latinLnBrk="0" hangingPunct="1">
+              <a:defRPr sz="1800" kern="1200">
+                <a:solidFill>
+                  <a:schemeClr val="tx1"/>
+                </a:solidFill>
+                <a:latin typeface="+mn-lt"/>
+                <a:ea typeface="+mn-ea"/>
+                <a:cs typeface="+mn-cs"/>
+              </a:defRPr>
+            </a:lvl2pPr>
+            <a:lvl3pPr marL="914400" algn="l" defTabSz="914400" rtl="0" eaLnBrk="1" latinLnBrk="0" hangingPunct="1">
+              <a:defRPr sz="1800" kern="1200">
+                <a:solidFill>
+                  <a:schemeClr val="tx1"/>
+                </a:solidFill>
+                <a:latin typeface="+mn-lt"/>
+                <a:ea typeface="+mn-ea"/>
+                <a:cs typeface="+mn-cs"/>
+              </a:defRPr>
+            </a:lvl3pPr>
+            <a:lvl4pPr marL="1371600" algn="l" defTabSz="914400" rtl="0" eaLnBrk="1" latinLnBrk="0" hangingPunct="1">
+              <a:defRPr sz="1800" kern="1200">
+                <a:solidFill>
+                  <a:schemeClr val="tx1"/>
+                </a:solidFill>
+                <a:latin typeface="+mn-lt"/>
+                <a:ea typeface="+mn-ea"/>
+                <a:cs typeface="+mn-cs"/>
+              </a:defRPr>
+            </a:lvl4pPr>
+            <a:lvl5pPr marL="1828800" algn="l" defTabSz="914400" rtl="0" eaLnBrk="1" latinLnBrk="0" hangingPunct="1">
+              <a:defRPr sz="1800" kern="1200">
+                <a:solidFill>
+                  <a:schemeClr val="tx1"/>
+                </a:solidFill>
+                <a:latin typeface="+mn-lt"/>
+                <a:ea typeface="+mn-ea"/>
+                <a:cs typeface="+mn-cs"/>
+              </a:defRPr>
+            </a:lvl5pPr>
+            <a:lvl6pPr marL="2286000" algn="l" defTabSz="914400" rtl="0" eaLnBrk="1" latinLnBrk="0" hangingPunct="1">
+              <a:defRPr sz="1800" kern="1200">
+                <a:solidFill>
+                  <a:schemeClr val="tx1"/>
+                </a:solidFill>
+                <a:latin typeface="+mn-lt"/>
+                <a:ea typeface="+mn-ea"/>
+                <a:cs typeface="+mn-cs"/>
+              </a:defRPr>
+            </a:lvl6pPr>
+            <a:lvl7pPr marL="2743200" algn="l" defTabSz="914400" rtl="0" eaLnBrk="1" latinLnBrk="0" hangingPunct="1">
+              <a:defRPr sz="1800" kern="1200">
+                <a:solidFill>
+                  <a:schemeClr val="tx1"/>
+                </a:solidFill>
+                <a:latin typeface="+mn-lt"/>
+                <a:ea typeface="+mn-ea"/>
+                <a:cs typeface="+mn-cs"/>
+              </a:defRPr>
+            </a:lvl7pPr>
+            <a:lvl8pPr marL="3200400" algn="l" defTabSz="914400" rtl="0" eaLnBrk="1" latinLnBrk="0" hangingPunct="1">
+              <a:defRPr sz="1800" kern="1200">
+                <a:solidFill>
+                  <a:schemeClr val="tx1"/>
+                </a:solidFill>
+                <a:latin typeface="+mn-lt"/>
+                <a:ea typeface="+mn-ea"/>
+                <a:cs typeface="+mn-cs"/>
+              </a:defRPr>
+            </a:lvl8pPr>
+            <a:lvl9pPr marL="3657600" algn="l" defTabSz="914400" rtl="0" eaLnBrk="1" latinLnBrk="0" hangingPunct="1">
+              <a:defRPr sz="1800" kern="1200">
+                <a:solidFill>
+                  <a:schemeClr val="tx1"/>
+                </a:solidFill>
+                <a:latin typeface="+mn-lt"/>
+                <a:ea typeface="+mn-ea"/>
+                <a:cs typeface="+mn-cs"/>
+              </a:defRPr>
+            </a:lvl9pPr>
+          </a:lstStyle>
+          <a:p>
+            <a:fld id="{2BF067CD-8E6B-4360-9AA8-C5DF2A48A6D1}" type="slidenum">
+              <a:rPr lang="en-US" smtClean="0"/>
+              <a:pPr/>
+              <a:t>2</a:t>
+            </a:fld>
+            <a:endParaRPr lang="en-US" dirty="0"/>
+          </a:p>
+        </p:txBody>
+      </p:sp>
+      <p:pic>
+        <p:nvPicPr>
+          <p:cNvPr id="3" name="Picture 2" descr="Finweb Business Consultancy | Microsoft Access Basic">
+            <a:extLst>
+              <a:ext uri="{FF2B5EF4-FFF2-40B4-BE49-F238E27FC236}">
+                <a16:creationId xmlns:a16="http://schemas.microsoft.com/office/drawing/2014/main" id="{1C6409F1-4846-AB10-4605-12BFFBFE45A2}"/>
+              </a:ext>
+            </a:extLst>
+          </p:cNvPr>
+          <p:cNvPicPr>
+            <a:picLocks noChangeAspect="1" noChangeArrowheads="1"/>
+          </p:cNvPicPr>
+          <p:nvPr/>
+        </p:nvPicPr>
+        <p:blipFill>
+          <a:blip r:embed="rId3" cstate="print"/>
+          <a:srcRect/>
+          <a:stretch>
+            <a:fillRect/>
+          </a:stretch>
+        </p:blipFill>
+        <p:spPr bwMode="auto">
+          <a:xfrm>
+            <a:off x="9066000" y="1719000"/>
+            <a:ext cx="2341270" cy="2298620"/>
+          </a:xfrm>
+          <a:prstGeom prst="rect">
+            <a:avLst/>
+          </a:prstGeom>
+          <a:noFill/>
+        </p:spPr>
+      </p:pic>
+    </p:spTree>
+    <p:extLst>
+      <p:ext uri="{BB962C8B-B14F-4D97-AF65-F5344CB8AC3E}">
+        <p14:creationId xmlns:p14="http://schemas.microsoft.com/office/powerpoint/2010/main" val="1148214511"/>
+      </p:ext>
+    </p:extLst>
+  </p:cSld>
+  <p:clrMapOvr>
+    <a:masterClrMapping/>
+  </p:clrMapOvr>
+  <mc:AlternateContent xmlns:mc="http://schemas.openxmlformats.org/markup-compatibility/2006" xmlns:p14="http://schemas.microsoft.com/office/powerpoint/2010/main">
+    <mc:Choice Requires="p14">
+      <p:transition spd="slow" p14:dur="2000" advClick="0" advTm="5000"/>
+    </mc:Choice>
+    <mc:Fallback xmlns="">
+      <p:transition spd="slow" advClick="0" advTm="5000"/>
+    </mc:Fallback>
+  </mc:AlternateContent>
+  <p:timing>
+    <p:tnLst>
+      <p:par>
+        <p:cTn id="1" dur="indefinite" restart="never" nodeType="tmRoot">
+          <p:childTnLst>
+            <p:seq concurrent="1" nextAc="seek">
+              <p:cTn id="2" dur="indefinite" nodeType="mainSeq">
+                <p:childTnLst>
+                  <p:par>
+                    <p:cTn id="3" fill="hold">
+                      <p:stCondLst>
+                        <p:cond delay="indefinite"/>
+                      </p:stCondLst>
+                      <p:childTnLst>
+                        <p:par>
+                          <p:cTn id="4" fill="hold">
+                            <p:stCondLst>
+                              <p:cond delay="0"/>
+                            </p:stCondLst>
+                            <p:childTnLst>
+                              <p:par>
+                                <p:cTn id="5" presetID="1" presetClass="entr" presetSubtype="0" fill="hold" nodeType="clickEffect">
+                                  <p:stCondLst>
+                                    <p:cond delay="0"/>
+                                  </p:stCondLst>
+                                  <p:childTnLst>
+                                    <p:set>
+                                      <p:cBhvr>
+                                        <p:cTn id="6" dur="1" fill="hold">
+                                          <p:stCondLst>
+                                            <p:cond delay="0"/>
+                                          </p:stCondLst>
+                                        </p:cTn>
+                                        <p:tgtEl>
+                                          <p:spTgt spid="444419">
+                                            <p:txEl>
+                                              <p:pRg st="2" end="2"/>
+                                            </p:txEl>
+                                          </p:spTgt>
+                                        </p:tgtEl>
+                                        <p:attrNameLst>
+                                          <p:attrName>style.visibility</p:attrName>
+                                        </p:attrNameLst>
+                                      </p:cBhvr>
+                                      <p:to>
+                                        <p:strVal val="visible"/>
+                                      </p:to>
+                                    </p:set>
+                                  </p:childTnLst>
+                                </p:cTn>
+                              </p:par>
+                            </p:childTnLst>
+                          </p:cTn>
+                        </p:par>
+                      </p:childTnLst>
+                    </p:cTn>
+                  </p:par>
+                  <p:par>
+                    <p:cTn id="7" fill="hold">
+                      <p:stCondLst>
+                        <p:cond delay="indefinite"/>
+                      </p:stCondLst>
+                      <p:childTnLst>
+                        <p:par>
+                          <p:cTn id="8" fill="hold">
+                            <p:stCondLst>
+                              <p:cond delay="0"/>
+                            </p:stCondLst>
+                            <p:childTnLst>
+                              <p:par>
+                                <p:cTn id="9" presetID="1" presetClass="entr" presetSubtype="0" fill="hold" nodeType="clickEffect">
+                                  <p:stCondLst>
+                                    <p:cond delay="0"/>
+                                  </p:stCondLst>
+                                  <p:childTnLst>
+                                    <p:set>
+                                      <p:cBhvr>
+                                        <p:cTn id="10" dur="1" fill="hold">
+                                          <p:stCondLst>
+                                            <p:cond delay="0"/>
+                                          </p:stCondLst>
+                                        </p:cTn>
+                                        <p:tgtEl>
+                                          <p:spTgt spid="444419">
+                                            <p:txEl>
+                                              <p:pRg st="3" end="3"/>
+                                            </p:txEl>
+                                          </p:spTgt>
+                                        </p:tgtEl>
+                                        <p:attrNameLst>
+                                          <p:attrName>style.visibility</p:attrName>
+                                        </p:attrNameLst>
+                                      </p:cBhvr>
+                                      <p:to>
+                                        <p:strVal val="visible"/>
+                                      </p:to>
+                                    </p:set>
+                                  </p:childTnLst>
+                                </p:cTn>
+                              </p:par>
+                            </p:childTnLst>
+                          </p:cTn>
+                        </p:par>
+                      </p:childTnLst>
+                    </p:cTn>
+                  </p:par>
+                  <p:par>
+                    <p:cTn id="11" fill="hold">
+                      <p:stCondLst>
+                        <p:cond delay="indefinite"/>
+                      </p:stCondLst>
+                      <p:childTnLst>
+                        <p:par>
+                          <p:cTn id="12" fill="hold">
+                            <p:stCondLst>
+                              <p:cond delay="0"/>
+                            </p:stCondLst>
+                            <p:childTnLst>
+                              <p:par>
+                                <p:cTn id="13" presetID="1" presetClass="entr" presetSubtype="0" fill="hold" nodeType="clickEffect">
+                                  <p:stCondLst>
+                                    <p:cond delay="0"/>
+                                  </p:stCondLst>
+                                  <p:childTnLst>
+                                    <p:set>
+                                      <p:cBhvr>
+                                        <p:cTn id="14" dur="1" fill="hold">
+                                          <p:stCondLst>
+                                            <p:cond delay="0"/>
+                                          </p:stCondLst>
+                                        </p:cTn>
+                                        <p:tgtEl>
+                                          <p:spTgt spid="444419">
+                                            <p:txEl>
+                                              <p:pRg st="4" end="4"/>
+                                            </p:txEl>
+                                          </p:spTgt>
+                                        </p:tgtEl>
+                                        <p:attrNameLst>
+                                          <p:attrName>style.visibility</p:attrName>
+                                        </p:attrNameLst>
+                                      </p:cBhvr>
+                                      <p:to>
+                                        <p:strVal val="visible"/>
+                                      </p:to>
+                                    </p:set>
+                                  </p:childTnLst>
+                                </p:cTn>
+                              </p:par>
+                            </p:childTnLst>
+                          </p:cTn>
+                        </p:par>
+                      </p:childTnLst>
+                    </p:cTn>
+                  </p:par>
+                </p:childTnLst>
+              </p:cTn>
+              <p:prevCondLst>
+                <p:cond evt="onPrev" delay="0">
+                  <p:tgtEl>
+                    <p:sldTgt/>
+                  </p:tgtEl>
+                </p:cond>
+              </p:prevCondLst>
+              <p:nextCondLst>
+                <p:cond evt="onNext" delay="0">
+                  <p:tgtEl>
+                    <p:sldTgt/>
+                  </p:tgtEl>
+                </p:cond>
+              </p:nextCondLst>
+            </p:seq>
+          </p:childTnLst>
+        </p:cTn>
+      </p:par>
+    </p:tnLst>
+  </p:timing>
+</p:sld>
+</file>
+
+<file path=ppt/slides/slide20.xml><?xml version="1.0" encoding="utf-8"?>
 <p:sld xmlns:a="http://schemas.openxmlformats.org/drawingml/2006/main" xmlns:r="http://schemas.openxmlformats.org/officeDocument/2006/relationships" xmlns:p="http://schemas.openxmlformats.org/presentationml/2006/main">
   <p:cSld>
     <p:spTree>
@@ -11008,7 +13007,7 @@
             <a:fld id="{2BF067CD-8E6B-4360-9AA8-C5DF2A48A6D1}" type="slidenum">
               <a:rPr lang="en-US" noProof="0" smtClean="0"/>
               <a:pPr/>
-              <a:t>19</a:t>
+              <a:t>20</a:t>
             </a:fld>
             <a:endParaRPr lang="en-US" noProof="0" dirty="0"/>
           </a:p>
@@ -11114,655 +13113,7 @@
 </p:sld>
 </file>
 
-<file path=ppt/slides/slide2.xml><?xml version="1.0" encoding="utf-8"?>
-<p:sld xmlns:a="http://schemas.openxmlformats.org/drawingml/2006/main" xmlns:r="http://schemas.openxmlformats.org/officeDocument/2006/relationships" xmlns:p="http://schemas.openxmlformats.org/presentationml/2006/main">
-  <p:cSld>
-    <p:spTree>
-      <p:nvGrpSpPr>
-        <p:cNvPr id="1" name=""/>
-        <p:cNvGrpSpPr/>
-        <p:nvPr/>
-      </p:nvGrpSpPr>
-      <p:grpSpPr>
-        <a:xfrm>
-          <a:off x="0" y="0"/>
-          <a:ext cx="0" cy="0"/>
-          <a:chOff x="0" y="0"/>
-          <a:chExt cx="0" cy="0"/>
-        </a:xfrm>
-      </p:grpSpPr>
-      <p:sp>
-        <p:nvSpPr>
-          <p:cNvPr id="444419" name="Slide Body"/>
-          <p:cNvSpPr>
-            <a:spLocks noGrp="1" noChangeArrowheads="1"/>
-          </p:cNvSpPr>
-          <p:nvPr>
-            <p:ph type="body" sz="quarter" idx="13"/>
-          </p:nvPr>
-        </p:nvSpPr>
-        <p:spPr>
-          <a:xfrm>
-            <a:off x="291000" y="1224000"/>
-            <a:ext cx="8460000" cy="5520646"/>
-          </a:xfrm>
-        </p:spPr>
-        <p:txBody>
-          <a:bodyPr>
-            <a:noAutofit/>
-          </a:bodyPr>
-          <a:lstStyle/>
-          <a:p>
-            <a:pPr>
-              <a:spcBef>
-                <a:spcPts val="400"/>
-              </a:spcBef>
-              <a:buClr>
-                <a:srgbClr val="224464"/>
-              </a:buClr>
-            </a:pPr>
-            <a:r>
-              <a:rPr lang="ru-RU" sz="4000" dirty="0" err="1"/>
-              <a:t>Създаване</a:t>
-            </a:r>
-            <a:r>
-              <a:rPr lang="ru-RU" sz="4000" dirty="0"/>
-              <a:t> на </a:t>
-            </a:r>
-            <a:r>
-              <a:rPr lang="ru-RU" sz="4000" b="1" dirty="0">
-                <a:solidFill>
-                  <a:schemeClr val="bg1"/>
-                </a:solidFill>
-              </a:rPr>
-              <a:t>заявки</a:t>
-            </a:r>
-            <a:endParaRPr lang="en-US" sz="4000" b="1" dirty="0">
-              <a:solidFill>
-                <a:schemeClr val="bg1"/>
-              </a:solidFill>
-            </a:endParaRPr>
-          </a:p>
-          <a:p>
-            <a:pPr lvl="1">
-              <a:spcBef>
-                <a:spcPts val="400"/>
-              </a:spcBef>
-              <a:buClr>
-                <a:srgbClr val="224464"/>
-              </a:buClr>
-            </a:pPr>
-            <a:r>
-              <a:rPr lang="ru-RU" sz="4000" b="1" dirty="0">
-                <a:solidFill>
-                  <a:schemeClr val="bg1"/>
-                </a:solidFill>
-              </a:rPr>
-              <a:t>SQL</a:t>
-            </a:r>
-            <a:r>
-              <a:rPr lang="ru-RU" sz="4000" dirty="0"/>
-              <a:t> редактор / </a:t>
-            </a:r>
-            <a:r>
-              <a:rPr lang="ru-RU" sz="4000" b="1" dirty="0">
-                <a:solidFill>
-                  <a:schemeClr val="bg1"/>
-                </a:solidFill>
-              </a:rPr>
-              <a:t>визуален</a:t>
-            </a:r>
-            <a:r>
-              <a:rPr lang="ru-RU" sz="4000" dirty="0"/>
-              <a:t> редактор</a:t>
-            </a:r>
-          </a:p>
-          <a:p>
-            <a:pPr>
-              <a:spcBef>
-                <a:spcPts val="400"/>
-              </a:spcBef>
-              <a:buClr>
-                <a:srgbClr val="224464"/>
-              </a:buClr>
-            </a:pPr>
-            <a:r>
-              <a:rPr lang="bg-BG" sz="4000" dirty="0"/>
-              <a:t>Параметрични заявки</a:t>
-            </a:r>
-          </a:p>
-          <a:p>
-            <a:pPr>
-              <a:spcBef>
-                <a:spcPts val="400"/>
-              </a:spcBef>
-              <a:buClr>
-                <a:srgbClr val="224464"/>
-              </a:buClr>
-            </a:pPr>
-            <a:r>
-              <a:rPr lang="bg-BG" sz="4000" dirty="0"/>
-              <a:t>Формуляри (</a:t>
-            </a:r>
-            <a:r>
-              <a:rPr lang="en-US" sz="4000" b="1" dirty="0">
-                <a:solidFill>
-                  <a:schemeClr val="bg1"/>
-                </a:solidFill>
-              </a:rPr>
-              <a:t>forms</a:t>
-            </a:r>
-            <a:r>
-              <a:rPr lang="en-US" sz="4000" dirty="0"/>
-              <a:t>)</a:t>
-            </a:r>
-            <a:endParaRPr lang="bg-BG" sz="4000" dirty="0"/>
-          </a:p>
-          <a:p>
-            <a:pPr>
-              <a:spcBef>
-                <a:spcPts val="400"/>
-              </a:spcBef>
-              <a:buClr>
-                <a:srgbClr val="224464"/>
-              </a:buClr>
-            </a:pPr>
-            <a:r>
-              <a:rPr lang="bg-BG" sz="4000" dirty="0"/>
-              <a:t>Отчети </a:t>
-            </a:r>
-            <a:r>
-              <a:rPr lang="en-US" sz="4000" dirty="0"/>
-              <a:t>(</a:t>
-            </a:r>
-            <a:r>
-              <a:rPr lang="en-US" sz="4000" b="1" dirty="0">
-                <a:solidFill>
-                  <a:schemeClr val="bg1"/>
-                </a:solidFill>
-              </a:rPr>
-              <a:t>reports</a:t>
-            </a:r>
-            <a:r>
-              <a:rPr lang="en-US" sz="4000" dirty="0"/>
-              <a:t>)</a:t>
-            </a:r>
-            <a:endParaRPr lang="en-US" sz="4000" dirty="0">
-              <a:solidFill>
-                <a:schemeClr val="bg1"/>
-              </a:solidFill>
-            </a:endParaRPr>
-          </a:p>
-        </p:txBody>
-      </p:sp>
-      <p:sp>
-        <p:nvSpPr>
-          <p:cNvPr id="444418" name="Slide Title"/>
-          <p:cNvSpPr>
-            <a:spLocks noGrp="1" noChangeArrowheads="1"/>
-          </p:cNvSpPr>
-          <p:nvPr>
-            <p:ph type="title"/>
-          </p:nvPr>
-        </p:nvSpPr>
-        <p:spPr>
-          <a:xfrm>
-            <a:off x="190405" y="100750"/>
-            <a:ext cx="9669213" cy="882654"/>
-          </a:xfrm>
-        </p:spPr>
-        <p:txBody>
-          <a:bodyPr/>
-          <a:lstStyle/>
-          <a:p>
-            <a:r>
-              <a:rPr lang="bg-BG" dirty="0"/>
-              <a:t>Съдържание</a:t>
-            </a:r>
-          </a:p>
-        </p:txBody>
-      </p:sp>
-      <p:sp>
-        <p:nvSpPr>
-          <p:cNvPr id="2" name="Slide Number">
-            <a:extLst>
-              <a:ext uri="{FF2B5EF4-FFF2-40B4-BE49-F238E27FC236}">
-                <a16:creationId xmlns:a16="http://schemas.microsoft.com/office/drawing/2014/main" id="{395E6BD6-E492-39EC-6BB1-E61467EA7518}"/>
-              </a:ext>
-            </a:extLst>
-          </p:cNvPr>
-          <p:cNvSpPr txBox="1">
-            <a:spLocks/>
-          </p:cNvSpPr>
-          <p:nvPr/>
-        </p:nvSpPr>
-        <p:spPr>
-          <a:xfrm>
-            <a:off x="11753030" y="6507000"/>
-            <a:ext cx="367414" cy="297000"/>
-          </a:xfrm>
-          <a:prstGeom prst="rect">
-            <a:avLst/>
-          </a:prstGeom>
-        </p:spPr>
-        <p:txBody>
-          <a:bodyPr vert="horz" lIns="91440" tIns="45720" rIns="91440" bIns="45720" rtlCol="0" anchor="b"/>
-          <a:lstStyle>
-            <a:defPPr>
-              <a:defRPr lang="en-US"/>
-            </a:defPPr>
-            <a:lvl1pPr marL="0" algn="r" defTabSz="914400" rtl="0" eaLnBrk="1" latinLnBrk="0" hangingPunct="1">
-              <a:defRPr sz="1000" kern="1200">
-                <a:solidFill>
-                  <a:schemeClr val="tx1"/>
-                </a:solidFill>
-                <a:latin typeface="+mn-lt"/>
-                <a:ea typeface="+mn-ea"/>
-                <a:cs typeface="+mn-cs"/>
-              </a:defRPr>
-            </a:lvl1pPr>
-            <a:lvl2pPr marL="457200" algn="l" defTabSz="914400" rtl="0" eaLnBrk="1" latinLnBrk="0" hangingPunct="1">
-              <a:defRPr sz="1800" kern="1200">
-                <a:solidFill>
-                  <a:schemeClr val="tx1"/>
-                </a:solidFill>
-                <a:latin typeface="+mn-lt"/>
-                <a:ea typeface="+mn-ea"/>
-                <a:cs typeface="+mn-cs"/>
-              </a:defRPr>
-            </a:lvl2pPr>
-            <a:lvl3pPr marL="914400" algn="l" defTabSz="914400" rtl="0" eaLnBrk="1" latinLnBrk="0" hangingPunct="1">
-              <a:defRPr sz="1800" kern="1200">
-                <a:solidFill>
-                  <a:schemeClr val="tx1"/>
-                </a:solidFill>
-                <a:latin typeface="+mn-lt"/>
-                <a:ea typeface="+mn-ea"/>
-                <a:cs typeface="+mn-cs"/>
-              </a:defRPr>
-            </a:lvl3pPr>
-            <a:lvl4pPr marL="1371600" algn="l" defTabSz="914400" rtl="0" eaLnBrk="1" latinLnBrk="0" hangingPunct="1">
-              <a:defRPr sz="1800" kern="1200">
-                <a:solidFill>
-                  <a:schemeClr val="tx1"/>
-                </a:solidFill>
-                <a:latin typeface="+mn-lt"/>
-                <a:ea typeface="+mn-ea"/>
-                <a:cs typeface="+mn-cs"/>
-              </a:defRPr>
-            </a:lvl4pPr>
-            <a:lvl5pPr marL="1828800" algn="l" defTabSz="914400" rtl="0" eaLnBrk="1" latinLnBrk="0" hangingPunct="1">
-              <a:defRPr sz="1800" kern="1200">
-                <a:solidFill>
-                  <a:schemeClr val="tx1"/>
-                </a:solidFill>
-                <a:latin typeface="+mn-lt"/>
-                <a:ea typeface="+mn-ea"/>
-                <a:cs typeface="+mn-cs"/>
-              </a:defRPr>
-            </a:lvl5pPr>
-            <a:lvl6pPr marL="2286000" algn="l" defTabSz="914400" rtl="0" eaLnBrk="1" latinLnBrk="0" hangingPunct="1">
-              <a:defRPr sz="1800" kern="1200">
-                <a:solidFill>
-                  <a:schemeClr val="tx1"/>
-                </a:solidFill>
-                <a:latin typeface="+mn-lt"/>
-                <a:ea typeface="+mn-ea"/>
-                <a:cs typeface="+mn-cs"/>
-              </a:defRPr>
-            </a:lvl6pPr>
-            <a:lvl7pPr marL="2743200" algn="l" defTabSz="914400" rtl="0" eaLnBrk="1" latinLnBrk="0" hangingPunct="1">
-              <a:defRPr sz="1800" kern="1200">
-                <a:solidFill>
-                  <a:schemeClr val="tx1"/>
-                </a:solidFill>
-                <a:latin typeface="+mn-lt"/>
-                <a:ea typeface="+mn-ea"/>
-                <a:cs typeface="+mn-cs"/>
-              </a:defRPr>
-            </a:lvl7pPr>
-            <a:lvl8pPr marL="3200400" algn="l" defTabSz="914400" rtl="0" eaLnBrk="1" latinLnBrk="0" hangingPunct="1">
-              <a:defRPr sz="1800" kern="1200">
-                <a:solidFill>
-                  <a:schemeClr val="tx1"/>
-                </a:solidFill>
-                <a:latin typeface="+mn-lt"/>
-                <a:ea typeface="+mn-ea"/>
-                <a:cs typeface="+mn-cs"/>
-              </a:defRPr>
-            </a:lvl8pPr>
-            <a:lvl9pPr marL="3657600" algn="l" defTabSz="914400" rtl="0" eaLnBrk="1" latinLnBrk="0" hangingPunct="1">
-              <a:defRPr sz="1800" kern="1200">
-                <a:solidFill>
-                  <a:schemeClr val="tx1"/>
-                </a:solidFill>
-                <a:latin typeface="+mn-lt"/>
-                <a:ea typeface="+mn-ea"/>
-                <a:cs typeface="+mn-cs"/>
-              </a:defRPr>
-            </a:lvl9pPr>
-          </a:lstStyle>
-          <a:p>
-            <a:fld id="{2BF067CD-8E6B-4360-9AA8-C5DF2A48A6D1}" type="slidenum">
-              <a:rPr lang="en-US" smtClean="0"/>
-              <a:pPr/>
-              <a:t>2</a:t>
-            </a:fld>
-            <a:endParaRPr lang="en-US" dirty="0"/>
-          </a:p>
-        </p:txBody>
-      </p:sp>
-      <p:pic>
-        <p:nvPicPr>
-          <p:cNvPr id="3" name="Picture 2" descr="Finweb Business Consultancy | Microsoft Access Basic">
-            <a:extLst>
-              <a:ext uri="{FF2B5EF4-FFF2-40B4-BE49-F238E27FC236}">
-                <a16:creationId xmlns:a16="http://schemas.microsoft.com/office/drawing/2014/main" id="{1C6409F1-4846-AB10-4605-12BFFBFE45A2}"/>
-              </a:ext>
-            </a:extLst>
-          </p:cNvPr>
-          <p:cNvPicPr>
-            <a:picLocks noChangeAspect="1" noChangeArrowheads="1"/>
-          </p:cNvPicPr>
-          <p:nvPr/>
-        </p:nvPicPr>
-        <p:blipFill>
-          <a:blip r:embed="rId3" cstate="print"/>
-          <a:srcRect/>
-          <a:stretch>
-            <a:fillRect/>
-          </a:stretch>
-        </p:blipFill>
-        <p:spPr bwMode="auto">
-          <a:xfrm>
-            <a:off x="9066000" y="1719000"/>
-            <a:ext cx="2341270" cy="2298620"/>
-          </a:xfrm>
-          <a:prstGeom prst="rect">
-            <a:avLst/>
-          </a:prstGeom>
-          <a:noFill/>
-        </p:spPr>
-      </p:pic>
-    </p:spTree>
-    <p:extLst>
-      <p:ext uri="{BB962C8B-B14F-4D97-AF65-F5344CB8AC3E}">
-        <p14:creationId xmlns:p14="http://schemas.microsoft.com/office/powerpoint/2010/main" val="1148214511"/>
-      </p:ext>
-    </p:extLst>
-  </p:cSld>
-  <p:clrMapOvr>
-    <a:masterClrMapping/>
-  </p:clrMapOvr>
-  <mc:AlternateContent xmlns:mc="http://schemas.openxmlformats.org/markup-compatibility/2006" xmlns:p14="http://schemas.microsoft.com/office/powerpoint/2010/main">
-    <mc:Choice Requires="p14">
-      <p:transition spd="slow" p14:dur="2000" advClick="0" advTm="5000"/>
-    </mc:Choice>
-    <mc:Fallback xmlns="">
-      <p:transition spd="slow" advClick="0" advTm="5000"/>
-    </mc:Fallback>
-  </mc:AlternateContent>
-  <p:timing>
-    <p:tnLst>
-      <p:par>
-        <p:cTn id="1" dur="indefinite" restart="never" nodeType="tmRoot">
-          <p:childTnLst>
-            <p:seq concurrent="1" nextAc="seek">
-              <p:cTn id="2" dur="indefinite" nodeType="mainSeq">
-                <p:childTnLst>
-                  <p:par>
-                    <p:cTn id="3" fill="hold">
-                      <p:stCondLst>
-                        <p:cond delay="indefinite"/>
-                      </p:stCondLst>
-                      <p:childTnLst>
-                        <p:par>
-                          <p:cTn id="4" fill="hold">
-                            <p:stCondLst>
-                              <p:cond delay="0"/>
-                            </p:stCondLst>
-                            <p:childTnLst>
-                              <p:par>
-                                <p:cTn id="5" presetID="1" presetClass="entr" presetSubtype="0" fill="hold" nodeType="clickEffect">
-                                  <p:stCondLst>
-                                    <p:cond delay="0"/>
-                                  </p:stCondLst>
-                                  <p:childTnLst>
-                                    <p:set>
-                                      <p:cBhvr>
-                                        <p:cTn id="6" dur="1" fill="hold">
-                                          <p:stCondLst>
-                                            <p:cond delay="0"/>
-                                          </p:stCondLst>
-                                        </p:cTn>
-                                        <p:tgtEl>
-                                          <p:spTgt spid="444419">
-                                            <p:txEl>
-                                              <p:pRg st="0" end="0"/>
-                                            </p:txEl>
-                                          </p:spTgt>
-                                        </p:tgtEl>
-                                        <p:attrNameLst>
-                                          <p:attrName>style.visibility</p:attrName>
-                                        </p:attrNameLst>
-                                      </p:cBhvr>
-                                      <p:to>
-                                        <p:strVal val="visible"/>
-                                      </p:to>
-                                    </p:set>
-                                  </p:childTnLst>
-                                </p:cTn>
-                              </p:par>
-                              <p:par>
-                                <p:cTn id="7" presetID="1" presetClass="entr" presetSubtype="0" fill="hold" nodeType="withEffect">
-                                  <p:stCondLst>
-                                    <p:cond delay="0"/>
-                                  </p:stCondLst>
-                                  <p:childTnLst>
-                                    <p:set>
-                                      <p:cBhvr>
-                                        <p:cTn id="8" dur="1" fill="hold">
-                                          <p:stCondLst>
-                                            <p:cond delay="0"/>
-                                          </p:stCondLst>
-                                        </p:cTn>
-                                        <p:tgtEl>
-                                          <p:spTgt spid="444419">
-                                            <p:txEl>
-                                              <p:pRg st="1" end="1"/>
-                                            </p:txEl>
-                                          </p:spTgt>
-                                        </p:tgtEl>
-                                        <p:attrNameLst>
-                                          <p:attrName>style.visibility</p:attrName>
-                                        </p:attrNameLst>
-                                      </p:cBhvr>
-                                      <p:to>
-                                        <p:strVal val="visible"/>
-                                      </p:to>
-                                    </p:set>
-                                  </p:childTnLst>
-                                </p:cTn>
-                              </p:par>
-                            </p:childTnLst>
-                          </p:cTn>
-                        </p:par>
-                      </p:childTnLst>
-                    </p:cTn>
-                  </p:par>
-                  <p:par>
-                    <p:cTn id="9" fill="hold">
-                      <p:stCondLst>
-                        <p:cond delay="indefinite"/>
-                      </p:stCondLst>
-                      <p:childTnLst>
-                        <p:par>
-                          <p:cTn id="10" fill="hold">
-                            <p:stCondLst>
-                              <p:cond delay="0"/>
-                            </p:stCondLst>
-                            <p:childTnLst>
-                              <p:par>
-                                <p:cTn id="11" presetID="1" presetClass="entr" presetSubtype="0" fill="hold" nodeType="clickEffect">
-                                  <p:stCondLst>
-                                    <p:cond delay="0"/>
-                                  </p:stCondLst>
-                                  <p:childTnLst>
-                                    <p:set>
-                                      <p:cBhvr>
-                                        <p:cTn id="12" dur="1" fill="hold">
-                                          <p:stCondLst>
-                                            <p:cond delay="0"/>
-                                          </p:stCondLst>
-                                        </p:cTn>
-                                        <p:tgtEl>
-                                          <p:spTgt spid="444419">
-                                            <p:txEl>
-                                              <p:pRg st="2" end="2"/>
-                                            </p:txEl>
-                                          </p:spTgt>
-                                        </p:tgtEl>
-                                        <p:attrNameLst>
-                                          <p:attrName>style.visibility</p:attrName>
-                                        </p:attrNameLst>
-                                      </p:cBhvr>
-                                      <p:to>
-                                        <p:strVal val="visible"/>
-                                      </p:to>
-                                    </p:set>
-                                  </p:childTnLst>
-                                </p:cTn>
-                              </p:par>
-                            </p:childTnLst>
-                          </p:cTn>
-                        </p:par>
-                      </p:childTnLst>
-                    </p:cTn>
-                  </p:par>
-                  <p:par>
-                    <p:cTn id="13" fill="hold">
-                      <p:stCondLst>
-                        <p:cond delay="indefinite"/>
-                      </p:stCondLst>
-                      <p:childTnLst>
-                        <p:par>
-                          <p:cTn id="14" fill="hold">
-                            <p:stCondLst>
-                              <p:cond delay="0"/>
-                            </p:stCondLst>
-                            <p:childTnLst>
-                              <p:par>
-                                <p:cTn id="15" presetID="1" presetClass="entr" presetSubtype="0" fill="hold" nodeType="clickEffect">
-                                  <p:stCondLst>
-                                    <p:cond delay="0"/>
-                                  </p:stCondLst>
-                                  <p:childTnLst>
-                                    <p:set>
-                                      <p:cBhvr>
-                                        <p:cTn id="16" dur="1" fill="hold">
-                                          <p:stCondLst>
-                                            <p:cond delay="0"/>
-                                          </p:stCondLst>
-                                        </p:cTn>
-                                        <p:tgtEl>
-                                          <p:spTgt spid="444419">
-                                            <p:txEl>
-                                              <p:pRg st="3" end="3"/>
-                                            </p:txEl>
-                                          </p:spTgt>
-                                        </p:tgtEl>
-                                        <p:attrNameLst>
-                                          <p:attrName>style.visibility</p:attrName>
-                                        </p:attrNameLst>
-                                      </p:cBhvr>
-                                      <p:to>
-                                        <p:strVal val="visible"/>
-                                      </p:to>
-                                    </p:set>
-                                  </p:childTnLst>
-                                </p:cTn>
-                              </p:par>
-                            </p:childTnLst>
-                          </p:cTn>
-                        </p:par>
-                      </p:childTnLst>
-                    </p:cTn>
-                  </p:par>
-                  <p:par>
-                    <p:cTn id="17" fill="hold">
-                      <p:stCondLst>
-                        <p:cond delay="indefinite"/>
-                      </p:stCondLst>
-                      <p:childTnLst>
-                        <p:par>
-                          <p:cTn id="18" fill="hold">
-                            <p:stCondLst>
-                              <p:cond delay="0"/>
-                            </p:stCondLst>
-                            <p:childTnLst>
-                              <p:par>
-                                <p:cTn id="19" presetID="1" presetClass="entr" presetSubtype="0" fill="hold" nodeType="clickEffect">
-                                  <p:stCondLst>
-                                    <p:cond delay="0"/>
-                                  </p:stCondLst>
-                                  <p:childTnLst>
-                                    <p:set>
-                                      <p:cBhvr>
-                                        <p:cTn id="20" dur="1" fill="hold">
-                                          <p:stCondLst>
-                                            <p:cond delay="0"/>
-                                          </p:stCondLst>
-                                        </p:cTn>
-                                        <p:tgtEl>
-                                          <p:spTgt spid="444419">
-                                            <p:txEl>
-                                              <p:pRg st="4" end="4"/>
-                                            </p:txEl>
-                                          </p:spTgt>
-                                        </p:tgtEl>
-                                        <p:attrNameLst>
-                                          <p:attrName>style.visibility</p:attrName>
-                                        </p:attrNameLst>
-                                      </p:cBhvr>
-                                      <p:to>
-                                        <p:strVal val="visible"/>
-                                      </p:to>
-                                    </p:set>
-                                  </p:childTnLst>
-                                </p:cTn>
-                              </p:par>
-                            </p:childTnLst>
-                          </p:cTn>
-                        </p:par>
-                      </p:childTnLst>
-                    </p:cTn>
-                  </p:par>
-                </p:childTnLst>
-              </p:cTn>
-              <p:prevCondLst>
-                <p:cond evt="onPrev" delay="0">
-                  <p:tgtEl>
-                    <p:sldTgt/>
-                  </p:tgtEl>
-                </p:cond>
-              </p:prevCondLst>
-              <p:nextCondLst>
-                <p:cond evt="onNext" delay="0">
-                  <p:tgtEl>
-                    <p:sldTgt/>
-                  </p:tgtEl>
-                </p:cond>
-              </p:nextCondLst>
-            </p:seq>
-          </p:childTnLst>
-        </p:cTn>
-      </p:par>
-    </p:tnLst>
-  </p:timing>
-</p:sld>
-</file>
-
-<file path=ppt/slides/slide20.xml><?xml version="1.0" encoding="utf-8"?>
+<file path=ppt/slides/slide21.xml><?xml version="1.0" encoding="utf-8"?>
 <p:sld xmlns:a="http://schemas.openxmlformats.org/drawingml/2006/main" xmlns:r="http://schemas.openxmlformats.org/officeDocument/2006/relationships" xmlns:p="http://schemas.openxmlformats.org/presentationml/2006/main">
   <p:cSld>
     <p:spTree>
@@ -12038,7 +13389,7 @@
             <a:fld id="{2BF067CD-8E6B-4360-9AA8-C5DF2A48A6D1}" type="slidenum">
               <a:rPr lang="en-US" noProof="0" smtClean="0"/>
               <a:pPr/>
-              <a:t>20</a:t>
+              <a:t>21</a:t>
             </a:fld>
             <a:endParaRPr lang="en-US" noProof="0" dirty="0"/>
           </a:p>
@@ -12171,7 +13522,7 @@
 </p:sld>
 </file>
 
-<file path=ppt/slides/slide21.xml><?xml version="1.0" encoding="utf-8"?>
+<file path=ppt/slides/slide22.xml><?xml version="1.0" encoding="utf-8"?>
 <p:sld xmlns:a="http://schemas.openxmlformats.org/drawingml/2006/main" xmlns:r="http://schemas.openxmlformats.org/officeDocument/2006/relationships" xmlns:p="http://schemas.openxmlformats.org/presentationml/2006/main">
   <p:cSld>
     <p:spTree>
@@ -12445,7 +13796,7 @@
             <a:fld id="{2BF067CD-8E6B-4360-9AA8-C5DF2A48A6D1}" type="slidenum">
               <a:rPr lang="en-US" noProof="0" smtClean="0"/>
               <a:pPr/>
-              <a:t>21</a:t>
+              <a:t>22</a:t>
             </a:fld>
             <a:endParaRPr lang="en-US" noProof="0" dirty="0"/>
           </a:p>
@@ -12654,7 +14005,7 @@
 </p:sld>
 </file>
 
-<file path=ppt/slides/slide22.xml><?xml version="1.0" encoding="utf-8"?>
+<file path=ppt/slides/slide23.xml><?xml version="1.0" encoding="utf-8"?>
 <p:sld xmlns:a="http://schemas.openxmlformats.org/drawingml/2006/main" xmlns:r="http://schemas.openxmlformats.org/officeDocument/2006/relationships" xmlns:p="http://schemas.openxmlformats.org/presentationml/2006/main">
   <p:cSld>
     <p:spTree>
@@ -12784,7 +14135,7 @@
 </p:sld>
 </file>
 
-<file path=ppt/slides/slide23.xml><?xml version="1.0" encoding="utf-8"?>
+<file path=ppt/slides/slide24.xml><?xml version="1.0" encoding="utf-8"?>
 <p:sld xmlns:a="http://schemas.openxmlformats.org/drawingml/2006/main" xmlns:r="http://schemas.openxmlformats.org/officeDocument/2006/relationships" xmlns:p="http://schemas.openxmlformats.org/presentationml/2006/main">
   <p:cSld>
     <p:spTree>
@@ -13083,7 +14434,7 @@
             <a:fld id="{2BF067CD-8E6B-4360-9AA8-C5DF2A48A6D1}" type="slidenum">
               <a:rPr lang="en-US" noProof="0" smtClean="0"/>
               <a:pPr/>
-              <a:t>23</a:t>
+              <a:t>24</a:t>
             </a:fld>
             <a:endParaRPr lang="en-US" noProof="0" dirty="0"/>
           </a:p>
@@ -13336,7 +14687,7 @@
 </p:sld>
 </file>
 
-<file path=ppt/slides/slide24.xml><?xml version="1.0" encoding="utf-8"?>
+<file path=ppt/slides/slide25.xml><?xml version="1.0" encoding="utf-8"?>
 <p:sld xmlns:a="http://schemas.openxmlformats.org/drawingml/2006/main" xmlns:r="http://schemas.openxmlformats.org/officeDocument/2006/relationships" xmlns:p="http://schemas.openxmlformats.org/presentationml/2006/main">
   <p:cSld>
     <p:spTree>
@@ -13670,7 +15021,7 @@
             <a:fld id="{2BF067CD-8E6B-4360-9AA8-C5DF2A48A6D1}" type="slidenum">
               <a:rPr lang="en-US" noProof="0" smtClean="0"/>
               <a:pPr/>
-              <a:t>24</a:t>
+              <a:t>25</a:t>
             </a:fld>
             <a:endParaRPr lang="en-US" noProof="0" dirty="0"/>
           </a:p>
@@ -13874,7 +15225,7 @@
 </p:sld>
 </file>
 
-<file path=ppt/slides/slide25.xml><?xml version="1.0" encoding="utf-8"?>
+<file path=ppt/slides/slide26.xml><?xml version="1.0" encoding="utf-8"?>
 <p:sld xmlns:a="http://schemas.openxmlformats.org/drawingml/2006/main" xmlns:r="http://schemas.openxmlformats.org/officeDocument/2006/relationships" xmlns:p="http://schemas.openxmlformats.org/presentationml/2006/main">
   <p:cSld>
     <p:spTree>
@@ -14100,7 +15451,7 @@
             <a:fld id="{2BF067CD-8E6B-4360-9AA8-C5DF2A48A6D1}" type="slidenum">
               <a:rPr lang="en-US" noProof="0" smtClean="0"/>
               <a:pPr/>
-              <a:t>25</a:t>
+              <a:t>26</a:t>
             </a:fld>
             <a:endParaRPr lang="en-US" noProof="0" dirty="0"/>
           </a:p>
@@ -14206,7 +15557,7 @@
 </p:sld>
 </file>
 
-<file path=ppt/slides/slide26.xml><?xml version="1.0" encoding="utf-8"?>
+<file path=ppt/slides/slide27.xml><?xml version="1.0" encoding="utf-8"?>
 <p:sld xmlns:a="http://schemas.openxmlformats.org/drawingml/2006/main" xmlns:r="http://schemas.openxmlformats.org/officeDocument/2006/relationships" xmlns:p="http://schemas.openxmlformats.org/presentationml/2006/main">
   <p:cSld>
     <p:spTree>
@@ -16293,7 +17644,7 @@
             <a:fld id="{2BF067CD-8E6B-4360-9AA8-C5DF2A48A6D1}" type="slidenum">
               <a:rPr lang="en-US" noProof="0" smtClean="0"/>
               <a:pPr/>
-              <a:t>26</a:t>
+              <a:t>27</a:t>
             </a:fld>
             <a:endParaRPr lang="en-US" noProof="0" dirty="0"/>
           </a:p>
@@ -16320,7 +17671,7 @@
 </p:sld>
 </file>
 
-<file path=ppt/slides/slide27.xml><?xml version="1.0" encoding="utf-8"?>
+<file path=ppt/slides/slide28.xml><?xml version="1.0" encoding="utf-8"?>
 <p:sld xmlns:a="http://schemas.openxmlformats.org/drawingml/2006/main" xmlns:r="http://schemas.openxmlformats.org/officeDocument/2006/relationships" xmlns:p="http://schemas.openxmlformats.org/presentationml/2006/main">
   <p:cSld>
     <p:spTree>
@@ -16580,7 +17931,7 @@
             <a:fld id="{2BF067CD-8E6B-4360-9AA8-C5DF2A48A6D1}" type="slidenum">
               <a:rPr lang="en-US" noProof="0" smtClean="0"/>
               <a:pPr/>
-              <a:t>27</a:t>
+              <a:t>28</a:t>
             </a:fld>
             <a:endParaRPr lang="en-US" noProof="0" dirty="0"/>
           </a:p>
@@ -16762,7 +18113,7 @@
 </p:sld>
 </file>
 
-<file path=ppt/slides/slide28.xml><?xml version="1.0" encoding="utf-8"?>
+<file path=ppt/slides/slide29.xml><?xml version="1.0" encoding="utf-8"?>
 <p:sld xmlns:a="http://schemas.openxmlformats.org/drawingml/2006/main" xmlns:r="http://schemas.openxmlformats.org/officeDocument/2006/relationships" xmlns:p="http://schemas.openxmlformats.org/presentationml/2006/main">
   <p:cSld>
     <p:spTree>
@@ -17023,7 +18374,7 @@
             <a:fld id="{2BF067CD-8E6B-4360-9AA8-C5DF2A48A6D1}" type="slidenum">
               <a:rPr lang="en-US" noProof="0" smtClean="0"/>
               <a:pPr/>
-              <a:t>28</a:t>
+              <a:t>29</a:t>
             </a:fld>
             <a:endParaRPr lang="en-US" noProof="0" dirty="0"/>
           </a:p>
@@ -17307,7 +18658,137 @@
 </p:sld>
 </file>
 
-<file path=ppt/slides/slide29.xml><?xml version="1.0" encoding="utf-8"?>
+<file path=ppt/slides/slide3.xml><?xml version="1.0" encoding="utf-8"?>
+<p:sld xmlns:a="http://schemas.openxmlformats.org/drawingml/2006/main" xmlns:r="http://schemas.openxmlformats.org/officeDocument/2006/relationships" xmlns:p="http://schemas.openxmlformats.org/presentationml/2006/main">
+  <p:cSld>
+    <p:spTree>
+      <p:nvGrpSpPr>
+        <p:cNvPr id="1" name=""/>
+        <p:cNvGrpSpPr/>
+        <p:nvPr/>
+      </p:nvGrpSpPr>
+      <p:grpSpPr>
+        <a:xfrm>
+          <a:off x="0" y="0"/>
+          <a:ext cx="0" cy="0"/>
+          <a:chOff x="0" y="0"/>
+          <a:chExt cx="0" cy="0"/>
+        </a:xfrm>
+      </p:grpSpPr>
+      <p:pic>
+        <p:nvPicPr>
+          <p:cNvPr id="8" name="Picture 14" descr="Business, search, database search, databases, db Icon in Pretty Office 3  Icons"/>
+          <p:cNvPicPr>
+            <a:picLocks noChangeAspect="1" noChangeArrowheads="1"/>
+          </p:cNvPicPr>
+          <p:nvPr/>
+        </p:nvPicPr>
+        <p:blipFill>
+          <a:blip r:embed="rId2" cstate="print"/>
+          <a:srcRect/>
+          <a:stretch>
+            <a:fillRect/>
+          </a:stretch>
+        </p:blipFill>
+        <p:spPr bwMode="auto">
+          <a:xfrm>
+            <a:off x="4800600" y="1371600"/>
+            <a:ext cx="2438400" cy="2438400"/>
+          </a:xfrm>
+          <a:prstGeom prst="rect">
+            <a:avLst/>
+          </a:prstGeom>
+          <a:noFill/>
+        </p:spPr>
+      </p:pic>
+      <p:sp>
+        <p:nvSpPr>
+          <p:cNvPr id="3" name="Subtitle 2">
+            <a:extLst>
+              <a:ext uri="{FF2B5EF4-FFF2-40B4-BE49-F238E27FC236}">
+                <a16:creationId xmlns:a16="http://schemas.microsoft.com/office/drawing/2014/main" id="{4806D0E4-A78E-F457-4E0B-2A2925EB2193}"/>
+              </a:ext>
+            </a:extLst>
+          </p:cNvPr>
+          <p:cNvSpPr>
+            <a:spLocks noGrp="1"/>
+          </p:cNvSpPr>
+          <p:nvPr>
+            <p:ph type="subTitle" sz="quarter" idx="11"/>
+          </p:nvPr>
+        </p:nvSpPr>
+        <p:spPr/>
+        <p:txBody>
+          <a:bodyPr/>
+          <a:lstStyle/>
+          <a:p>
+            <a:r>
+              <a:rPr lang="en-US" dirty="0"/>
+              <a:t>Employees.accdb</a:t>
+            </a:r>
+          </a:p>
+        </p:txBody>
+      </p:sp>
+      <p:sp>
+        <p:nvSpPr>
+          <p:cNvPr id="4" name="Заглавие 3">
+            <a:extLst>
+              <a:ext uri="{FF2B5EF4-FFF2-40B4-BE49-F238E27FC236}">
+                <a16:creationId xmlns:a16="http://schemas.microsoft.com/office/drawing/2014/main" id="{2829BCA0-DE74-B9D4-97E6-AD634E15716A}"/>
+              </a:ext>
+            </a:extLst>
+          </p:cNvPr>
+          <p:cNvSpPr>
+            <a:spLocks noGrp="1"/>
+          </p:cNvSpPr>
+          <p:nvPr>
+            <p:ph type="title" sz="quarter" idx="10"/>
+          </p:nvPr>
+        </p:nvSpPr>
+        <p:spPr>
+          <a:xfrm>
+            <a:off x="615109" y="4704825"/>
+            <a:ext cx="10961783" cy="768084"/>
+          </a:xfrm>
+        </p:spPr>
+        <p:txBody>
+          <a:bodyPr/>
+          <a:lstStyle/>
+          <a:p>
+            <a:r>
+              <a:rPr lang="bg-BG" dirty="0"/>
+              <a:t>База данни </a:t>
+            </a:r>
+            <a:r>
+              <a:rPr lang="en-US" dirty="0"/>
+              <a:t>Employees</a:t>
+            </a:r>
+            <a:endParaRPr lang="bg-BG" dirty="0"/>
+          </a:p>
+        </p:txBody>
+      </p:sp>
+    </p:spTree>
+    <p:extLst>
+      <p:ext uri="{BB962C8B-B14F-4D97-AF65-F5344CB8AC3E}">
+        <p14:creationId xmlns:p14="http://schemas.microsoft.com/office/powerpoint/2010/main" val="849526289"/>
+      </p:ext>
+    </p:extLst>
+  </p:cSld>
+  <p:clrMapOvr>
+    <a:masterClrMapping/>
+  </p:clrMapOvr>
+  <mc:AlternateContent xmlns:mc="http://schemas.openxmlformats.org/markup-compatibility/2006" xmlns:p14="http://schemas.microsoft.com/office/powerpoint/2010/main">
+    <mc:Choice Requires="p14">
+      <p:transition spd="slow" p14:dur="2000" advClick="0" advTm="5000"/>
+    </mc:Choice>
+    <mc:Fallback xmlns="">
+      <p:transition spd="slow" advClick="0" advTm="5000"/>
+    </mc:Fallback>
+  </mc:AlternateContent>
+</p:sld>
+</file>
+
+<file path=ppt/slides/slide30.xml><?xml version="1.0" encoding="utf-8"?>
 <p:sld xmlns:a="http://schemas.openxmlformats.org/drawingml/2006/main" xmlns:r="http://schemas.openxmlformats.org/officeDocument/2006/relationships" xmlns:p="http://schemas.openxmlformats.org/presentationml/2006/main">
   <p:cSld>
     <p:spTree>
@@ -18175,7 +19656,7 @@
             <a:fld id="{2BF067CD-8E6B-4360-9AA8-C5DF2A48A6D1}" type="slidenum">
               <a:rPr lang="en-US" noProof="0" smtClean="0"/>
               <a:pPr/>
-              <a:t>29</a:t>
+              <a:t>30</a:t>
             </a:fld>
             <a:endParaRPr lang="en-US" noProof="0" dirty="0"/>
           </a:p>
@@ -18508,137 +19989,7 @@
 </p:sld>
 </file>
 
-<file path=ppt/slides/slide3.xml><?xml version="1.0" encoding="utf-8"?>
-<p:sld xmlns:a="http://schemas.openxmlformats.org/drawingml/2006/main" xmlns:r="http://schemas.openxmlformats.org/officeDocument/2006/relationships" xmlns:p="http://schemas.openxmlformats.org/presentationml/2006/main">
-  <p:cSld>
-    <p:spTree>
-      <p:nvGrpSpPr>
-        <p:cNvPr id="1" name=""/>
-        <p:cNvGrpSpPr/>
-        <p:nvPr/>
-      </p:nvGrpSpPr>
-      <p:grpSpPr>
-        <a:xfrm>
-          <a:off x="0" y="0"/>
-          <a:ext cx="0" cy="0"/>
-          <a:chOff x="0" y="0"/>
-          <a:chExt cx="0" cy="0"/>
-        </a:xfrm>
-      </p:grpSpPr>
-      <p:pic>
-        <p:nvPicPr>
-          <p:cNvPr id="8" name="Picture 14" descr="Business, search, database search, databases, db Icon in Pretty Office 3  Icons"/>
-          <p:cNvPicPr>
-            <a:picLocks noChangeAspect="1" noChangeArrowheads="1"/>
-          </p:cNvPicPr>
-          <p:nvPr/>
-        </p:nvPicPr>
-        <p:blipFill>
-          <a:blip r:embed="rId2" cstate="print"/>
-          <a:srcRect/>
-          <a:stretch>
-            <a:fillRect/>
-          </a:stretch>
-        </p:blipFill>
-        <p:spPr bwMode="auto">
-          <a:xfrm>
-            <a:off x="4800600" y="1371600"/>
-            <a:ext cx="2438400" cy="2438400"/>
-          </a:xfrm>
-          <a:prstGeom prst="rect">
-            <a:avLst/>
-          </a:prstGeom>
-          <a:noFill/>
-        </p:spPr>
-      </p:pic>
-      <p:sp>
-        <p:nvSpPr>
-          <p:cNvPr id="3" name="Subtitle 2">
-            <a:extLst>
-              <a:ext uri="{FF2B5EF4-FFF2-40B4-BE49-F238E27FC236}">
-                <a16:creationId xmlns:a16="http://schemas.microsoft.com/office/drawing/2014/main" id="{4806D0E4-A78E-F457-4E0B-2A2925EB2193}"/>
-              </a:ext>
-            </a:extLst>
-          </p:cNvPr>
-          <p:cNvSpPr>
-            <a:spLocks noGrp="1"/>
-          </p:cNvSpPr>
-          <p:nvPr>
-            <p:ph type="subTitle" sz="quarter" idx="11"/>
-          </p:nvPr>
-        </p:nvSpPr>
-        <p:spPr/>
-        <p:txBody>
-          <a:bodyPr/>
-          <a:lstStyle/>
-          <a:p>
-            <a:r>
-              <a:rPr lang="en-US" dirty="0"/>
-              <a:t>Employees.accdb</a:t>
-            </a:r>
-          </a:p>
-        </p:txBody>
-      </p:sp>
-      <p:sp>
-        <p:nvSpPr>
-          <p:cNvPr id="4" name="Заглавие 3">
-            <a:extLst>
-              <a:ext uri="{FF2B5EF4-FFF2-40B4-BE49-F238E27FC236}">
-                <a16:creationId xmlns:a16="http://schemas.microsoft.com/office/drawing/2014/main" id="{2829BCA0-DE74-B9D4-97E6-AD634E15716A}"/>
-              </a:ext>
-            </a:extLst>
-          </p:cNvPr>
-          <p:cNvSpPr>
-            <a:spLocks noGrp="1"/>
-          </p:cNvSpPr>
-          <p:nvPr>
-            <p:ph type="title" sz="quarter" idx="10"/>
-          </p:nvPr>
-        </p:nvSpPr>
-        <p:spPr>
-          <a:xfrm>
-            <a:off x="615109" y="4704825"/>
-            <a:ext cx="10961783" cy="768084"/>
-          </a:xfrm>
-        </p:spPr>
-        <p:txBody>
-          <a:bodyPr/>
-          <a:lstStyle/>
-          <a:p>
-            <a:r>
-              <a:rPr lang="bg-BG" dirty="0"/>
-              <a:t>База данни </a:t>
-            </a:r>
-            <a:r>
-              <a:rPr lang="en-US" dirty="0"/>
-              <a:t>Employees</a:t>
-            </a:r>
-            <a:endParaRPr lang="bg-BG" dirty="0"/>
-          </a:p>
-        </p:txBody>
-      </p:sp>
-    </p:spTree>
-    <p:extLst>
-      <p:ext uri="{BB962C8B-B14F-4D97-AF65-F5344CB8AC3E}">
-        <p14:creationId xmlns:p14="http://schemas.microsoft.com/office/powerpoint/2010/main" val="849526289"/>
-      </p:ext>
-    </p:extLst>
-  </p:cSld>
-  <p:clrMapOvr>
-    <a:masterClrMapping/>
-  </p:clrMapOvr>
-  <mc:AlternateContent xmlns:mc="http://schemas.openxmlformats.org/markup-compatibility/2006" xmlns:p14="http://schemas.microsoft.com/office/powerpoint/2010/main">
-    <mc:Choice Requires="p14">
-      <p:transition spd="slow" p14:dur="2000" advClick="0" advTm="5000"/>
-    </mc:Choice>
-    <mc:Fallback xmlns="">
-      <p:transition spd="slow" advClick="0" advTm="5000"/>
-    </mc:Fallback>
-  </mc:AlternateContent>
-</p:sld>
-</file>
-
-<file path=ppt/slides/slide30.xml><?xml version="1.0" encoding="utf-8"?>
+<file path=ppt/slides/slide31.xml><?xml version="1.0" encoding="utf-8"?>
 <p:sld xmlns:a="http://schemas.openxmlformats.org/drawingml/2006/main" xmlns:r="http://schemas.openxmlformats.org/officeDocument/2006/relationships" xmlns:p="http://schemas.openxmlformats.org/presentationml/2006/main">
   <p:cSld>
     <p:spTree>
@@ -18828,7 +20179,7 @@
 </p:sld>
 </file>
 
-<file path=ppt/slides/slide31.xml><?xml version="1.0" encoding="utf-8"?>
+<file path=ppt/slides/slide32.xml><?xml version="1.0" encoding="utf-8"?>
 <p:sld xmlns:a="http://schemas.openxmlformats.org/drawingml/2006/main" xmlns:r="http://schemas.openxmlformats.org/officeDocument/2006/relationships" xmlns:p="http://schemas.openxmlformats.org/presentationml/2006/main">
   <p:cSld>
     <p:spTree>
@@ -19184,7 +20535,7 @@
             <a:fld id="{2BF067CD-8E6B-4360-9AA8-C5DF2A48A6D1}" type="slidenum">
               <a:rPr lang="en-US" noProof="0" smtClean="0"/>
               <a:pPr/>
-              <a:t>31</a:t>
+              <a:t>32</a:t>
             </a:fld>
             <a:endParaRPr lang="en-US" noProof="0" dirty="0"/>
           </a:p>
@@ -19280,61 +20631,85 @@
           <a:lstStyle/>
           <a:p>
             <a:r>
-              <a:rPr lang="bg-BG" dirty="0"/>
+              <a:rPr lang="bg-BG" sz="3600" dirty="0"/>
               <a:t>За целите на днешния урок ще използваме </a:t>
             </a:r>
             <a:r>
-              <a:rPr lang="en-US" dirty="0"/>
+              <a:rPr lang="en-US" sz="3600" dirty="0"/>
               <a:t>MS Access </a:t>
             </a:r>
             <a:r>
-              <a:rPr lang="bg-BG" dirty="0"/>
-              <a:t>база данни </a:t>
-            </a:r>
-            <a:r>
-              <a:rPr lang="en-US" b="1" dirty="0"/>
+              <a:rPr lang="bg-BG" sz="3600" dirty="0"/>
+              <a:t>базата данни </a:t>
+            </a:r>
+            <a:r>
+              <a:rPr lang="en-US" sz="3600" b="1" dirty="0"/>
               <a:t>Employees.accdb</a:t>
             </a:r>
           </a:p>
           <a:p>
-            <a:pPr lvl="1"/>
-            <a:r>
-              <a:rPr lang="en-US" b="1" dirty="0"/>
+            <a:pPr lvl="1">
+              <a:buClr>
+                <a:schemeClr val="tx1"/>
+              </a:buClr>
+            </a:pPr>
+            <a:r>
+              <a:rPr lang="en-US" sz="3400" b="1" dirty="0">
+                <a:solidFill>
+                  <a:schemeClr val="bg1"/>
+                </a:solidFill>
+              </a:rPr>
               <a:t>Employees</a:t>
             </a:r>
             <a:r>
-              <a:rPr lang="bg-BG" dirty="0"/>
+              <a:rPr lang="bg-BG" sz="3400" dirty="0"/>
               <a:t> – съдържа служители по отдели, градове и заплати</a:t>
             </a:r>
-            <a:endParaRPr lang="en-US" dirty="0"/>
-          </a:p>
-          <a:p>
-            <a:pPr lvl="1"/>
-            <a:r>
-              <a:rPr lang="en-US" b="1" dirty="0"/>
+            <a:endParaRPr lang="en-US" sz="3400" dirty="0"/>
+          </a:p>
+          <a:p>
+            <a:pPr lvl="1">
+              <a:buClr>
+                <a:schemeClr val="tx1"/>
+              </a:buClr>
+            </a:pPr>
+            <a:r>
+              <a:rPr lang="en-US" sz="3400" b="1" dirty="0">
+                <a:solidFill>
+                  <a:schemeClr val="bg1"/>
+                </a:solidFill>
+              </a:rPr>
               <a:t>Students</a:t>
             </a:r>
             <a:r>
-              <a:rPr lang="en-US" dirty="0"/>
+              <a:rPr lang="en-US" sz="3400" dirty="0"/>
               <a:t> – </a:t>
             </a:r>
             <a:r>
-              <a:rPr lang="bg-BG" dirty="0"/>
+              <a:rPr lang="bg-BG" sz="3400" dirty="0"/>
               <a:t>съдържа студенти</a:t>
             </a:r>
-            <a:endParaRPr lang="en-US" dirty="0"/>
-          </a:p>
-          <a:p>
-            <a:pPr lvl="1"/>
-            <a:r>
-              <a:rPr lang="en-US" b="1" dirty="0"/>
+            <a:endParaRPr lang="en-US" sz="3400" dirty="0"/>
+          </a:p>
+          <a:p>
+            <a:pPr lvl="1">
+              <a:buClr>
+                <a:schemeClr val="tx1"/>
+              </a:buClr>
+            </a:pPr>
+            <a:r>
+              <a:rPr lang="en-US" sz="3400" b="1" dirty="0">
+                <a:solidFill>
+                  <a:schemeClr val="bg1"/>
+                </a:solidFill>
+              </a:rPr>
               <a:t>Towns</a:t>
             </a:r>
             <a:r>
-              <a:rPr lang="bg-BG" dirty="0"/>
+              <a:rPr lang="bg-BG" sz="3400" dirty="0"/>
               <a:t> – съдържа градове</a:t>
             </a:r>
-            <a:endParaRPr lang="en-US" dirty="0"/>
+            <a:endParaRPr lang="en-US" sz="3400" dirty="0"/>
           </a:p>
         </p:txBody>
       </p:sp>
@@ -19396,6 +20771,134 @@
       <p:transition spd="slow" advClick="0" advTm="5000"/>
     </mc:Fallback>
   </mc:AlternateContent>
+  <p:timing>
+    <p:tnLst>
+      <p:par>
+        <p:cTn id="1" dur="indefinite" restart="never" nodeType="tmRoot">
+          <p:childTnLst>
+            <p:seq concurrent="1" nextAc="seek">
+              <p:cTn id="2" dur="indefinite" nodeType="mainSeq">
+                <p:childTnLst>
+                  <p:par>
+                    <p:cTn id="3" fill="hold">
+                      <p:stCondLst>
+                        <p:cond delay="indefinite"/>
+                      </p:stCondLst>
+                      <p:childTnLst>
+                        <p:par>
+                          <p:cTn id="4" fill="hold">
+                            <p:stCondLst>
+                              <p:cond delay="0"/>
+                            </p:stCondLst>
+                            <p:childTnLst>
+                              <p:par>
+                                <p:cTn id="5" presetID="1" presetClass="entr" presetSubtype="0" fill="hold" nodeType="clickEffect">
+                                  <p:stCondLst>
+                                    <p:cond delay="0"/>
+                                  </p:stCondLst>
+                                  <p:childTnLst>
+                                    <p:set>
+                                      <p:cBhvr>
+                                        <p:cTn id="6" dur="1" fill="hold">
+                                          <p:stCondLst>
+                                            <p:cond delay="0"/>
+                                          </p:stCondLst>
+                                        </p:cTn>
+                                        <p:tgtEl>
+                                          <p:spTgt spid="3">
+                                            <p:txEl>
+                                              <p:pRg st="2" end="2"/>
+                                            </p:txEl>
+                                          </p:spTgt>
+                                        </p:tgtEl>
+                                        <p:attrNameLst>
+                                          <p:attrName>style.visibility</p:attrName>
+                                        </p:attrNameLst>
+                                      </p:cBhvr>
+                                      <p:to>
+                                        <p:strVal val="visible"/>
+                                      </p:to>
+                                    </p:set>
+                                  </p:childTnLst>
+                                </p:cTn>
+                              </p:par>
+                            </p:childTnLst>
+                          </p:cTn>
+                        </p:par>
+                      </p:childTnLst>
+                    </p:cTn>
+                  </p:par>
+                  <p:par>
+                    <p:cTn id="7" fill="hold">
+                      <p:stCondLst>
+                        <p:cond delay="indefinite"/>
+                      </p:stCondLst>
+                      <p:childTnLst>
+                        <p:par>
+                          <p:cTn id="8" fill="hold">
+                            <p:stCondLst>
+                              <p:cond delay="0"/>
+                            </p:stCondLst>
+                            <p:childTnLst>
+                              <p:par>
+                                <p:cTn id="9" presetID="1" presetClass="entr" presetSubtype="0" fill="hold" nodeType="clickEffect">
+                                  <p:stCondLst>
+                                    <p:cond delay="0"/>
+                                  </p:stCondLst>
+                                  <p:childTnLst>
+                                    <p:set>
+                                      <p:cBhvr>
+                                        <p:cTn id="10" dur="1" fill="hold">
+                                          <p:stCondLst>
+                                            <p:cond delay="0"/>
+                                          </p:stCondLst>
+                                        </p:cTn>
+                                        <p:tgtEl>
+                                          <p:spTgt spid="3">
+                                            <p:txEl>
+                                              <p:pRg st="3" end="3"/>
+                                            </p:txEl>
+                                          </p:spTgt>
+                                        </p:tgtEl>
+                                        <p:attrNameLst>
+                                          <p:attrName>style.visibility</p:attrName>
+                                        </p:attrNameLst>
+                                      </p:cBhvr>
+                                      <p:to>
+                                        <p:strVal val="visible"/>
+                                      </p:to>
+                                    </p:set>
+                                  </p:childTnLst>
+                                </p:cTn>
+                              </p:par>
+                            </p:childTnLst>
+                          </p:cTn>
+                        </p:par>
+                      </p:childTnLst>
+                    </p:cTn>
+                  </p:par>
+                </p:childTnLst>
+              </p:cTn>
+              <p:prevCondLst>
+                <p:cond evt="onPrev" delay="0">
+                  <p:tgtEl>
+                    <p:sldTgt/>
+                  </p:tgtEl>
+                </p:cond>
+              </p:prevCondLst>
+              <p:nextCondLst>
+                <p:cond evt="onNext" delay="0">
+                  <p:tgtEl>
+                    <p:sldTgt/>
+                  </p:tgtEl>
+                </p:cond>
+              </p:nextCondLst>
+            </p:seq>
+          </p:childTnLst>
+        </p:cTn>
+      </p:par>
+    </p:tnLst>
+  </p:timing>
 </p:sld>
 </file>
 
@@ -20004,7 +21507,7 @@
               <a:rPr lang="en-US" sz="2800" dirty="0"/>
             </a:br>
             <a:r>
-              <a:rPr lang="ru-RU" sz="2800" dirty="0" err="1"/>
+              <a:rPr lang="bg-BG" sz="2800" dirty="0"/>
               <a:t>които</a:t>
             </a:r>
             <a:r>
@@ -20507,6 +22010,43 @@
           <a:chExt cx="0" cy="0"/>
         </a:xfrm>
       </p:grpSpPr>
+      <p:pic>
+        <p:nvPicPr>
+          <p:cNvPr id="13" name="Picture 12">
+            <a:extLst>
+              <a:ext uri="{FF2B5EF4-FFF2-40B4-BE49-F238E27FC236}">
+                <a16:creationId xmlns:a16="http://schemas.microsoft.com/office/drawing/2014/main" id="{A24AD2B1-5266-D22F-2681-52483D7F4360}"/>
+              </a:ext>
+            </a:extLst>
+          </p:cNvPr>
+          <p:cNvPicPr>
+            <a:picLocks noChangeAspect="1"/>
+          </p:cNvPicPr>
+          <p:nvPr/>
+        </p:nvPicPr>
+        <p:blipFill>
+          <a:blip r:embed="rId2"/>
+          <a:stretch>
+            <a:fillRect/>
+          </a:stretch>
+        </p:blipFill>
+        <p:spPr>
+          <a:xfrm>
+            <a:off x="3118973" y="1629000"/>
+            <a:ext cx="5954054" cy="4662502"/>
+          </a:xfrm>
+          <a:prstGeom prst="rect">
+            <a:avLst/>
+          </a:prstGeom>
+          <a:ln>
+            <a:solidFill>
+              <a:schemeClr val="bg2">
+                <a:lumMod val="75000"/>
+              </a:schemeClr>
+            </a:solidFill>
+          </a:ln>
+        </p:spPr>
+      </p:pic>
       <p:sp>
         <p:nvSpPr>
           <p:cNvPr id="4" name="Title 3"/>
@@ -20541,39 +22081,48 @@
           </a:p>
         </p:txBody>
       </p:sp>
-      <p:pic>
-        <p:nvPicPr>
-          <p:cNvPr id="5" name="Picture 2" descr="In the Simple Query Wizard dialog box, select the fields you want to use."/>
-          <p:cNvPicPr>
-            <a:picLocks noChangeAspect="1" noChangeArrowheads="1"/>
-          </p:cNvPicPr>
-          <p:nvPr/>
-        </p:nvPicPr>
-        <p:blipFill>
-          <a:blip r:embed="rId2" cstate="print"/>
-          <a:srcRect/>
-          <a:stretch>
-            <a:fillRect/>
-          </a:stretch>
-        </p:blipFill>
-        <p:spPr bwMode="auto">
+      <p:sp>
+        <p:nvSpPr>
+          <p:cNvPr id="3" name="Slide Number">
+            <a:extLst>
+              <a:ext uri="{FF2B5EF4-FFF2-40B4-BE49-F238E27FC236}">
+                <a16:creationId xmlns:a16="http://schemas.microsoft.com/office/drawing/2014/main" id="{5517F8A4-700B-775C-AD3C-F1446322B989}"/>
+              </a:ext>
+            </a:extLst>
+          </p:cNvPr>
+          <p:cNvSpPr>
+            <a:spLocks noGrp="1"/>
+          </p:cNvSpPr>
+          <p:nvPr>
+            <p:ph type="sldNum" sz="quarter" idx="5"/>
+          </p:nvPr>
+        </p:nvSpPr>
+        <p:spPr>
           <a:xfrm>
-            <a:off x="2822829" y="1501380"/>
-            <a:ext cx="6546342" cy="4942620"/>
+            <a:off x="11753030" y="6507000"/>
+            <a:ext cx="367414" cy="297000"/>
           </a:xfrm>
           <a:prstGeom prst="rect">
             <a:avLst/>
           </a:prstGeom>
-          <a:noFill/>
-          <a:ln>
-            <a:solidFill>
-              <a:schemeClr val="bg2">
-                <a:lumMod val="75000"/>
-              </a:schemeClr>
-            </a:solidFill>
-          </a:ln>
         </p:spPr>
-      </p:pic>
+        <p:txBody>
+          <a:bodyPr vert="horz" lIns="91440" tIns="45720" rIns="91440" bIns="45720" rtlCol="0" anchor="b"/>
+          <a:lstStyle>
+            <a:lvl1pPr algn="r">
+              <a:defRPr sz="1000"/>
+            </a:lvl1pPr>
+          </a:lstStyle>
+          <a:p>
+            <a:fld id="{2BF067CD-8E6B-4360-9AA8-C5DF2A48A6D1}" type="slidenum">
+              <a:rPr lang="en-US" noProof="0" smtClean="0"/>
+              <a:pPr/>
+              <a:t>9</a:t>
+            </a:fld>
+            <a:endParaRPr lang="en-US" noProof="0" dirty="0"/>
+          </a:p>
+        </p:txBody>
+      </p:sp>
       <p:sp>
         <p:nvSpPr>
           <p:cNvPr id="6" name="AutoShape 7"/>
@@ -20584,13 +22133,13 @@
         </p:nvSpPr>
         <p:spPr bwMode="auto">
           <a:xfrm>
-            <a:off x="6591000" y="2844000"/>
+            <a:off x="6983737" y="2806949"/>
             <a:ext cx="2895600" cy="585000"/>
           </a:xfrm>
           <a:prstGeom prst="wedgeRoundRectCallout">
             <a:avLst>
-              <a:gd name="adj1" fmla="val -66631"/>
-              <a:gd name="adj2" fmla="val 50515"/>
+              <a:gd name="adj1" fmla="val -66006"/>
+              <a:gd name="adj2" fmla="val 62896"/>
               <a:gd name="adj3" fmla="val 16667"/>
             </a:avLst>
           </a:prstGeom>
@@ -20675,13 +22224,13 @@
         </p:nvSpPr>
         <p:spPr bwMode="auto">
           <a:xfrm>
-            <a:off x="741000" y="4509000"/>
-            <a:ext cx="1828800" cy="882653"/>
+            <a:off x="117142" y="4509000"/>
+            <a:ext cx="2569800" cy="882653"/>
           </a:xfrm>
           <a:prstGeom prst="wedgeRoundRectCallout">
             <a:avLst>
-              <a:gd name="adj1" fmla="val 75955"/>
-              <a:gd name="adj2" fmla="val -32590"/>
+              <a:gd name="adj1" fmla="val 66091"/>
+              <a:gd name="adj2" fmla="val -27461"/>
               <a:gd name="adj3" fmla="val 16667"/>
             </a:avLst>
           </a:prstGeom>
@@ -20752,13 +22301,13 @@
         </p:nvSpPr>
         <p:spPr bwMode="auto">
           <a:xfrm>
-            <a:off x="8431537" y="3745045"/>
+            <a:off x="8569658" y="4720194"/>
             <a:ext cx="3505200" cy="990600"/>
           </a:xfrm>
           <a:prstGeom prst="wedgeRoundRectCallout">
             <a:avLst>
-              <a:gd name="adj1" fmla="val -62400"/>
-              <a:gd name="adj2" fmla="val 44922"/>
+              <a:gd name="adj1" fmla="val -61625"/>
+              <a:gd name="adj2" fmla="val -40074"/>
               <a:gd name="adj3" fmla="val 16667"/>
             </a:avLst>
           </a:prstGeom>
@@ -20854,43 +22403,68 @@
       </p:sp>
       <p:sp>
         <p:nvSpPr>
-          <p:cNvPr id="3" name="Slide Number">
+          <p:cNvPr id="14" name="Rectangle: Rounded Corners 17">
             <a:extLst>
               <a:ext uri="{FF2B5EF4-FFF2-40B4-BE49-F238E27FC236}">
-                <a16:creationId xmlns:a16="http://schemas.microsoft.com/office/drawing/2014/main" id="{5517F8A4-700B-775C-AD3C-F1446322B989}"/>
+                <a16:creationId xmlns:a16="http://schemas.microsoft.com/office/drawing/2014/main" id="{2AD6248C-C960-3E2E-2BA5-284908810A07}"/>
               </a:ext>
             </a:extLst>
           </p:cNvPr>
-          <p:cNvSpPr>
-            <a:spLocks noGrp="1"/>
-          </p:cNvSpPr>
-          <p:nvPr>
-            <p:ph type="sldNum" sz="quarter" idx="5"/>
-          </p:nvPr>
+          <p:cNvSpPr/>
+          <p:nvPr/>
         </p:nvSpPr>
         <p:spPr>
           <a:xfrm>
-            <a:off x="11753030" y="6507000"/>
-            <a:ext cx="367414" cy="297000"/>
+            <a:off x="6996001" y="5859000"/>
+            <a:ext cx="990000" cy="315000"/>
           </a:xfrm>
-          <a:prstGeom prst="rect">
-            <a:avLst/>
+          <a:prstGeom prst="roundRect">
+            <a:avLst>
+              <a:gd name="adj" fmla="val 5385"/>
+            </a:avLst>
           </a:prstGeom>
+          <a:noFill/>
+          <a:ln w="57150">
+            <a:solidFill>
+              <a:schemeClr val="tx1"/>
+            </a:solidFill>
+            <a:prstDash val="solid"/>
+          </a:ln>
         </p:spPr>
+        <p:style>
+          <a:lnRef idx="2">
+            <a:schemeClr val="accent1">
+              <a:shade val="50000"/>
+            </a:schemeClr>
+          </a:lnRef>
+          <a:fillRef idx="1">
+            <a:schemeClr val="accent1"/>
+          </a:fillRef>
+          <a:effectRef idx="0">
+            <a:schemeClr val="accent1"/>
+          </a:effectRef>
+          <a:fontRef idx="minor">
+            <a:schemeClr val="lt1"/>
+          </a:fontRef>
+        </p:style>
         <p:txBody>
-          <a:bodyPr vert="horz" lIns="91440" tIns="45720" rIns="91440" bIns="45720" rtlCol="0" anchor="b"/>
-          <a:lstStyle>
-            <a:lvl1pPr algn="r">
-              <a:defRPr sz="1000"/>
-            </a:lvl1pPr>
-          </a:lstStyle>
-          <a:p>
-            <a:fld id="{2BF067CD-8E6B-4360-9AA8-C5DF2A48A6D1}" type="slidenum">
-              <a:rPr lang="en-US" noProof="0" smtClean="0"/>
-              <a:pPr/>
-              <a:t>9</a:t>
-            </a:fld>
-            <a:endParaRPr lang="en-US" noProof="0" dirty="0"/>
+          <a:bodyPr rtlCol="0" anchor="t"/>
+          <a:lstStyle/>
+          <a:p>
+            <a:pPr algn="ctr"/>
+            <a:endParaRPr lang="en-US" sz="2799" b="1" dirty="0">
+              <a:solidFill>
+                <a:srgbClr val="FBEEDC"/>
+              </a:solidFill>
+              <a:effectLst>
+                <a:outerShdw blurRad="38100" dist="38100" dir="2700000" algn="tl">
+                  <a:srgbClr val="000000">
+                    <a:alpha val="43137"/>
+                  </a:srgbClr>
+                </a:outerShdw>
+              </a:effectLst>
+              <a:latin typeface="Consolas" panose="020B0609020204030204" pitchFamily="49" charset="0"/>
+            </a:endParaRPr>
           </a:p>
         </p:txBody>
       </p:sp>
@@ -21055,6 +22629,51 @@
                       </p:childTnLst>
                     </p:cTn>
                   </p:par>
+                  <p:par>
+                    <p:cTn id="15" fill="hold">
+                      <p:stCondLst>
+                        <p:cond delay="indefinite"/>
+                      </p:stCondLst>
+                      <p:childTnLst>
+                        <p:par>
+                          <p:cTn id="16" fill="hold">
+                            <p:stCondLst>
+                              <p:cond delay="0"/>
+                            </p:stCondLst>
+                            <p:childTnLst>
+                              <p:par>
+                                <p:cTn id="17" presetID="1" presetClass="entr" presetSubtype="0" fill="hold" grpId="0" nodeType="clickEffect">
+                                  <p:stCondLst>
+                                    <p:cond delay="0"/>
+                                  </p:stCondLst>
+                                  <p:childTnLst>
+                                    <p:set>
+                                      <p:cBhvr>
+                                        <p:cTn id="18" dur="1" fill="hold">
+                                          <p:stCondLst>
+                                            <p:cond delay="0"/>
+                                          </p:stCondLst>
+                                        </p:cTn>
+                                        <p:tgtEl>
+                                          <p:spTgt spid="14"/>
+                                        </p:tgtEl>
+                                        <p:attrNameLst>
+                                          <p:attrName>style.visibility</p:attrName>
+                                        </p:attrNameLst>
+                                      </p:cBhvr>
+                                      <p:to>
+                                        <p:strVal val="visible"/>
+                                      </p:to>
+                                    </p:set>
+                                  </p:childTnLst>
+                                </p:cTn>
+                              </p:par>
+                            </p:childTnLst>
+                          </p:cTn>
+                        </p:par>
+                      </p:childTnLst>
+                    </p:cTn>
+                  </p:par>
                 </p:childTnLst>
               </p:cTn>
               <p:prevCondLst>
@@ -21080,6 +22699,7 @@
       <p:bldP spid="6" grpId="0" animBg="1"/>
       <p:bldP spid="7" grpId="0" animBg="1"/>
       <p:bldP spid="8" grpId="0" animBg="1"/>
+      <p:bldP spid="14" grpId="0" animBg="1"/>
     </p:bldLst>
   </p:timing>
 </p:sld>

</xml_diff>

<commit_message>
Fixes on slides for MS Access
</commit_message>
<xml_diff>
--- a/Courses/Software-Sciences/Module-3-Databases-New/13-MS-Access/11-MS-Access-Queries-Forms-Reports.pptx
+++ b/Courses/Software-Sciences/Module-3-Databases-New/13-MS-Access/11-MS-Access-Queries-Forms-Reports.pptx
@@ -325,7 +325,7 @@
           <a:p>
             <a:fld id="{4E087215-0C8F-4762-A664-737A353EC9A4}" type="datetimeFigureOut">
               <a:rPr lang="bg-BG" smtClean="0"/>
-              <a:t>18.1.2024 г.</a:t>
+              <a:t>21.1.2024 г.</a:t>
             </a:fld>
             <a:endParaRPr lang="bg-BG"/>
           </a:p>
@@ -521,7 +521,7 @@
           <a:p>
             <a:fld id="{72D84649-876A-46C9-8472-14CB09C070D8}" type="datetimeFigureOut">
               <a:rPr lang="en-US" smtClean="0"/>
-              <a:t>18-Jan-24</a:t>
+              <a:t>1/21/2024</a:t>
             </a:fld>
             <a:endParaRPr lang="en-US"/>
           </a:p>
@@ -12021,6 +12021,11 @@
           </a:bodyPr>
           <a:lstStyle/>
           <a:p>
+            <a:pPr>
+              <a:buClr>
+                <a:schemeClr val="tx1"/>
+              </a:buClr>
+            </a:pPr>
             <a:r>
               <a:rPr lang="ru-RU" b="1" dirty="0">
                 <a:solidFill>
@@ -18116,43 +18121,6 @@
           </a:p>
         </p:txBody>
       </p:sp>
-      <p:pic>
-        <p:nvPicPr>
-          <p:cNvPr id="6" name="Picture 5">
-            <a:extLst>
-              <a:ext uri="{FF2B5EF4-FFF2-40B4-BE49-F238E27FC236}">
-                <a16:creationId xmlns:a16="http://schemas.microsoft.com/office/drawing/2014/main" id="{AF31F56B-56FB-80BC-09E8-4053132EBF44}"/>
-              </a:ext>
-            </a:extLst>
-          </p:cNvPr>
-          <p:cNvPicPr>
-            <a:picLocks noChangeAspect="1"/>
-          </p:cNvPicPr>
-          <p:nvPr/>
-        </p:nvPicPr>
-        <p:blipFill>
-          <a:blip r:embed="rId2"/>
-          <a:stretch>
-            <a:fillRect/>
-          </a:stretch>
-        </p:blipFill>
-        <p:spPr>
-          <a:xfrm>
-            <a:off x="3290331" y="4458903"/>
-            <a:ext cx="5611338" cy="2265988"/>
-          </a:xfrm>
-          <a:prstGeom prst="rect">
-            <a:avLst/>
-          </a:prstGeom>
-          <a:ln>
-            <a:solidFill>
-              <a:schemeClr val="bg2">
-                <a:lumMod val="75000"/>
-              </a:schemeClr>
-            </a:solidFill>
-          </a:ln>
-        </p:spPr>
-      </p:pic>
       <p:sp>
         <p:nvSpPr>
           <p:cNvPr id="5" name="Slide Number">
@@ -18195,112 +18163,43 @@
           </a:p>
         </p:txBody>
       </p:sp>
-      <p:sp>
-        <p:nvSpPr>
-          <p:cNvPr id="2" name="Rectangle: Rounded Corners 1">
+      <p:pic>
+        <p:nvPicPr>
+          <p:cNvPr id="8" name="Picture 7">
             <a:extLst>
               <a:ext uri="{FF2B5EF4-FFF2-40B4-BE49-F238E27FC236}">
-                <a16:creationId xmlns:a16="http://schemas.microsoft.com/office/drawing/2014/main" id="{4ADAC19B-EE95-0A9F-659E-B173CD702111}"/>
+                <a16:creationId xmlns:a16="http://schemas.microsoft.com/office/drawing/2014/main" id="{316C6291-EB23-44BC-5FEC-4BB5C10DD655}"/>
               </a:ext>
             </a:extLst>
           </p:cNvPr>
-          <p:cNvSpPr/>
+          <p:cNvPicPr>
+            <a:picLocks noChangeAspect="1"/>
+          </p:cNvPicPr>
           <p:nvPr/>
-        </p:nvSpPr>
-        <p:spPr bwMode="auto">
+        </p:nvPicPr>
+        <p:blipFill>
+          <a:blip r:embed="rId2"/>
+          <a:stretch>
+            <a:fillRect/>
+          </a:stretch>
+        </p:blipFill>
+        <p:spPr>
           <a:xfrm>
-            <a:off x="8253079" y="3960508"/>
-            <a:ext cx="3452030" cy="2337758"/>
+            <a:off x="3556060" y="4372669"/>
+            <a:ext cx="5079879" cy="2146211"/>
           </a:xfrm>
-          <a:prstGeom prst="roundRect">
+          <a:prstGeom prst="rect">
             <a:avLst/>
           </a:prstGeom>
-          <a:solidFill>
-            <a:schemeClr val="dk2">
-              <a:alpha val="80000"/>
-            </a:schemeClr>
-          </a:solidFill>
-          <a:ln w="19050">
+          <a:ln>
             <a:solidFill>
-              <a:schemeClr val="tx1">
+              <a:schemeClr val="bg2">
                 <a:lumMod val="75000"/>
-                <a:alpha val="80000"/>
               </a:schemeClr>
             </a:solidFill>
           </a:ln>
-          <a:effectLst/>
         </p:spPr>
-        <p:style>
-          <a:lnRef idx="2">
-            <a:schemeClr val="accent1">
-              <a:shade val="50000"/>
-            </a:schemeClr>
-          </a:lnRef>
-          <a:fillRef idx="1001">
-            <a:schemeClr val="dk2"/>
-          </a:fillRef>
-          <a:effectRef idx="0">
-            <a:schemeClr val="accent1"/>
-          </a:effectRef>
-          <a:fontRef idx="minor">
-            <a:schemeClr val="lt1"/>
-          </a:fontRef>
-        </p:style>
-        <p:txBody>
-          <a:bodyPr rot="0" spcFirstLastPara="0" vertOverflow="overflow" horzOverflow="overflow" vert="horz" wrap="square" lIns="91440" tIns="45720" rIns="91440" bIns="45720" numCol="1" spcCol="0" rtlCol="0" fromWordArt="0" anchor="ctr" anchorCtr="0" forceAA="0" compatLnSpc="1">
-            <a:prstTxWarp prst="textNoShape">
-              <a:avLst/>
-            </a:prstTxWarp>
-            <a:noAutofit/>
-          </a:bodyPr>
-          <a:lstStyle/>
-          <a:p>
-            <a:pPr algn="ctr"/>
-            <a:r>
-              <a:rPr lang="en-US" sz="2800" b="1" dirty="0">
-                <a:solidFill>
-                  <a:srgbClr val="FFFF00"/>
-                </a:solidFill>
-                <a:effectLst>
-                  <a:outerShdw blurRad="38100" dist="38100" dir="2700000" algn="tl">
-                    <a:srgbClr val="000000">
-                      <a:alpha val="43137"/>
-                    </a:srgbClr>
-                  </a:outerShdw>
-                </a:effectLst>
-              </a:rPr>
-              <a:t>TODO: </a:t>
-            </a:r>
-            <a:r>
-              <a:rPr lang="bg-BG" sz="2800" b="1" dirty="0">
-                <a:solidFill>
-                  <a:srgbClr val="FFFF00"/>
-                </a:solidFill>
-                <a:effectLst>
-                  <a:outerShdw blurRad="38100" dist="38100" dir="2700000" algn="tl">
-                    <a:srgbClr val="000000">
-                      <a:alpha val="43137"/>
-                    </a:srgbClr>
-                  </a:outerShdw>
-                </a:effectLst>
-              </a:rPr>
-              <a:t>по-едра картинка -&gt; не се вижда!</a:t>
-            </a:r>
-            <a:endParaRPr lang="en-US" sz="2800" b="1" dirty="0">
-              <a:solidFill>
-                <a:srgbClr val="FFFF00"/>
-              </a:solidFill>
-              <a:effectLst>
-                <a:outerShdw blurRad="38100" dist="38100" dir="2700000" algn="tl">
-                  <a:srgbClr val="000000">
-                    <a:alpha val="43137"/>
-                  </a:srgbClr>
-                </a:outerShdw>
-              </a:effectLst>
-            </a:endParaRPr>
-          </a:p>
-        </p:txBody>
-      </p:sp>
+      </p:pic>
     </p:spTree>
     <p:extLst>
       <p:ext uri="{BB962C8B-B14F-4D97-AF65-F5344CB8AC3E}">
@@ -18419,33 +18318,6 @@
                                   </p:childTnLst>
                                 </p:cTn>
                               </p:par>
-                              <p:par>
-                                <p:cTn id="11" presetID="1" presetClass="entr" presetSubtype="0" fill="hold" nodeType="withEffect">
-                                  <p:stCondLst>
-                                    <p:cond delay="0"/>
-                                  </p:stCondLst>
-                                  <p:childTnLst>
-                                    <p:set>
-                                      <p:cBhvr>
-                                        <p:cTn id="12" dur="1" fill="hold">
-                                          <p:stCondLst>
-                                            <p:cond delay="0"/>
-                                          </p:stCondLst>
-                                        </p:cTn>
-                                        <p:tgtEl>
-                                          <p:spTgt spid="6"/>
-                                        </p:tgtEl>
-                                        <p:attrNameLst>
-                                          <p:attrName>style.visibility</p:attrName>
-                                        </p:attrNameLst>
-                                      </p:cBhvr>
-                                      <p:to>
-                                        <p:strVal val="visible"/>
-                                      </p:to>
-                                    </p:set>
-                                  </p:childTnLst>
-                                </p:cTn>
-                              </p:par>
                             </p:childTnLst>
                           </p:cTn>
                         </p:par>
@@ -18494,32 +18366,6 @@
           <a:chExt cx="0" cy="0"/>
         </a:xfrm>
       </p:grpSpPr>
-      <p:pic>
-        <p:nvPicPr>
-          <p:cNvPr id="8" name="Picture 14" descr="Business, search, database search, databases, db Icon in Pretty Office 3  Icons"/>
-          <p:cNvPicPr>
-            <a:picLocks noChangeAspect="1" noChangeArrowheads="1"/>
-          </p:cNvPicPr>
-          <p:nvPr/>
-        </p:nvPicPr>
-        <p:blipFill>
-          <a:blip r:embed="rId2" cstate="print"/>
-          <a:srcRect/>
-          <a:stretch>
-            <a:fillRect/>
-          </a:stretch>
-        </p:blipFill>
-        <p:spPr bwMode="auto">
-          <a:xfrm>
-            <a:off x="4800600" y="1371600"/>
-            <a:ext cx="2438400" cy="2438400"/>
-          </a:xfrm>
-          <a:prstGeom prst="rect">
-            <a:avLst/>
-          </a:prstGeom>
-          <a:noFill/>
-        </p:spPr>
-      </p:pic>
       <p:sp>
         <p:nvSpPr>
           <p:cNvPr id="3" name="Subtitle 2">
@@ -18586,6 +18432,41 @@
           </a:p>
         </p:txBody>
       </p:sp>
+      <p:pic>
+        <p:nvPicPr>
+          <p:cNvPr id="5" name="Picture 4" descr="A circular object with a logo on it&#10;&#10;Description automatically generated">
+            <a:extLst>
+              <a:ext uri="{FF2B5EF4-FFF2-40B4-BE49-F238E27FC236}">
+                <a16:creationId xmlns:a16="http://schemas.microsoft.com/office/drawing/2014/main" id="{05E6D692-5BCE-531A-0346-B2DEDE501A60}"/>
+              </a:ext>
+            </a:extLst>
+          </p:cNvPr>
+          <p:cNvPicPr>
+            <a:picLocks noChangeAspect="1"/>
+          </p:cNvPicPr>
+          <p:nvPr/>
+        </p:nvPicPr>
+        <p:blipFill rotWithShape="1">
+          <a:blip r:embed="rId2">
+            <a:extLst>
+              <a:ext uri="{28A0092B-C50C-407E-A947-70E740481C1C}">
+                <a14:useLocalDpi xmlns:a14="http://schemas.microsoft.com/office/drawing/2010/main" val="0"/>
+              </a:ext>
+            </a:extLst>
+          </a:blip>
+          <a:srcRect l="15721" t="17303" r="14539" b="15321"/>
+          <a:stretch/>
+        </p:blipFill>
+        <p:spPr>
+          <a:xfrm>
+            <a:off x="4628763" y="1224000"/>
+            <a:ext cx="2934474" cy="2835000"/>
+          </a:xfrm>
+          <a:prstGeom prst="ellipse">
+            <a:avLst/>
+          </a:prstGeom>
+        </p:spPr>
+      </p:pic>
     </p:spTree>
     <p:extLst>
       <p:ext uri="{BB962C8B-B14F-4D97-AF65-F5344CB8AC3E}">

</xml_diff>

<commit_message>
Adding instructions with pictures on how to print report to Access
</commit_message>
<xml_diff>
--- a/Courses/Software-Sciences/Module-3-Databases-New/13-MS-Access/11-MS-Access-Queries-Forms-Reports.pptx
+++ b/Courses/Software-Sciences/Module-3-Databases-New/13-MS-Access/11-MS-Access-Queries-Forms-Reports.pptx
@@ -5,10 +5,10 @@
     <p:sldMasterId id="2147483675" r:id="rId1"/>
   </p:sldMasterIdLst>
   <p:notesMasterIdLst>
-    <p:notesMasterId r:id="rId36"/>
+    <p:notesMasterId r:id="rId39"/>
   </p:notesMasterIdLst>
   <p:handoutMasterIdLst>
-    <p:handoutMasterId r:id="rId37"/>
+    <p:handoutMasterId r:id="rId40"/>
   </p:handoutMasterIdLst>
   <p:sldIdLst>
     <p:sldId id="503" r:id="rId2"/>
@@ -40,11 +40,14 @@
     <p:sldId id="551" r:id="rId28"/>
     <p:sldId id="552" r:id="rId29"/>
     <p:sldId id="553" r:id="rId30"/>
-    <p:sldId id="595" r:id="rId31"/>
-    <p:sldId id="554" r:id="rId32"/>
-    <p:sldId id="349" r:id="rId33"/>
-    <p:sldId id="504" r:id="rId34"/>
-    <p:sldId id="505" r:id="rId35"/>
+    <p:sldId id="554" r:id="rId31"/>
+    <p:sldId id="597" r:id="rId32"/>
+    <p:sldId id="598" r:id="rId33"/>
+    <p:sldId id="599" r:id="rId34"/>
+    <p:sldId id="600" r:id="rId35"/>
+    <p:sldId id="349" r:id="rId36"/>
+    <p:sldId id="504" r:id="rId37"/>
+    <p:sldId id="505" r:id="rId38"/>
   </p:sldIdLst>
   <p:sldSz cx="12192000" cy="6858000"/>
   <p:notesSz cx="6858000" cy="9144000"/>
@@ -197,8 +200,11 @@
             <p14:sldId id="551"/>
             <p14:sldId id="552"/>
             <p14:sldId id="553"/>
-            <p14:sldId id="595"/>
             <p14:sldId id="554"/>
+            <p14:sldId id="597"/>
+            <p14:sldId id="598"/>
+            <p14:sldId id="599"/>
+            <p14:sldId id="600"/>
           </p14:sldIdLst>
         </p14:section>
         <p14:section name="Обобщение" id="{0A2E3CAC-982A-482C-86F1-356E59259FB0}">
@@ -325,7 +331,7 @@
           <a:p>
             <a:fld id="{4E087215-0C8F-4762-A664-737A353EC9A4}" type="datetimeFigureOut">
               <a:rPr lang="bg-BG" smtClean="0"/>
-              <a:t>21.1.2024 г.</a:t>
+              <a:t>22.1.2024 г.</a:t>
             </a:fld>
             <a:endParaRPr lang="bg-BG"/>
           </a:p>
@@ -521,7 +527,7 @@
           <a:p>
             <a:fld id="{72D84649-876A-46C9-8472-14CB09C070D8}" type="datetimeFigureOut">
               <a:rPr lang="en-US" smtClean="0"/>
-              <a:t>1/21/2024</a:t>
+              <a:t>1/22/2024</a:t>
             </a:fld>
             <a:endParaRPr lang="en-US"/>
           </a:p>
@@ -965,6 +971,744 @@
 </p:notes>
 </file>
 
+<file path=ppt/notesSlides/notesSlide10.xml><?xml version="1.0" encoding="utf-8"?>
+<p:notes xmlns:a="http://schemas.openxmlformats.org/drawingml/2006/main" xmlns:r="http://schemas.openxmlformats.org/officeDocument/2006/relationships" xmlns:p="http://schemas.openxmlformats.org/presentationml/2006/main">
+  <p:cSld>
+    <p:spTree>
+      <p:nvGrpSpPr>
+        <p:cNvPr id="1" name=""/>
+        <p:cNvGrpSpPr/>
+        <p:nvPr/>
+      </p:nvGrpSpPr>
+      <p:grpSpPr>
+        <a:xfrm>
+          <a:off x="0" y="0"/>
+          <a:ext cx="0" cy="0"/>
+          <a:chOff x="0" y="0"/>
+          <a:chExt cx="0" cy="0"/>
+        </a:xfrm>
+      </p:grpSpPr>
+      <p:sp>
+        <p:nvSpPr>
+          <p:cNvPr id="2" name="Slide Image Placeholder 1"/>
+          <p:cNvSpPr>
+            <a:spLocks noGrp="1" noRot="1" noChangeAspect="1"/>
+          </p:cNvSpPr>
+          <p:nvPr>
+            <p:ph type="sldImg"/>
+          </p:nvPr>
+        </p:nvSpPr>
+        <p:spPr/>
+      </p:sp>
+      <p:sp>
+        <p:nvSpPr>
+          <p:cNvPr id="3" name="Notes Placeholder 2"/>
+          <p:cNvSpPr>
+            <a:spLocks noGrp="1"/>
+          </p:cNvSpPr>
+          <p:nvPr>
+            <p:ph type="body" idx="1"/>
+          </p:nvPr>
+        </p:nvSpPr>
+        <p:spPr/>
+        <p:txBody>
+          <a:bodyPr/>
+          <a:lstStyle/>
+          <a:p>
+            <a:endParaRPr lang="en-US" dirty="0"/>
+          </a:p>
+        </p:txBody>
+      </p:sp>
+      <p:sp>
+        <p:nvSpPr>
+          <p:cNvPr id="7" name="Slide Number Placeholder 5">
+            <a:extLst>
+              <a:ext uri="{FF2B5EF4-FFF2-40B4-BE49-F238E27FC236}">
+                <a16:creationId xmlns:a16="http://schemas.microsoft.com/office/drawing/2014/main" id="{E65F1CA9-65DC-416B-8882-B3A5E415CE67}"/>
+              </a:ext>
+            </a:extLst>
+          </p:cNvPr>
+          <p:cNvSpPr txBox="1">
+            <a:spLocks/>
+          </p:cNvSpPr>
+          <p:nvPr/>
+        </p:nvSpPr>
+        <p:spPr>
+          <a:xfrm>
+            <a:off x="6488999" y="8847000"/>
+            <a:ext cx="367414" cy="297000"/>
+          </a:xfrm>
+          <a:prstGeom prst="rect">
+            <a:avLst/>
+          </a:prstGeom>
+        </p:spPr>
+        <p:txBody>
+          <a:bodyPr vert="horz" lIns="91440" tIns="45720" rIns="91440" bIns="45720" rtlCol="0" anchor="b"/>
+          <a:lstStyle>
+            <a:defPPr>
+              <a:defRPr lang="en-US"/>
+            </a:defPPr>
+            <a:lvl1pPr marL="0" algn="r" defTabSz="914400" rtl="0" eaLnBrk="1" latinLnBrk="0" hangingPunct="1">
+              <a:defRPr sz="1200" kern="1200">
+                <a:solidFill>
+                  <a:schemeClr val="tx1"/>
+                </a:solidFill>
+                <a:latin typeface="+mn-lt"/>
+                <a:ea typeface="+mn-ea"/>
+                <a:cs typeface="+mn-cs"/>
+              </a:defRPr>
+            </a:lvl1pPr>
+            <a:lvl2pPr marL="457200" algn="l" defTabSz="914400" rtl="0" eaLnBrk="1" latinLnBrk="0" hangingPunct="1">
+              <a:defRPr sz="1800" kern="1200">
+                <a:solidFill>
+                  <a:schemeClr val="tx1"/>
+                </a:solidFill>
+                <a:latin typeface="+mn-lt"/>
+                <a:ea typeface="+mn-ea"/>
+                <a:cs typeface="+mn-cs"/>
+              </a:defRPr>
+            </a:lvl2pPr>
+            <a:lvl3pPr marL="914400" algn="l" defTabSz="914400" rtl="0" eaLnBrk="1" latinLnBrk="0" hangingPunct="1">
+              <a:defRPr sz="1800" kern="1200">
+                <a:solidFill>
+                  <a:schemeClr val="tx1"/>
+                </a:solidFill>
+                <a:latin typeface="+mn-lt"/>
+                <a:ea typeface="+mn-ea"/>
+                <a:cs typeface="+mn-cs"/>
+              </a:defRPr>
+            </a:lvl3pPr>
+            <a:lvl4pPr marL="1371600" algn="l" defTabSz="914400" rtl="0" eaLnBrk="1" latinLnBrk="0" hangingPunct="1">
+              <a:defRPr sz="1800" kern="1200">
+                <a:solidFill>
+                  <a:schemeClr val="tx1"/>
+                </a:solidFill>
+                <a:latin typeface="+mn-lt"/>
+                <a:ea typeface="+mn-ea"/>
+                <a:cs typeface="+mn-cs"/>
+              </a:defRPr>
+            </a:lvl4pPr>
+            <a:lvl5pPr marL="1828800" algn="l" defTabSz="914400" rtl="0" eaLnBrk="1" latinLnBrk="0" hangingPunct="1">
+              <a:defRPr sz="1800" kern="1200">
+                <a:solidFill>
+                  <a:schemeClr val="tx1"/>
+                </a:solidFill>
+                <a:latin typeface="+mn-lt"/>
+                <a:ea typeface="+mn-ea"/>
+                <a:cs typeface="+mn-cs"/>
+              </a:defRPr>
+            </a:lvl5pPr>
+            <a:lvl6pPr marL="2286000" algn="l" defTabSz="914400" rtl="0" eaLnBrk="1" latinLnBrk="0" hangingPunct="1">
+              <a:defRPr sz="1800" kern="1200">
+                <a:solidFill>
+                  <a:schemeClr val="tx1"/>
+                </a:solidFill>
+                <a:latin typeface="+mn-lt"/>
+                <a:ea typeface="+mn-ea"/>
+                <a:cs typeface="+mn-cs"/>
+              </a:defRPr>
+            </a:lvl6pPr>
+            <a:lvl7pPr marL="2743200" algn="l" defTabSz="914400" rtl="0" eaLnBrk="1" latinLnBrk="0" hangingPunct="1">
+              <a:defRPr sz="1800" kern="1200">
+                <a:solidFill>
+                  <a:schemeClr val="tx1"/>
+                </a:solidFill>
+                <a:latin typeface="+mn-lt"/>
+                <a:ea typeface="+mn-ea"/>
+                <a:cs typeface="+mn-cs"/>
+              </a:defRPr>
+            </a:lvl7pPr>
+            <a:lvl8pPr marL="3200400" algn="l" defTabSz="914400" rtl="0" eaLnBrk="1" latinLnBrk="0" hangingPunct="1">
+              <a:defRPr sz="1800" kern="1200">
+                <a:solidFill>
+                  <a:schemeClr val="tx1"/>
+                </a:solidFill>
+                <a:latin typeface="+mn-lt"/>
+                <a:ea typeface="+mn-ea"/>
+                <a:cs typeface="+mn-cs"/>
+              </a:defRPr>
+            </a:lvl8pPr>
+            <a:lvl9pPr marL="3657600" algn="l" defTabSz="914400" rtl="0" eaLnBrk="1" latinLnBrk="0" hangingPunct="1">
+              <a:defRPr sz="1800" kern="1200">
+                <a:solidFill>
+                  <a:schemeClr val="tx1"/>
+                </a:solidFill>
+                <a:latin typeface="+mn-lt"/>
+                <a:ea typeface="+mn-ea"/>
+                <a:cs typeface="+mn-cs"/>
+              </a:defRPr>
+            </a:lvl9pPr>
+          </a:lstStyle>
+          <a:p>
+            <a:fld id="{3EBA5BD7-F043-4D1B-AA17-CD412FC534DE}" type="slidenum">
+              <a:rPr lang="en-US" smtClean="0"/>
+              <a:pPr/>
+              <a:t>35</a:t>
+            </a:fld>
+            <a:endParaRPr lang="en-US" dirty="0"/>
+          </a:p>
+        </p:txBody>
+      </p:sp>
+      <p:sp>
+        <p:nvSpPr>
+          <p:cNvPr id="5" name="Footer Placeholder 7">
+            <a:extLst>
+              <a:ext uri="{FF2B5EF4-FFF2-40B4-BE49-F238E27FC236}">
+                <a16:creationId xmlns:a16="http://schemas.microsoft.com/office/drawing/2014/main" id="{912A3AAE-885B-D70C-2870-9BDE460702C3}"/>
+              </a:ext>
+            </a:extLst>
+          </p:cNvPr>
+          <p:cNvSpPr>
+            <a:spLocks noGrp="1"/>
+          </p:cNvSpPr>
+          <p:nvPr>
+            <p:ph type="ftr" sz="quarter" idx="4"/>
+          </p:nvPr>
+        </p:nvSpPr>
+        <p:spPr>
+          <a:xfrm>
+            <a:off x="-1" y="8892000"/>
+            <a:ext cx="6488999" cy="252000"/>
+          </a:xfrm>
+          <a:prstGeom prst="rect">
+            <a:avLst/>
+          </a:prstGeom>
+        </p:spPr>
+        <p:txBody>
+          <a:bodyPr vert="horz" lIns="91440" tIns="45720" rIns="91440" bIns="45720" rtlCol="0" anchor="b"/>
+          <a:lstStyle>
+            <a:lvl1pPr algn="l">
+              <a:defRPr sz="1100"/>
+            </a:lvl1pPr>
+          </a:lstStyle>
+          <a:p>
+            <a:r>
+              <a:rPr lang="bg-BG" sz="1100" dirty="0"/>
+              <a:t>Работна група </a:t>
+            </a:r>
+            <a:r>
+              <a:rPr lang="bg-BG" dirty="0"/>
+              <a:t>"Образование по програмиране и ИТ"</a:t>
+            </a:r>
+            <a:r>
+              <a:rPr lang="bg-BG" sz="1100" dirty="0"/>
+              <a:t>, с подкрепата на </a:t>
+            </a:r>
+            <a:r>
+              <a:rPr lang="en-US" sz="1100" dirty="0">
+                <a:hlinkClick r:id="rId3"/>
+              </a:rPr>
+              <a:t>SoftUni</a:t>
+            </a:r>
+            <a:endParaRPr lang="en-US" sz="1100" dirty="0"/>
+          </a:p>
+        </p:txBody>
+      </p:sp>
+    </p:spTree>
+    <p:extLst>
+      <p:ext uri="{BB962C8B-B14F-4D97-AF65-F5344CB8AC3E}">
+        <p14:creationId xmlns:p14="http://schemas.microsoft.com/office/powerpoint/2010/main" val="1661027275"/>
+      </p:ext>
+    </p:extLst>
+  </p:cSld>
+  <p:clrMapOvr>
+    <a:masterClrMapping/>
+  </p:clrMapOvr>
+</p:notes>
+</file>
+
+<file path=ppt/notesSlides/notesSlide11.xml><?xml version="1.0" encoding="utf-8"?>
+<p:notes xmlns:a="http://schemas.openxmlformats.org/drawingml/2006/main" xmlns:r="http://schemas.openxmlformats.org/officeDocument/2006/relationships" xmlns:p="http://schemas.openxmlformats.org/presentationml/2006/main">
+  <p:cSld>
+    <p:spTree>
+      <p:nvGrpSpPr>
+        <p:cNvPr id="1" name=""/>
+        <p:cNvGrpSpPr/>
+        <p:nvPr/>
+      </p:nvGrpSpPr>
+      <p:grpSpPr>
+        <a:xfrm>
+          <a:off x="0" y="0"/>
+          <a:ext cx="0" cy="0"/>
+          <a:chOff x="0" y="0"/>
+          <a:chExt cx="0" cy="0"/>
+        </a:xfrm>
+      </p:grpSpPr>
+      <p:sp>
+        <p:nvSpPr>
+          <p:cNvPr id="2" name="Slide Image Placeholder 1"/>
+          <p:cNvSpPr>
+            <a:spLocks noGrp="1" noRot="1" noChangeAspect="1"/>
+          </p:cNvSpPr>
+          <p:nvPr>
+            <p:ph type="sldImg"/>
+          </p:nvPr>
+        </p:nvSpPr>
+        <p:spPr/>
+      </p:sp>
+      <p:sp>
+        <p:nvSpPr>
+          <p:cNvPr id="3" name="Notes Placeholder 2"/>
+          <p:cNvSpPr>
+            <a:spLocks noGrp="1"/>
+          </p:cNvSpPr>
+          <p:nvPr>
+            <p:ph type="body" idx="1"/>
+          </p:nvPr>
+        </p:nvSpPr>
+        <p:spPr/>
+        <p:txBody>
+          <a:bodyPr/>
+          <a:lstStyle/>
+          <a:p>
+            <a:endParaRPr lang="en-US" dirty="0"/>
+          </a:p>
+        </p:txBody>
+      </p:sp>
+      <p:sp>
+        <p:nvSpPr>
+          <p:cNvPr id="7" name="Slide Number Placeholder 5">
+            <a:extLst>
+              <a:ext uri="{FF2B5EF4-FFF2-40B4-BE49-F238E27FC236}">
+                <a16:creationId xmlns:a16="http://schemas.microsoft.com/office/drawing/2014/main" id="{5049B984-F964-47FF-8179-0A3007CE21CD}"/>
+              </a:ext>
+            </a:extLst>
+          </p:cNvPr>
+          <p:cNvSpPr txBox="1">
+            <a:spLocks/>
+          </p:cNvSpPr>
+          <p:nvPr/>
+        </p:nvSpPr>
+        <p:spPr>
+          <a:xfrm>
+            <a:off x="6488999" y="8847000"/>
+            <a:ext cx="367414" cy="297000"/>
+          </a:xfrm>
+          <a:prstGeom prst="rect">
+            <a:avLst/>
+          </a:prstGeom>
+        </p:spPr>
+        <p:txBody>
+          <a:bodyPr vert="horz" lIns="91440" tIns="45720" rIns="91440" bIns="45720" rtlCol="0" anchor="b"/>
+          <a:lstStyle>
+            <a:defPPr>
+              <a:defRPr lang="en-US"/>
+            </a:defPPr>
+            <a:lvl1pPr marL="0" algn="r" defTabSz="914400" rtl="0" eaLnBrk="1" latinLnBrk="0" hangingPunct="1">
+              <a:defRPr sz="1200" kern="1200">
+                <a:solidFill>
+                  <a:schemeClr val="tx1"/>
+                </a:solidFill>
+                <a:latin typeface="+mn-lt"/>
+                <a:ea typeface="+mn-ea"/>
+                <a:cs typeface="+mn-cs"/>
+              </a:defRPr>
+            </a:lvl1pPr>
+            <a:lvl2pPr marL="457200" algn="l" defTabSz="914400" rtl="0" eaLnBrk="1" latinLnBrk="0" hangingPunct="1">
+              <a:defRPr sz="1800" kern="1200">
+                <a:solidFill>
+                  <a:schemeClr val="tx1"/>
+                </a:solidFill>
+                <a:latin typeface="+mn-lt"/>
+                <a:ea typeface="+mn-ea"/>
+                <a:cs typeface="+mn-cs"/>
+              </a:defRPr>
+            </a:lvl2pPr>
+            <a:lvl3pPr marL="914400" algn="l" defTabSz="914400" rtl="0" eaLnBrk="1" latinLnBrk="0" hangingPunct="1">
+              <a:defRPr sz="1800" kern="1200">
+                <a:solidFill>
+                  <a:schemeClr val="tx1"/>
+                </a:solidFill>
+                <a:latin typeface="+mn-lt"/>
+                <a:ea typeface="+mn-ea"/>
+                <a:cs typeface="+mn-cs"/>
+              </a:defRPr>
+            </a:lvl3pPr>
+            <a:lvl4pPr marL="1371600" algn="l" defTabSz="914400" rtl="0" eaLnBrk="1" latinLnBrk="0" hangingPunct="1">
+              <a:defRPr sz="1800" kern="1200">
+                <a:solidFill>
+                  <a:schemeClr val="tx1"/>
+                </a:solidFill>
+                <a:latin typeface="+mn-lt"/>
+                <a:ea typeface="+mn-ea"/>
+                <a:cs typeface="+mn-cs"/>
+              </a:defRPr>
+            </a:lvl4pPr>
+            <a:lvl5pPr marL="1828800" algn="l" defTabSz="914400" rtl="0" eaLnBrk="1" latinLnBrk="0" hangingPunct="1">
+              <a:defRPr sz="1800" kern="1200">
+                <a:solidFill>
+                  <a:schemeClr val="tx1"/>
+                </a:solidFill>
+                <a:latin typeface="+mn-lt"/>
+                <a:ea typeface="+mn-ea"/>
+                <a:cs typeface="+mn-cs"/>
+              </a:defRPr>
+            </a:lvl5pPr>
+            <a:lvl6pPr marL="2286000" algn="l" defTabSz="914400" rtl="0" eaLnBrk="1" latinLnBrk="0" hangingPunct="1">
+              <a:defRPr sz="1800" kern="1200">
+                <a:solidFill>
+                  <a:schemeClr val="tx1"/>
+                </a:solidFill>
+                <a:latin typeface="+mn-lt"/>
+                <a:ea typeface="+mn-ea"/>
+                <a:cs typeface="+mn-cs"/>
+              </a:defRPr>
+            </a:lvl6pPr>
+            <a:lvl7pPr marL="2743200" algn="l" defTabSz="914400" rtl="0" eaLnBrk="1" latinLnBrk="0" hangingPunct="1">
+              <a:defRPr sz="1800" kern="1200">
+                <a:solidFill>
+                  <a:schemeClr val="tx1"/>
+                </a:solidFill>
+                <a:latin typeface="+mn-lt"/>
+                <a:ea typeface="+mn-ea"/>
+                <a:cs typeface="+mn-cs"/>
+              </a:defRPr>
+            </a:lvl7pPr>
+            <a:lvl8pPr marL="3200400" algn="l" defTabSz="914400" rtl="0" eaLnBrk="1" latinLnBrk="0" hangingPunct="1">
+              <a:defRPr sz="1800" kern="1200">
+                <a:solidFill>
+                  <a:schemeClr val="tx1"/>
+                </a:solidFill>
+                <a:latin typeface="+mn-lt"/>
+                <a:ea typeface="+mn-ea"/>
+                <a:cs typeface="+mn-cs"/>
+              </a:defRPr>
+            </a:lvl8pPr>
+            <a:lvl9pPr marL="3657600" algn="l" defTabSz="914400" rtl="0" eaLnBrk="1" latinLnBrk="0" hangingPunct="1">
+              <a:defRPr sz="1800" kern="1200">
+                <a:solidFill>
+                  <a:schemeClr val="tx1"/>
+                </a:solidFill>
+                <a:latin typeface="+mn-lt"/>
+                <a:ea typeface="+mn-ea"/>
+                <a:cs typeface="+mn-cs"/>
+              </a:defRPr>
+            </a:lvl9pPr>
+          </a:lstStyle>
+          <a:p>
+            <a:fld id="{3EBA5BD7-F043-4D1B-AA17-CD412FC534DE}" type="slidenum">
+              <a:rPr lang="en-US" smtClean="0"/>
+              <a:pPr/>
+              <a:t>36</a:t>
+            </a:fld>
+            <a:endParaRPr lang="en-US" dirty="0"/>
+          </a:p>
+        </p:txBody>
+      </p:sp>
+      <p:sp>
+        <p:nvSpPr>
+          <p:cNvPr id="5" name="Footer Placeholder 7">
+            <a:extLst>
+              <a:ext uri="{FF2B5EF4-FFF2-40B4-BE49-F238E27FC236}">
+                <a16:creationId xmlns:a16="http://schemas.microsoft.com/office/drawing/2014/main" id="{87873718-4EF7-D4BA-768F-C09AAEC16FC2}"/>
+              </a:ext>
+            </a:extLst>
+          </p:cNvPr>
+          <p:cNvSpPr>
+            <a:spLocks noGrp="1"/>
+          </p:cNvSpPr>
+          <p:nvPr>
+            <p:ph type="ftr" sz="quarter" idx="4"/>
+          </p:nvPr>
+        </p:nvSpPr>
+        <p:spPr>
+          <a:xfrm>
+            <a:off x="-1" y="8892000"/>
+            <a:ext cx="6488999" cy="252000"/>
+          </a:xfrm>
+          <a:prstGeom prst="rect">
+            <a:avLst/>
+          </a:prstGeom>
+        </p:spPr>
+        <p:txBody>
+          <a:bodyPr vert="horz" lIns="91440" tIns="45720" rIns="91440" bIns="45720" rtlCol="0" anchor="b"/>
+          <a:lstStyle>
+            <a:lvl1pPr algn="l">
+              <a:defRPr sz="1100"/>
+            </a:lvl1pPr>
+          </a:lstStyle>
+          <a:p>
+            <a:r>
+              <a:rPr lang="bg-BG" sz="1100" dirty="0"/>
+              <a:t>Работна група </a:t>
+            </a:r>
+            <a:r>
+              <a:rPr lang="bg-BG" dirty="0"/>
+              <a:t>"Образование по програмиране и ИТ"</a:t>
+            </a:r>
+            <a:r>
+              <a:rPr lang="bg-BG" sz="1100" dirty="0"/>
+              <a:t>, с подкрепата на </a:t>
+            </a:r>
+            <a:r>
+              <a:rPr lang="en-US" sz="1100" dirty="0">
+                <a:hlinkClick r:id="rId3"/>
+              </a:rPr>
+              <a:t>SoftUni</a:t>
+            </a:r>
+            <a:endParaRPr lang="en-US" sz="1100" dirty="0"/>
+          </a:p>
+        </p:txBody>
+      </p:sp>
+    </p:spTree>
+    <p:extLst>
+      <p:ext uri="{BB962C8B-B14F-4D97-AF65-F5344CB8AC3E}">
+        <p14:creationId xmlns:p14="http://schemas.microsoft.com/office/powerpoint/2010/main" val="2007979410"/>
+      </p:ext>
+    </p:extLst>
+  </p:cSld>
+  <p:clrMapOvr>
+    <a:masterClrMapping/>
+  </p:clrMapOvr>
+</p:notes>
+</file>
+
+<file path=ppt/notesSlides/notesSlide12.xml><?xml version="1.0" encoding="utf-8"?>
+<p:notes xmlns:a="http://schemas.openxmlformats.org/drawingml/2006/main" xmlns:r="http://schemas.openxmlformats.org/officeDocument/2006/relationships" xmlns:p="http://schemas.openxmlformats.org/presentationml/2006/main">
+  <p:cSld>
+    <p:spTree>
+      <p:nvGrpSpPr>
+        <p:cNvPr id="1" name=""/>
+        <p:cNvGrpSpPr/>
+        <p:nvPr/>
+      </p:nvGrpSpPr>
+      <p:grpSpPr>
+        <a:xfrm>
+          <a:off x="0" y="0"/>
+          <a:ext cx="0" cy="0"/>
+          <a:chOff x="0" y="0"/>
+          <a:chExt cx="0" cy="0"/>
+        </a:xfrm>
+      </p:grpSpPr>
+      <p:sp>
+        <p:nvSpPr>
+          <p:cNvPr id="2" name="Slide Image Placeholder 1"/>
+          <p:cNvSpPr>
+            <a:spLocks noGrp="1" noRot="1" noChangeAspect="1"/>
+          </p:cNvSpPr>
+          <p:nvPr>
+            <p:ph type="sldImg"/>
+          </p:nvPr>
+        </p:nvSpPr>
+        <p:spPr/>
+      </p:sp>
+      <p:sp>
+        <p:nvSpPr>
+          <p:cNvPr id="3" name="Notes Placeholder 2"/>
+          <p:cNvSpPr>
+            <a:spLocks noGrp="1"/>
+          </p:cNvSpPr>
+          <p:nvPr>
+            <p:ph type="body" idx="1"/>
+          </p:nvPr>
+        </p:nvSpPr>
+        <p:spPr/>
+        <p:txBody>
+          <a:bodyPr/>
+          <a:lstStyle/>
+          <a:p>
+            <a:endParaRPr lang="en-US"/>
+          </a:p>
+        </p:txBody>
+      </p:sp>
+      <p:sp>
+        <p:nvSpPr>
+          <p:cNvPr id="6" name="Slide Number Placeholder 5">
+            <a:extLst>
+              <a:ext uri="{FF2B5EF4-FFF2-40B4-BE49-F238E27FC236}">
+                <a16:creationId xmlns:a16="http://schemas.microsoft.com/office/drawing/2014/main" id="{6627548A-4D3C-449B-81A5-FA4BE4628490}"/>
+              </a:ext>
+            </a:extLst>
+          </p:cNvPr>
+          <p:cNvSpPr txBox="1">
+            <a:spLocks/>
+          </p:cNvSpPr>
+          <p:nvPr/>
+        </p:nvSpPr>
+        <p:spPr>
+          <a:xfrm>
+            <a:off x="6488999" y="8847000"/>
+            <a:ext cx="367414" cy="297000"/>
+          </a:xfrm>
+          <a:prstGeom prst="rect">
+            <a:avLst/>
+          </a:prstGeom>
+        </p:spPr>
+        <p:txBody>
+          <a:bodyPr vert="horz" lIns="91440" tIns="45720" rIns="91440" bIns="45720" rtlCol="0" anchor="b"/>
+          <a:lstStyle>
+            <a:defPPr>
+              <a:defRPr lang="en-US"/>
+            </a:defPPr>
+            <a:lvl1pPr marL="0" algn="r" defTabSz="914400" rtl="0" eaLnBrk="1" latinLnBrk="0" hangingPunct="1">
+              <a:defRPr sz="1200" kern="1200">
+                <a:solidFill>
+                  <a:schemeClr val="tx1"/>
+                </a:solidFill>
+                <a:latin typeface="+mn-lt"/>
+                <a:ea typeface="+mn-ea"/>
+                <a:cs typeface="+mn-cs"/>
+              </a:defRPr>
+            </a:lvl1pPr>
+            <a:lvl2pPr marL="457200" algn="l" defTabSz="914400" rtl="0" eaLnBrk="1" latinLnBrk="0" hangingPunct="1">
+              <a:defRPr sz="1800" kern="1200">
+                <a:solidFill>
+                  <a:schemeClr val="tx1"/>
+                </a:solidFill>
+                <a:latin typeface="+mn-lt"/>
+                <a:ea typeface="+mn-ea"/>
+                <a:cs typeface="+mn-cs"/>
+              </a:defRPr>
+            </a:lvl2pPr>
+            <a:lvl3pPr marL="914400" algn="l" defTabSz="914400" rtl="0" eaLnBrk="1" latinLnBrk="0" hangingPunct="1">
+              <a:defRPr sz="1800" kern="1200">
+                <a:solidFill>
+                  <a:schemeClr val="tx1"/>
+                </a:solidFill>
+                <a:latin typeface="+mn-lt"/>
+                <a:ea typeface="+mn-ea"/>
+                <a:cs typeface="+mn-cs"/>
+              </a:defRPr>
+            </a:lvl3pPr>
+            <a:lvl4pPr marL="1371600" algn="l" defTabSz="914400" rtl="0" eaLnBrk="1" latinLnBrk="0" hangingPunct="1">
+              <a:defRPr sz="1800" kern="1200">
+                <a:solidFill>
+                  <a:schemeClr val="tx1"/>
+                </a:solidFill>
+                <a:latin typeface="+mn-lt"/>
+                <a:ea typeface="+mn-ea"/>
+                <a:cs typeface="+mn-cs"/>
+              </a:defRPr>
+            </a:lvl4pPr>
+            <a:lvl5pPr marL="1828800" algn="l" defTabSz="914400" rtl="0" eaLnBrk="1" latinLnBrk="0" hangingPunct="1">
+              <a:defRPr sz="1800" kern="1200">
+                <a:solidFill>
+                  <a:schemeClr val="tx1"/>
+                </a:solidFill>
+                <a:latin typeface="+mn-lt"/>
+                <a:ea typeface="+mn-ea"/>
+                <a:cs typeface="+mn-cs"/>
+              </a:defRPr>
+            </a:lvl5pPr>
+            <a:lvl6pPr marL="2286000" algn="l" defTabSz="914400" rtl="0" eaLnBrk="1" latinLnBrk="0" hangingPunct="1">
+              <a:defRPr sz="1800" kern="1200">
+                <a:solidFill>
+                  <a:schemeClr val="tx1"/>
+                </a:solidFill>
+                <a:latin typeface="+mn-lt"/>
+                <a:ea typeface="+mn-ea"/>
+                <a:cs typeface="+mn-cs"/>
+              </a:defRPr>
+            </a:lvl6pPr>
+            <a:lvl7pPr marL="2743200" algn="l" defTabSz="914400" rtl="0" eaLnBrk="1" latinLnBrk="0" hangingPunct="1">
+              <a:defRPr sz="1800" kern="1200">
+                <a:solidFill>
+                  <a:schemeClr val="tx1"/>
+                </a:solidFill>
+                <a:latin typeface="+mn-lt"/>
+                <a:ea typeface="+mn-ea"/>
+                <a:cs typeface="+mn-cs"/>
+              </a:defRPr>
+            </a:lvl7pPr>
+            <a:lvl8pPr marL="3200400" algn="l" defTabSz="914400" rtl="0" eaLnBrk="1" latinLnBrk="0" hangingPunct="1">
+              <a:defRPr sz="1800" kern="1200">
+                <a:solidFill>
+                  <a:schemeClr val="tx1"/>
+                </a:solidFill>
+                <a:latin typeface="+mn-lt"/>
+                <a:ea typeface="+mn-ea"/>
+                <a:cs typeface="+mn-cs"/>
+              </a:defRPr>
+            </a:lvl8pPr>
+            <a:lvl9pPr marL="3657600" algn="l" defTabSz="914400" rtl="0" eaLnBrk="1" latinLnBrk="0" hangingPunct="1">
+              <a:defRPr sz="1800" kern="1200">
+                <a:solidFill>
+                  <a:schemeClr val="tx1"/>
+                </a:solidFill>
+                <a:latin typeface="+mn-lt"/>
+                <a:ea typeface="+mn-ea"/>
+                <a:cs typeface="+mn-cs"/>
+              </a:defRPr>
+            </a:lvl9pPr>
+          </a:lstStyle>
+          <a:p>
+            <a:fld id="{3EBA5BD7-F043-4D1B-AA17-CD412FC534DE}" type="slidenum">
+              <a:rPr lang="en-US" smtClean="0"/>
+              <a:pPr/>
+              <a:t>37</a:t>
+            </a:fld>
+            <a:endParaRPr lang="en-US" dirty="0"/>
+          </a:p>
+        </p:txBody>
+      </p:sp>
+      <p:sp>
+        <p:nvSpPr>
+          <p:cNvPr id="5" name="Footer Placeholder 7">
+            <a:extLst>
+              <a:ext uri="{FF2B5EF4-FFF2-40B4-BE49-F238E27FC236}">
+                <a16:creationId xmlns:a16="http://schemas.microsoft.com/office/drawing/2014/main" id="{C43D7C48-C60E-C798-AF10-2753C9FD587C}"/>
+              </a:ext>
+            </a:extLst>
+          </p:cNvPr>
+          <p:cNvSpPr>
+            <a:spLocks noGrp="1"/>
+          </p:cNvSpPr>
+          <p:nvPr>
+            <p:ph type="ftr" sz="quarter" idx="4"/>
+          </p:nvPr>
+        </p:nvSpPr>
+        <p:spPr>
+          <a:xfrm>
+            <a:off x="-1" y="8892000"/>
+            <a:ext cx="6488999" cy="252000"/>
+          </a:xfrm>
+          <a:prstGeom prst="rect">
+            <a:avLst/>
+          </a:prstGeom>
+        </p:spPr>
+        <p:txBody>
+          <a:bodyPr vert="horz" lIns="91440" tIns="45720" rIns="91440" bIns="45720" rtlCol="0" anchor="b"/>
+          <a:lstStyle>
+            <a:lvl1pPr algn="l">
+              <a:defRPr sz="1100"/>
+            </a:lvl1pPr>
+          </a:lstStyle>
+          <a:p>
+            <a:r>
+              <a:rPr lang="bg-BG" sz="1100" dirty="0"/>
+              <a:t>Работна група </a:t>
+            </a:r>
+            <a:r>
+              <a:rPr lang="bg-BG" dirty="0"/>
+              <a:t>"Образование по програмиране и ИТ"</a:t>
+            </a:r>
+            <a:r>
+              <a:rPr lang="bg-BG" sz="1100" dirty="0"/>
+              <a:t>, с подкрепата на </a:t>
+            </a:r>
+            <a:r>
+              <a:rPr lang="en-US" sz="1100" dirty="0">
+                <a:hlinkClick r:id="rId3"/>
+              </a:rPr>
+              <a:t>SoftUni</a:t>
+            </a:r>
+            <a:endParaRPr lang="en-US" sz="1100" dirty="0"/>
+          </a:p>
+        </p:txBody>
+      </p:sp>
+    </p:spTree>
+    <p:extLst>
+      <p:ext uri="{BB962C8B-B14F-4D97-AF65-F5344CB8AC3E}">
+        <p14:creationId xmlns:p14="http://schemas.microsoft.com/office/powerpoint/2010/main" val="748996159"/>
+      </p:ext>
+    </p:extLst>
+  </p:cSld>
+  <p:clrMapOvr>
+    <a:masterClrMapping/>
+  </p:clrMapOvr>
+</p:notes>
+</file>
+
 <file path=ppt/notesSlides/notesSlide2.xml><?xml version="1.0" encoding="utf-8"?>
 <p:notes xmlns:a="http://schemas.openxmlformats.org/drawingml/2006/main" xmlns:r="http://schemas.openxmlformats.org/officeDocument/2006/relationships" xmlns:p="http://schemas.openxmlformats.org/presentationml/2006/main">
   <p:cSld>
@@ -1841,129 +2585,22 @@
       </p:sp>
       <p:sp>
         <p:nvSpPr>
-          <p:cNvPr id="7" name="Slide Number Placeholder 5">
-            <a:extLst>
-              <a:ext uri="{FF2B5EF4-FFF2-40B4-BE49-F238E27FC236}">
-                <a16:creationId xmlns:a16="http://schemas.microsoft.com/office/drawing/2014/main" id="{E65F1CA9-65DC-416B-8882-B3A5E415CE67}"/>
-              </a:ext>
-            </a:extLst>
-          </p:cNvPr>
-          <p:cNvSpPr txBox="1">
-            <a:spLocks/>
+          <p:cNvPr id="4" name="Slide Number Placeholder 3"/>
+          <p:cNvSpPr>
+            <a:spLocks noGrp="1"/>
           </p:cNvSpPr>
-          <p:nvPr/>
+          <p:nvPr>
+            <p:ph type="sldNum" sz="quarter" idx="5"/>
+          </p:nvPr>
         </p:nvSpPr>
-        <p:spPr>
-          <a:xfrm>
-            <a:off x="6488999" y="8847000"/>
-            <a:ext cx="367414" cy="297000"/>
-          </a:xfrm>
-          <a:prstGeom prst="rect">
-            <a:avLst/>
-          </a:prstGeom>
-        </p:spPr>
+        <p:spPr/>
         <p:txBody>
-          <a:bodyPr vert="horz" lIns="91440" tIns="45720" rIns="91440" bIns="45720" rtlCol="0" anchor="b"/>
-          <a:lstStyle>
-            <a:defPPr>
-              <a:defRPr lang="en-US"/>
-            </a:defPPr>
-            <a:lvl1pPr marL="0" algn="r" defTabSz="914400" rtl="0" eaLnBrk="1" latinLnBrk="0" hangingPunct="1">
-              <a:defRPr sz="1200" kern="1200">
-                <a:solidFill>
-                  <a:schemeClr val="tx1"/>
-                </a:solidFill>
-                <a:latin typeface="+mn-lt"/>
-                <a:ea typeface="+mn-ea"/>
-                <a:cs typeface="+mn-cs"/>
-              </a:defRPr>
-            </a:lvl1pPr>
-            <a:lvl2pPr marL="457200" algn="l" defTabSz="914400" rtl="0" eaLnBrk="1" latinLnBrk="0" hangingPunct="1">
-              <a:defRPr sz="1800" kern="1200">
-                <a:solidFill>
-                  <a:schemeClr val="tx1"/>
-                </a:solidFill>
-                <a:latin typeface="+mn-lt"/>
-                <a:ea typeface="+mn-ea"/>
-                <a:cs typeface="+mn-cs"/>
-              </a:defRPr>
-            </a:lvl2pPr>
-            <a:lvl3pPr marL="914400" algn="l" defTabSz="914400" rtl="0" eaLnBrk="1" latinLnBrk="0" hangingPunct="1">
-              <a:defRPr sz="1800" kern="1200">
-                <a:solidFill>
-                  <a:schemeClr val="tx1"/>
-                </a:solidFill>
-                <a:latin typeface="+mn-lt"/>
-                <a:ea typeface="+mn-ea"/>
-                <a:cs typeface="+mn-cs"/>
-              </a:defRPr>
-            </a:lvl3pPr>
-            <a:lvl4pPr marL="1371600" algn="l" defTabSz="914400" rtl="0" eaLnBrk="1" latinLnBrk="0" hangingPunct="1">
-              <a:defRPr sz="1800" kern="1200">
-                <a:solidFill>
-                  <a:schemeClr val="tx1"/>
-                </a:solidFill>
-                <a:latin typeface="+mn-lt"/>
-                <a:ea typeface="+mn-ea"/>
-                <a:cs typeface="+mn-cs"/>
-              </a:defRPr>
-            </a:lvl4pPr>
-            <a:lvl5pPr marL="1828800" algn="l" defTabSz="914400" rtl="0" eaLnBrk="1" latinLnBrk="0" hangingPunct="1">
-              <a:defRPr sz="1800" kern="1200">
-                <a:solidFill>
-                  <a:schemeClr val="tx1"/>
-                </a:solidFill>
-                <a:latin typeface="+mn-lt"/>
-                <a:ea typeface="+mn-ea"/>
-                <a:cs typeface="+mn-cs"/>
-              </a:defRPr>
-            </a:lvl5pPr>
-            <a:lvl6pPr marL="2286000" algn="l" defTabSz="914400" rtl="0" eaLnBrk="1" latinLnBrk="0" hangingPunct="1">
-              <a:defRPr sz="1800" kern="1200">
-                <a:solidFill>
-                  <a:schemeClr val="tx1"/>
-                </a:solidFill>
-                <a:latin typeface="+mn-lt"/>
-                <a:ea typeface="+mn-ea"/>
-                <a:cs typeface="+mn-cs"/>
-              </a:defRPr>
-            </a:lvl6pPr>
-            <a:lvl7pPr marL="2743200" algn="l" defTabSz="914400" rtl="0" eaLnBrk="1" latinLnBrk="0" hangingPunct="1">
-              <a:defRPr sz="1800" kern="1200">
-                <a:solidFill>
-                  <a:schemeClr val="tx1"/>
-                </a:solidFill>
-                <a:latin typeface="+mn-lt"/>
-                <a:ea typeface="+mn-ea"/>
-                <a:cs typeface="+mn-cs"/>
-              </a:defRPr>
-            </a:lvl7pPr>
-            <a:lvl8pPr marL="3200400" algn="l" defTabSz="914400" rtl="0" eaLnBrk="1" latinLnBrk="0" hangingPunct="1">
-              <a:defRPr sz="1800" kern="1200">
-                <a:solidFill>
-                  <a:schemeClr val="tx1"/>
-                </a:solidFill>
-                <a:latin typeface="+mn-lt"/>
-                <a:ea typeface="+mn-ea"/>
-                <a:cs typeface="+mn-cs"/>
-              </a:defRPr>
-            </a:lvl8pPr>
-            <a:lvl9pPr marL="3657600" algn="l" defTabSz="914400" rtl="0" eaLnBrk="1" latinLnBrk="0" hangingPunct="1">
-              <a:defRPr sz="1800" kern="1200">
-                <a:solidFill>
-                  <a:schemeClr val="tx1"/>
-                </a:solidFill>
-                <a:latin typeface="+mn-lt"/>
-                <a:ea typeface="+mn-ea"/>
-                <a:cs typeface="+mn-cs"/>
-              </a:defRPr>
-            </a:lvl9pPr>
-          </a:lstStyle>
-          <a:p>
-            <a:fld id="{3EBA5BD7-F043-4D1B-AA17-CD412FC534DE}" type="slidenum">
+          <a:bodyPr/>
+          <a:lstStyle/>
+          <a:p>
+            <a:fld id="{2BF067CD-8E6B-4360-9AA8-C5DF2A48A6D1}" type="slidenum">
               <a:rPr lang="en-US" smtClean="0"/>
-              <a:pPr/>
-              <a:t>32</a:t>
+              <a:t>31</a:t>
             </a:fld>
             <a:endParaRPr lang="en-US" dirty="0"/>
           </a:p>
@@ -1971,13 +2608,7 @@
       </p:sp>
       <p:sp>
         <p:nvSpPr>
-          <p:cNvPr id="5" name="Footer Placeholder 7">
-            <a:extLst>
-              <a:ext uri="{FF2B5EF4-FFF2-40B4-BE49-F238E27FC236}">
-                <a16:creationId xmlns:a16="http://schemas.microsoft.com/office/drawing/2014/main" id="{912A3AAE-885B-D70C-2870-9BDE460702C3}"/>
-              </a:ext>
-            </a:extLst>
-          </p:cNvPr>
+          <p:cNvPr id="5" name="Footer Placeholder 4"/>
           <p:cNvSpPr>
             <a:spLocks noGrp="1"/>
           </p:cNvSpPr>
@@ -1985,37 +2616,25 @@
             <p:ph type="ftr" sz="quarter" idx="4"/>
           </p:nvPr>
         </p:nvSpPr>
-        <p:spPr>
-          <a:xfrm>
-            <a:off x="-1" y="8892000"/>
-            <a:ext cx="6488999" cy="252000"/>
-          </a:xfrm>
-          <a:prstGeom prst="rect">
-            <a:avLst/>
-          </a:prstGeom>
-        </p:spPr>
+        <p:spPr/>
         <p:txBody>
-          <a:bodyPr vert="horz" lIns="91440" tIns="45720" rIns="91440" bIns="45720" rtlCol="0" anchor="b"/>
-          <a:lstStyle>
-            <a:lvl1pPr algn="l">
-              <a:defRPr sz="1100"/>
-            </a:lvl1pPr>
-          </a:lstStyle>
-          <a:p>
-            <a:r>
-              <a:rPr lang="bg-BG" sz="1100" dirty="0"/>
+          <a:bodyPr/>
+          <a:lstStyle/>
+          <a:p>
+            <a:r>
+              <a:rPr lang="bg-BG" sz="1100"/>
               <a:t>Работна група </a:t>
             </a:r>
             <a:r>
-              <a:rPr lang="bg-BG" dirty="0"/>
+              <a:rPr lang="bg-BG"/>
               <a:t>"Образование по програмиране и ИТ"</a:t>
             </a:r>
             <a:r>
-              <a:rPr lang="bg-BG" sz="1100" dirty="0"/>
+              <a:rPr lang="bg-BG" sz="1100"/>
               <a:t>, с подкрепата на </a:t>
             </a:r>
             <a:r>
-              <a:rPr lang="en-US" sz="1100" dirty="0">
+              <a:rPr lang="en-US" sz="1100">
                 <a:hlinkClick r:id="rId3"/>
               </a:rPr>
               <a:t>SoftUni</a:t>
@@ -2027,7 +2646,7 @@
     </p:spTree>
     <p:extLst>
       <p:ext uri="{BB962C8B-B14F-4D97-AF65-F5344CB8AC3E}">
-        <p14:creationId xmlns:p14="http://schemas.microsoft.com/office/powerpoint/2010/main" val="1661027275"/>
+        <p14:creationId xmlns:p14="http://schemas.microsoft.com/office/powerpoint/2010/main" val="3597251775"/>
       </p:ext>
     </p:extLst>
   </p:cSld>
@@ -2087,129 +2706,22 @@
       </p:sp>
       <p:sp>
         <p:nvSpPr>
-          <p:cNvPr id="7" name="Slide Number Placeholder 5">
-            <a:extLst>
-              <a:ext uri="{FF2B5EF4-FFF2-40B4-BE49-F238E27FC236}">
-                <a16:creationId xmlns:a16="http://schemas.microsoft.com/office/drawing/2014/main" id="{5049B984-F964-47FF-8179-0A3007CE21CD}"/>
-              </a:ext>
-            </a:extLst>
-          </p:cNvPr>
-          <p:cNvSpPr txBox="1">
-            <a:spLocks/>
+          <p:cNvPr id="4" name="Slide Number Placeholder 3"/>
+          <p:cNvSpPr>
+            <a:spLocks noGrp="1"/>
           </p:cNvSpPr>
-          <p:nvPr/>
+          <p:nvPr>
+            <p:ph type="sldNum" sz="quarter" idx="5"/>
+          </p:nvPr>
         </p:nvSpPr>
-        <p:spPr>
-          <a:xfrm>
-            <a:off x="6488999" y="8847000"/>
-            <a:ext cx="367414" cy="297000"/>
-          </a:xfrm>
-          <a:prstGeom prst="rect">
-            <a:avLst/>
-          </a:prstGeom>
-        </p:spPr>
+        <p:spPr/>
         <p:txBody>
-          <a:bodyPr vert="horz" lIns="91440" tIns="45720" rIns="91440" bIns="45720" rtlCol="0" anchor="b"/>
-          <a:lstStyle>
-            <a:defPPr>
-              <a:defRPr lang="en-US"/>
-            </a:defPPr>
-            <a:lvl1pPr marL="0" algn="r" defTabSz="914400" rtl="0" eaLnBrk="1" latinLnBrk="0" hangingPunct="1">
-              <a:defRPr sz="1200" kern="1200">
-                <a:solidFill>
-                  <a:schemeClr val="tx1"/>
-                </a:solidFill>
-                <a:latin typeface="+mn-lt"/>
-                <a:ea typeface="+mn-ea"/>
-                <a:cs typeface="+mn-cs"/>
-              </a:defRPr>
-            </a:lvl1pPr>
-            <a:lvl2pPr marL="457200" algn="l" defTabSz="914400" rtl="0" eaLnBrk="1" latinLnBrk="0" hangingPunct="1">
-              <a:defRPr sz="1800" kern="1200">
-                <a:solidFill>
-                  <a:schemeClr val="tx1"/>
-                </a:solidFill>
-                <a:latin typeface="+mn-lt"/>
-                <a:ea typeface="+mn-ea"/>
-                <a:cs typeface="+mn-cs"/>
-              </a:defRPr>
-            </a:lvl2pPr>
-            <a:lvl3pPr marL="914400" algn="l" defTabSz="914400" rtl="0" eaLnBrk="1" latinLnBrk="0" hangingPunct="1">
-              <a:defRPr sz="1800" kern="1200">
-                <a:solidFill>
-                  <a:schemeClr val="tx1"/>
-                </a:solidFill>
-                <a:latin typeface="+mn-lt"/>
-                <a:ea typeface="+mn-ea"/>
-                <a:cs typeface="+mn-cs"/>
-              </a:defRPr>
-            </a:lvl3pPr>
-            <a:lvl4pPr marL="1371600" algn="l" defTabSz="914400" rtl="0" eaLnBrk="1" latinLnBrk="0" hangingPunct="1">
-              <a:defRPr sz="1800" kern="1200">
-                <a:solidFill>
-                  <a:schemeClr val="tx1"/>
-                </a:solidFill>
-                <a:latin typeface="+mn-lt"/>
-                <a:ea typeface="+mn-ea"/>
-                <a:cs typeface="+mn-cs"/>
-              </a:defRPr>
-            </a:lvl4pPr>
-            <a:lvl5pPr marL="1828800" algn="l" defTabSz="914400" rtl="0" eaLnBrk="1" latinLnBrk="0" hangingPunct="1">
-              <a:defRPr sz="1800" kern="1200">
-                <a:solidFill>
-                  <a:schemeClr val="tx1"/>
-                </a:solidFill>
-                <a:latin typeface="+mn-lt"/>
-                <a:ea typeface="+mn-ea"/>
-                <a:cs typeface="+mn-cs"/>
-              </a:defRPr>
-            </a:lvl5pPr>
-            <a:lvl6pPr marL="2286000" algn="l" defTabSz="914400" rtl="0" eaLnBrk="1" latinLnBrk="0" hangingPunct="1">
-              <a:defRPr sz="1800" kern="1200">
-                <a:solidFill>
-                  <a:schemeClr val="tx1"/>
-                </a:solidFill>
-                <a:latin typeface="+mn-lt"/>
-                <a:ea typeface="+mn-ea"/>
-                <a:cs typeface="+mn-cs"/>
-              </a:defRPr>
-            </a:lvl6pPr>
-            <a:lvl7pPr marL="2743200" algn="l" defTabSz="914400" rtl="0" eaLnBrk="1" latinLnBrk="0" hangingPunct="1">
-              <a:defRPr sz="1800" kern="1200">
-                <a:solidFill>
-                  <a:schemeClr val="tx1"/>
-                </a:solidFill>
-                <a:latin typeface="+mn-lt"/>
-                <a:ea typeface="+mn-ea"/>
-                <a:cs typeface="+mn-cs"/>
-              </a:defRPr>
-            </a:lvl7pPr>
-            <a:lvl8pPr marL="3200400" algn="l" defTabSz="914400" rtl="0" eaLnBrk="1" latinLnBrk="0" hangingPunct="1">
-              <a:defRPr sz="1800" kern="1200">
-                <a:solidFill>
-                  <a:schemeClr val="tx1"/>
-                </a:solidFill>
-                <a:latin typeface="+mn-lt"/>
-                <a:ea typeface="+mn-ea"/>
-                <a:cs typeface="+mn-cs"/>
-              </a:defRPr>
-            </a:lvl8pPr>
-            <a:lvl9pPr marL="3657600" algn="l" defTabSz="914400" rtl="0" eaLnBrk="1" latinLnBrk="0" hangingPunct="1">
-              <a:defRPr sz="1800" kern="1200">
-                <a:solidFill>
-                  <a:schemeClr val="tx1"/>
-                </a:solidFill>
-                <a:latin typeface="+mn-lt"/>
-                <a:ea typeface="+mn-ea"/>
-                <a:cs typeface="+mn-cs"/>
-              </a:defRPr>
-            </a:lvl9pPr>
-          </a:lstStyle>
-          <a:p>
-            <a:fld id="{3EBA5BD7-F043-4D1B-AA17-CD412FC534DE}" type="slidenum">
+          <a:bodyPr/>
+          <a:lstStyle/>
+          <a:p>
+            <a:fld id="{2BF067CD-8E6B-4360-9AA8-C5DF2A48A6D1}" type="slidenum">
               <a:rPr lang="en-US" smtClean="0"/>
-              <a:pPr/>
-              <a:t>33</a:t>
+              <a:t>32</a:t>
             </a:fld>
             <a:endParaRPr lang="en-US" dirty="0"/>
           </a:p>
@@ -2217,13 +2729,7 @@
       </p:sp>
       <p:sp>
         <p:nvSpPr>
-          <p:cNvPr id="5" name="Footer Placeholder 7">
-            <a:extLst>
-              <a:ext uri="{FF2B5EF4-FFF2-40B4-BE49-F238E27FC236}">
-                <a16:creationId xmlns:a16="http://schemas.microsoft.com/office/drawing/2014/main" id="{87873718-4EF7-D4BA-768F-C09AAEC16FC2}"/>
-              </a:ext>
-            </a:extLst>
-          </p:cNvPr>
+          <p:cNvPr id="5" name="Footer Placeholder 4"/>
           <p:cNvSpPr>
             <a:spLocks noGrp="1"/>
           </p:cNvSpPr>
@@ -2231,37 +2737,25 @@
             <p:ph type="ftr" sz="quarter" idx="4"/>
           </p:nvPr>
         </p:nvSpPr>
-        <p:spPr>
-          <a:xfrm>
-            <a:off x="-1" y="8892000"/>
-            <a:ext cx="6488999" cy="252000"/>
-          </a:xfrm>
-          <a:prstGeom prst="rect">
-            <a:avLst/>
-          </a:prstGeom>
-        </p:spPr>
+        <p:spPr/>
         <p:txBody>
-          <a:bodyPr vert="horz" lIns="91440" tIns="45720" rIns="91440" bIns="45720" rtlCol="0" anchor="b"/>
-          <a:lstStyle>
-            <a:lvl1pPr algn="l">
-              <a:defRPr sz="1100"/>
-            </a:lvl1pPr>
-          </a:lstStyle>
-          <a:p>
-            <a:r>
-              <a:rPr lang="bg-BG" sz="1100" dirty="0"/>
+          <a:bodyPr/>
+          <a:lstStyle/>
+          <a:p>
+            <a:r>
+              <a:rPr lang="bg-BG" sz="1100"/>
               <a:t>Работна група </a:t>
             </a:r>
             <a:r>
-              <a:rPr lang="bg-BG" dirty="0"/>
+              <a:rPr lang="bg-BG"/>
               <a:t>"Образование по програмиране и ИТ"</a:t>
             </a:r>
             <a:r>
-              <a:rPr lang="bg-BG" sz="1100" dirty="0"/>
+              <a:rPr lang="bg-BG" sz="1100"/>
               <a:t>, с подкрепата на </a:t>
             </a:r>
             <a:r>
-              <a:rPr lang="en-US" sz="1100" dirty="0">
+              <a:rPr lang="en-US" sz="1100">
                 <a:hlinkClick r:id="rId3"/>
               </a:rPr>
               <a:t>SoftUni</a:t>
@@ -2273,7 +2767,7 @@
     </p:spTree>
     <p:extLst>
       <p:ext uri="{BB962C8B-B14F-4D97-AF65-F5344CB8AC3E}">
-        <p14:creationId xmlns:p14="http://schemas.microsoft.com/office/powerpoint/2010/main" val="2007979410"/>
+        <p14:creationId xmlns:p14="http://schemas.microsoft.com/office/powerpoint/2010/main" val="3366066338"/>
       </p:ext>
     </p:extLst>
   </p:cSld>
@@ -2327,135 +2821,28 @@
           <a:bodyPr/>
           <a:lstStyle/>
           <a:p>
-            <a:endParaRPr lang="en-US"/>
+            <a:endParaRPr lang="en-US" dirty="0"/>
           </a:p>
         </p:txBody>
       </p:sp>
       <p:sp>
         <p:nvSpPr>
-          <p:cNvPr id="6" name="Slide Number Placeholder 5">
-            <a:extLst>
-              <a:ext uri="{FF2B5EF4-FFF2-40B4-BE49-F238E27FC236}">
-                <a16:creationId xmlns:a16="http://schemas.microsoft.com/office/drawing/2014/main" id="{6627548A-4D3C-449B-81A5-FA4BE4628490}"/>
-              </a:ext>
-            </a:extLst>
-          </p:cNvPr>
-          <p:cNvSpPr txBox="1">
-            <a:spLocks/>
+          <p:cNvPr id="4" name="Slide Number Placeholder 3"/>
+          <p:cNvSpPr>
+            <a:spLocks noGrp="1"/>
           </p:cNvSpPr>
-          <p:nvPr/>
+          <p:nvPr>
+            <p:ph type="sldNum" sz="quarter" idx="5"/>
+          </p:nvPr>
         </p:nvSpPr>
-        <p:spPr>
-          <a:xfrm>
-            <a:off x="6488999" y="8847000"/>
-            <a:ext cx="367414" cy="297000"/>
-          </a:xfrm>
-          <a:prstGeom prst="rect">
-            <a:avLst/>
-          </a:prstGeom>
-        </p:spPr>
+        <p:spPr/>
         <p:txBody>
-          <a:bodyPr vert="horz" lIns="91440" tIns="45720" rIns="91440" bIns="45720" rtlCol="0" anchor="b"/>
-          <a:lstStyle>
-            <a:defPPr>
-              <a:defRPr lang="en-US"/>
-            </a:defPPr>
-            <a:lvl1pPr marL="0" algn="r" defTabSz="914400" rtl="0" eaLnBrk="1" latinLnBrk="0" hangingPunct="1">
-              <a:defRPr sz="1200" kern="1200">
-                <a:solidFill>
-                  <a:schemeClr val="tx1"/>
-                </a:solidFill>
-                <a:latin typeface="+mn-lt"/>
-                <a:ea typeface="+mn-ea"/>
-                <a:cs typeface="+mn-cs"/>
-              </a:defRPr>
-            </a:lvl1pPr>
-            <a:lvl2pPr marL="457200" algn="l" defTabSz="914400" rtl="0" eaLnBrk="1" latinLnBrk="0" hangingPunct="1">
-              <a:defRPr sz="1800" kern="1200">
-                <a:solidFill>
-                  <a:schemeClr val="tx1"/>
-                </a:solidFill>
-                <a:latin typeface="+mn-lt"/>
-                <a:ea typeface="+mn-ea"/>
-                <a:cs typeface="+mn-cs"/>
-              </a:defRPr>
-            </a:lvl2pPr>
-            <a:lvl3pPr marL="914400" algn="l" defTabSz="914400" rtl="0" eaLnBrk="1" latinLnBrk="0" hangingPunct="1">
-              <a:defRPr sz="1800" kern="1200">
-                <a:solidFill>
-                  <a:schemeClr val="tx1"/>
-                </a:solidFill>
-                <a:latin typeface="+mn-lt"/>
-                <a:ea typeface="+mn-ea"/>
-                <a:cs typeface="+mn-cs"/>
-              </a:defRPr>
-            </a:lvl3pPr>
-            <a:lvl4pPr marL="1371600" algn="l" defTabSz="914400" rtl="0" eaLnBrk="1" latinLnBrk="0" hangingPunct="1">
-              <a:defRPr sz="1800" kern="1200">
-                <a:solidFill>
-                  <a:schemeClr val="tx1"/>
-                </a:solidFill>
-                <a:latin typeface="+mn-lt"/>
-                <a:ea typeface="+mn-ea"/>
-                <a:cs typeface="+mn-cs"/>
-              </a:defRPr>
-            </a:lvl4pPr>
-            <a:lvl5pPr marL="1828800" algn="l" defTabSz="914400" rtl="0" eaLnBrk="1" latinLnBrk="0" hangingPunct="1">
-              <a:defRPr sz="1800" kern="1200">
-                <a:solidFill>
-                  <a:schemeClr val="tx1"/>
-                </a:solidFill>
-                <a:latin typeface="+mn-lt"/>
-                <a:ea typeface="+mn-ea"/>
-                <a:cs typeface="+mn-cs"/>
-              </a:defRPr>
-            </a:lvl5pPr>
-            <a:lvl6pPr marL="2286000" algn="l" defTabSz="914400" rtl="0" eaLnBrk="1" latinLnBrk="0" hangingPunct="1">
-              <a:defRPr sz="1800" kern="1200">
-                <a:solidFill>
-                  <a:schemeClr val="tx1"/>
-                </a:solidFill>
-                <a:latin typeface="+mn-lt"/>
-                <a:ea typeface="+mn-ea"/>
-                <a:cs typeface="+mn-cs"/>
-              </a:defRPr>
-            </a:lvl6pPr>
-            <a:lvl7pPr marL="2743200" algn="l" defTabSz="914400" rtl="0" eaLnBrk="1" latinLnBrk="0" hangingPunct="1">
-              <a:defRPr sz="1800" kern="1200">
-                <a:solidFill>
-                  <a:schemeClr val="tx1"/>
-                </a:solidFill>
-                <a:latin typeface="+mn-lt"/>
-                <a:ea typeface="+mn-ea"/>
-                <a:cs typeface="+mn-cs"/>
-              </a:defRPr>
-            </a:lvl7pPr>
-            <a:lvl8pPr marL="3200400" algn="l" defTabSz="914400" rtl="0" eaLnBrk="1" latinLnBrk="0" hangingPunct="1">
-              <a:defRPr sz="1800" kern="1200">
-                <a:solidFill>
-                  <a:schemeClr val="tx1"/>
-                </a:solidFill>
-                <a:latin typeface="+mn-lt"/>
-                <a:ea typeface="+mn-ea"/>
-                <a:cs typeface="+mn-cs"/>
-              </a:defRPr>
-            </a:lvl8pPr>
-            <a:lvl9pPr marL="3657600" algn="l" defTabSz="914400" rtl="0" eaLnBrk="1" latinLnBrk="0" hangingPunct="1">
-              <a:defRPr sz="1800" kern="1200">
-                <a:solidFill>
-                  <a:schemeClr val="tx1"/>
-                </a:solidFill>
-                <a:latin typeface="+mn-lt"/>
-                <a:ea typeface="+mn-ea"/>
-                <a:cs typeface="+mn-cs"/>
-              </a:defRPr>
-            </a:lvl9pPr>
-          </a:lstStyle>
-          <a:p>
-            <a:fld id="{3EBA5BD7-F043-4D1B-AA17-CD412FC534DE}" type="slidenum">
+          <a:bodyPr/>
+          <a:lstStyle/>
+          <a:p>
+            <a:fld id="{2BF067CD-8E6B-4360-9AA8-C5DF2A48A6D1}" type="slidenum">
               <a:rPr lang="en-US" smtClean="0"/>
-              <a:pPr/>
-              <a:t>34</a:t>
+              <a:t>33</a:t>
             </a:fld>
             <a:endParaRPr lang="en-US" dirty="0"/>
           </a:p>
@@ -2463,13 +2850,7 @@
       </p:sp>
       <p:sp>
         <p:nvSpPr>
-          <p:cNvPr id="5" name="Footer Placeholder 7">
-            <a:extLst>
-              <a:ext uri="{FF2B5EF4-FFF2-40B4-BE49-F238E27FC236}">
-                <a16:creationId xmlns:a16="http://schemas.microsoft.com/office/drawing/2014/main" id="{C43D7C48-C60E-C798-AF10-2753C9FD587C}"/>
-              </a:ext>
-            </a:extLst>
-          </p:cNvPr>
+          <p:cNvPr id="5" name="Footer Placeholder 4"/>
           <p:cNvSpPr>
             <a:spLocks noGrp="1"/>
           </p:cNvSpPr>
@@ -2477,37 +2858,25 @@
             <p:ph type="ftr" sz="quarter" idx="4"/>
           </p:nvPr>
         </p:nvSpPr>
-        <p:spPr>
-          <a:xfrm>
-            <a:off x="-1" y="8892000"/>
-            <a:ext cx="6488999" cy="252000"/>
-          </a:xfrm>
-          <a:prstGeom prst="rect">
-            <a:avLst/>
-          </a:prstGeom>
-        </p:spPr>
+        <p:spPr/>
         <p:txBody>
-          <a:bodyPr vert="horz" lIns="91440" tIns="45720" rIns="91440" bIns="45720" rtlCol="0" anchor="b"/>
-          <a:lstStyle>
-            <a:lvl1pPr algn="l">
-              <a:defRPr sz="1100"/>
-            </a:lvl1pPr>
-          </a:lstStyle>
-          <a:p>
-            <a:r>
-              <a:rPr lang="bg-BG" sz="1100" dirty="0"/>
+          <a:bodyPr/>
+          <a:lstStyle/>
+          <a:p>
+            <a:r>
+              <a:rPr lang="bg-BG" sz="1100"/>
               <a:t>Работна група </a:t>
             </a:r>
             <a:r>
-              <a:rPr lang="bg-BG" dirty="0"/>
+              <a:rPr lang="bg-BG"/>
               <a:t>"Образование по програмиране и ИТ"</a:t>
             </a:r>
             <a:r>
-              <a:rPr lang="bg-BG" sz="1100" dirty="0"/>
+              <a:rPr lang="bg-BG" sz="1100"/>
               <a:t>, с подкрепата на </a:t>
             </a:r>
             <a:r>
-              <a:rPr lang="en-US" sz="1100" dirty="0">
+              <a:rPr lang="en-US" sz="1100">
                 <a:hlinkClick r:id="rId3"/>
               </a:rPr>
               <a:t>SoftUni</a:t>
@@ -2519,7 +2888,7 @@
     </p:spTree>
     <p:extLst>
       <p:ext uri="{BB962C8B-B14F-4D97-AF65-F5344CB8AC3E}">
-        <p14:creationId xmlns:p14="http://schemas.microsoft.com/office/powerpoint/2010/main" val="748996159"/>
+        <p14:creationId xmlns:p14="http://schemas.microsoft.com/office/powerpoint/2010/main" val="439396880"/>
       </p:ext>
     </p:extLst>
   </p:cSld>
@@ -18165,10 +18534,10 @@
       </p:sp>
       <p:pic>
         <p:nvPicPr>
-          <p:cNvPr id="8" name="Picture 7">
+          <p:cNvPr id="6" name="Picture 5">
             <a:extLst>
               <a:ext uri="{FF2B5EF4-FFF2-40B4-BE49-F238E27FC236}">
-                <a16:creationId xmlns:a16="http://schemas.microsoft.com/office/drawing/2014/main" id="{316C6291-EB23-44BC-5FEC-4BB5C10DD655}"/>
+                <a16:creationId xmlns:a16="http://schemas.microsoft.com/office/drawing/2014/main" id="{6A18D0D6-665C-85A7-CC59-6350C8243F28}"/>
               </a:ext>
             </a:extLst>
           </p:cNvPr>
@@ -18185,8 +18554,8 @@
         </p:blipFill>
         <p:spPr>
           <a:xfrm>
-            <a:off x="3556060" y="4372669"/>
-            <a:ext cx="5079879" cy="2146211"/>
+            <a:off x="3283404" y="4347050"/>
+            <a:ext cx="5625192" cy="2430000"/>
           </a:xfrm>
           <a:prstGeom prst="rect">
             <a:avLst/>
@@ -18318,6 +18687,33 @@
                                   </p:childTnLst>
                                 </p:cTn>
                               </p:par>
+                              <p:par>
+                                <p:cTn id="11" presetID="1" presetClass="entr" presetSubtype="0" fill="hold" nodeType="withEffect">
+                                  <p:stCondLst>
+                                    <p:cond delay="0"/>
+                                  </p:stCondLst>
+                                  <p:childTnLst>
+                                    <p:set>
+                                      <p:cBhvr>
+                                        <p:cTn id="12" dur="1" fill="hold">
+                                          <p:stCondLst>
+                                            <p:cond delay="0"/>
+                                          </p:stCondLst>
+                                        </p:cTn>
+                                        <p:tgtEl>
+                                          <p:spTgt spid="6"/>
+                                        </p:tgtEl>
+                                        <p:attrNameLst>
+                                          <p:attrName>style.visibility</p:attrName>
+                                        </p:attrNameLst>
+                                      </p:cBhvr>
+                                      <p:to>
+                                        <p:strVal val="visible"/>
+                                      </p:to>
+                                    </p:set>
+                                  </p:childTnLst>
+                                </p:cTn>
+                              </p:par>
                             </p:childTnLst>
                           </p:cTn>
                         </p:par>
@@ -18507,358 +18903,6 @@
       </p:grpSpPr>
       <p:sp>
         <p:nvSpPr>
-          <p:cNvPr id="2" name="Slide Number Placeholder 1">
-            <a:extLst>
-              <a:ext uri="{FF2B5EF4-FFF2-40B4-BE49-F238E27FC236}">
-                <a16:creationId xmlns:a16="http://schemas.microsoft.com/office/drawing/2014/main" id="{89DC3415-9264-B3C5-2A5D-527ED84BA1C5}"/>
-              </a:ext>
-            </a:extLst>
-          </p:cNvPr>
-          <p:cNvSpPr>
-            <a:spLocks noGrp="1"/>
-          </p:cNvSpPr>
-          <p:nvPr>
-            <p:ph type="sldNum" sz="quarter" idx="5"/>
-          </p:nvPr>
-        </p:nvSpPr>
-        <p:spPr/>
-        <p:txBody>
-          <a:bodyPr/>
-          <a:lstStyle/>
-          <a:p>
-            <a:fld id="{2BF067CD-8E6B-4360-9AA8-C5DF2A48A6D1}" type="slidenum">
-              <a:rPr lang="en-US" noProof="0" smtClean="0"/>
-              <a:pPr/>
-              <a:t>30</a:t>
-            </a:fld>
-            <a:endParaRPr lang="en-US" noProof="0" dirty="0"/>
-          </a:p>
-        </p:txBody>
-      </p:sp>
-      <p:sp>
-        <p:nvSpPr>
-          <p:cNvPr id="3" name="Text Placeholder 2">
-            <a:extLst>
-              <a:ext uri="{FF2B5EF4-FFF2-40B4-BE49-F238E27FC236}">
-                <a16:creationId xmlns:a16="http://schemas.microsoft.com/office/drawing/2014/main" id="{C5C790E7-BD9C-351A-03AF-1C00B48E163B}"/>
-              </a:ext>
-            </a:extLst>
-          </p:cNvPr>
-          <p:cNvSpPr>
-            <a:spLocks noGrp="1"/>
-          </p:cNvSpPr>
-          <p:nvPr>
-            <p:ph type="body" sz="quarter" idx="10"/>
-          </p:nvPr>
-        </p:nvSpPr>
-        <p:spPr/>
-        <p:txBody>
-          <a:bodyPr/>
-          <a:lstStyle/>
-          <a:p>
-            <a:endParaRPr lang="en-US"/>
-          </a:p>
-        </p:txBody>
-      </p:sp>
-      <p:sp>
-        <p:nvSpPr>
-          <p:cNvPr id="4" name="Title 3">
-            <a:extLst>
-              <a:ext uri="{FF2B5EF4-FFF2-40B4-BE49-F238E27FC236}">
-                <a16:creationId xmlns:a16="http://schemas.microsoft.com/office/drawing/2014/main" id="{3ED76218-7E6C-A224-FCE7-D6FCCAEBF1D0}"/>
-              </a:ext>
-            </a:extLst>
-          </p:cNvPr>
-          <p:cNvSpPr>
-            <a:spLocks noGrp="1"/>
-          </p:cNvSpPr>
-          <p:nvPr>
-            <p:ph type="title"/>
-          </p:nvPr>
-        </p:nvSpPr>
-        <p:spPr/>
-        <p:txBody>
-          <a:bodyPr/>
-          <a:lstStyle/>
-          <a:p>
-            <a:endParaRPr lang="en-US"/>
-          </a:p>
-        </p:txBody>
-      </p:sp>
-      <p:sp>
-        <p:nvSpPr>
-          <p:cNvPr id="5" name="Rectangle: Rounded Corners 4">
-            <a:extLst>
-              <a:ext uri="{FF2B5EF4-FFF2-40B4-BE49-F238E27FC236}">
-                <a16:creationId xmlns:a16="http://schemas.microsoft.com/office/drawing/2014/main" id="{AFB53695-396D-9060-C189-A0380EDC067A}"/>
-              </a:ext>
-            </a:extLst>
-          </p:cNvPr>
-          <p:cNvSpPr/>
-          <p:nvPr/>
-        </p:nvSpPr>
-        <p:spPr bwMode="auto">
-          <a:xfrm>
-            <a:off x="1690428" y="2889000"/>
-            <a:ext cx="3452030" cy="2337758"/>
-          </a:xfrm>
-          <a:prstGeom prst="roundRect">
-            <a:avLst/>
-          </a:prstGeom>
-          <a:solidFill>
-            <a:schemeClr val="dk2">
-              <a:alpha val="80000"/>
-            </a:schemeClr>
-          </a:solidFill>
-          <a:ln w="19050">
-            <a:solidFill>
-              <a:schemeClr val="tx1">
-                <a:lumMod val="75000"/>
-                <a:alpha val="80000"/>
-              </a:schemeClr>
-            </a:solidFill>
-          </a:ln>
-          <a:effectLst/>
-        </p:spPr>
-        <p:style>
-          <a:lnRef idx="2">
-            <a:schemeClr val="accent1">
-              <a:shade val="50000"/>
-            </a:schemeClr>
-          </a:lnRef>
-          <a:fillRef idx="1001">
-            <a:schemeClr val="dk2"/>
-          </a:fillRef>
-          <a:effectRef idx="0">
-            <a:schemeClr val="accent1"/>
-          </a:effectRef>
-          <a:fontRef idx="minor">
-            <a:schemeClr val="lt1"/>
-          </a:fontRef>
-        </p:style>
-        <p:txBody>
-          <a:bodyPr rot="0" spcFirstLastPara="0" vertOverflow="overflow" horzOverflow="overflow" vert="horz" wrap="square" lIns="91440" tIns="45720" rIns="91440" bIns="45720" numCol="1" spcCol="0" rtlCol="0" fromWordArt="0" anchor="ctr" anchorCtr="0" forceAA="0" compatLnSpc="1">
-            <a:prstTxWarp prst="textNoShape">
-              <a:avLst/>
-            </a:prstTxWarp>
-            <a:noAutofit/>
-          </a:bodyPr>
-          <a:lstStyle/>
-          <a:p>
-            <a:pPr algn="ctr"/>
-            <a:r>
-              <a:rPr lang="en-US" sz="2800" b="1" dirty="0">
-                <a:solidFill>
-                  <a:srgbClr val="FFFF00"/>
-                </a:solidFill>
-                <a:effectLst>
-                  <a:outerShdw blurRad="38100" dist="38100" dir="2700000" algn="tl">
-                    <a:srgbClr val="000000">
-                      <a:alpha val="43137"/>
-                    </a:srgbClr>
-                  </a:outerShdw>
-                </a:effectLst>
-              </a:rPr>
-              <a:t>TODO: </a:t>
-            </a:r>
-            <a:r>
-              <a:rPr lang="bg-BG" sz="2800" b="1" dirty="0">
-                <a:solidFill>
-                  <a:srgbClr val="FFFF00"/>
-                </a:solidFill>
-                <a:effectLst>
-                  <a:outerShdw blurRad="38100" dist="38100" dir="2700000" algn="tl">
-                    <a:srgbClr val="000000">
-                      <a:alpha val="43137"/>
-                    </a:srgbClr>
-                  </a:outerShdw>
-                </a:effectLst>
-              </a:rPr>
-              <a:t>как се изпълнява вече създаден отчет?</a:t>
-            </a:r>
-          </a:p>
-          <a:p>
-            <a:pPr algn="ctr"/>
-            <a:r>
-              <a:rPr lang="en-US" sz="2800" b="1" dirty="0">
-                <a:solidFill>
-                  <a:srgbClr val="FFFF00"/>
-                </a:solidFill>
-                <a:effectLst>
-                  <a:outerShdw blurRad="38100" dist="38100" dir="2700000" algn="tl">
-                    <a:srgbClr val="000000">
-                      <a:alpha val="43137"/>
-                    </a:srgbClr>
-                  </a:outerShdw>
-                </a:effectLst>
-              </a:rPr>
-              <a:t>Screenshot?</a:t>
-            </a:r>
-          </a:p>
-        </p:txBody>
-      </p:sp>
-      <p:sp>
-        <p:nvSpPr>
-          <p:cNvPr id="6" name="Rectangle: Rounded Corners 5">
-            <a:extLst>
-              <a:ext uri="{FF2B5EF4-FFF2-40B4-BE49-F238E27FC236}">
-                <a16:creationId xmlns:a16="http://schemas.microsoft.com/office/drawing/2014/main" id="{6324AC97-5D5B-E82B-DDB0-0087BBFEA3B7}"/>
-              </a:ext>
-            </a:extLst>
-          </p:cNvPr>
-          <p:cNvSpPr/>
-          <p:nvPr/>
-        </p:nvSpPr>
-        <p:spPr bwMode="auto">
-          <a:xfrm>
-            <a:off x="6248400" y="3126000"/>
-            <a:ext cx="4302600" cy="1863758"/>
-          </a:xfrm>
-          <a:prstGeom prst="roundRect">
-            <a:avLst/>
-          </a:prstGeom>
-          <a:solidFill>
-            <a:schemeClr val="dk2">
-              <a:alpha val="80000"/>
-            </a:schemeClr>
-          </a:solidFill>
-          <a:ln w="19050">
-            <a:solidFill>
-              <a:schemeClr val="tx1">
-                <a:lumMod val="75000"/>
-                <a:alpha val="80000"/>
-              </a:schemeClr>
-            </a:solidFill>
-          </a:ln>
-          <a:effectLst/>
-        </p:spPr>
-        <p:style>
-          <a:lnRef idx="2">
-            <a:schemeClr val="accent1">
-              <a:shade val="50000"/>
-            </a:schemeClr>
-          </a:lnRef>
-          <a:fillRef idx="1001">
-            <a:schemeClr val="dk2"/>
-          </a:fillRef>
-          <a:effectRef idx="0">
-            <a:schemeClr val="accent1"/>
-          </a:effectRef>
-          <a:fontRef idx="minor">
-            <a:schemeClr val="lt1"/>
-          </a:fontRef>
-        </p:style>
-        <p:txBody>
-          <a:bodyPr rot="0" spcFirstLastPara="0" vertOverflow="overflow" horzOverflow="overflow" vert="horz" wrap="square" lIns="91440" tIns="45720" rIns="91440" bIns="45720" numCol="1" spcCol="0" rtlCol="0" fromWordArt="0" anchor="ctr" anchorCtr="0" forceAA="0" compatLnSpc="1">
-            <a:prstTxWarp prst="textNoShape">
-              <a:avLst/>
-            </a:prstTxWarp>
-            <a:noAutofit/>
-          </a:bodyPr>
-          <a:lstStyle/>
-          <a:p>
-            <a:pPr algn="ctr"/>
-            <a:r>
-              <a:rPr lang="en-US" sz="2800" b="1" dirty="0">
-                <a:solidFill>
-                  <a:srgbClr val="FFFF00"/>
-                </a:solidFill>
-                <a:effectLst>
-                  <a:outerShdw blurRad="38100" dist="38100" dir="2700000" algn="tl">
-                    <a:srgbClr val="000000">
-                      <a:alpha val="43137"/>
-                    </a:srgbClr>
-                  </a:outerShdw>
-                </a:effectLst>
-              </a:rPr>
-              <a:t>TODO: print</a:t>
-            </a:r>
-            <a:br>
-              <a:rPr lang="en-US" sz="2800" b="1" dirty="0">
-                <a:solidFill>
-                  <a:srgbClr val="FFFF00"/>
-                </a:solidFill>
-                <a:effectLst>
-                  <a:outerShdw blurRad="38100" dist="38100" dir="2700000" algn="tl">
-                    <a:srgbClr val="000000">
-                      <a:alpha val="43137"/>
-                    </a:srgbClr>
-                  </a:outerShdw>
-                </a:effectLst>
-              </a:rPr>
-            </a:br>
-            <a:br>
-              <a:rPr lang="en-US" sz="2800" b="1" dirty="0">
-                <a:solidFill>
-                  <a:srgbClr val="FFFF00"/>
-                </a:solidFill>
-                <a:effectLst>
-                  <a:outerShdw blurRad="38100" dist="38100" dir="2700000" algn="tl">
-                    <a:srgbClr val="000000">
-                      <a:alpha val="43137"/>
-                    </a:srgbClr>
-                  </a:outerShdw>
-                </a:effectLst>
-              </a:rPr>
-            </a:br>
-            <a:r>
-              <a:rPr lang="en-US" sz="2800" b="1" dirty="0">
-                <a:solidFill>
-                  <a:srgbClr val="FFFF00"/>
-                </a:solidFill>
-                <a:effectLst>
-                  <a:outerShdw blurRad="38100" dist="38100" dir="2700000" algn="tl">
-                    <a:srgbClr val="000000">
-                      <a:alpha val="43137"/>
-                    </a:srgbClr>
-                  </a:outerShdw>
-                </a:effectLst>
-              </a:rPr>
-              <a:t>TODO: export to PDF</a:t>
-            </a:r>
-          </a:p>
-        </p:txBody>
-      </p:sp>
-    </p:spTree>
-    <p:extLst>
-      <p:ext uri="{BB962C8B-B14F-4D97-AF65-F5344CB8AC3E}">
-        <p14:creationId xmlns:p14="http://schemas.microsoft.com/office/powerpoint/2010/main" val="3249504270"/>
-      </p:ext>
-    </p:extLst>
-  </p:cSld>
-  <p:clrMapOvr>
-    <a:masterClrMapping/>
-  </p:clrMapOvr>
-  <mc:AlternateContent xmlns:mc="http://schemas.openxmlformats.org/markup-compatibility/2006" xmlns:p14="http://schemas.microsoft.com/office/powerpoint/2010/main">
-    <mc:Choice Requires="p14">
-      <p:transition spd="slow" p14:dur="2000" advClick="0" advTm="5000"/>
-    </mc:Choice>
-    <mc:Fallback xmlns="">
-      <p:transition spd="slow" advClick="0" advTm="5000"/>
-    </mc:Fallback>
-  </mc:AlternateContent>
-</p:sld>
-</file>
-
-<file path=ppt/slides/slide31.xml><?xml version="1.0" encoding="utf-8"?>
-<p:sld xmlns:a="http://schemas.openxmlformats.org/drawingml/2006/main" xmlns:r="http://schemas.openxmlformats.org/officeDocument/2006/relationships" xmlns:p="http://schemas.openxmlformats.org/presentationml/2006/main">
-  <p:cSld>
-    <p:spTree>
-      <p:nvGrpSpPr>
-        <p:cNvPr id="1" name=""/>
-        <p:cNvGrpSpPr/>
-        <p:nvPr/>
-      </p:nvGrpSpPr>
-      <p:grpSpPr>
-        <a:xfrm>
-          <a:off x="0" y="0"/>
-          <a:ext cx="0" cy="0"/>
-          <a:chOff x="0" y="0"/>
-          <a:chExt cx="0" cy="0"/>
-        </a:xfrm>
-      </p:grpSpPr>
-      <p:sp>
-        <p:nvSpPr>
           <p:cNvPr id="3" name="Text Placeholder 2"/>
           <p:cNvSpPr>
             <a:spLocks noGrp="1"/>
@@ -19101,7 +19145,7 @@
             <a:fld id="{2BF067CD-8E6B-4360-9AA8-C5DF2A48A6D1}" type="slidenum">
               <a:rPr lang="en-US" noProof="0" smtClean="0"/>
               <a:pPr/>
-              <a:t>31</a:t>
+              <a:t>30</a:t>
             </a:fld>
             <a:endParaRPr lang="en-US" noProof="0" dirty="0"/>
           </a:p>
@@ -19385,7 +19429,1829 @@
 </p:sld>
 </file>
 
+<file path=ppt/slides/slide31.xml><?xml version="1.0" encoding="utf-8"?>
+<p:sld xmlns:a="http://schemas.openxmlformats.org/drawingml/2006/main" xmlns:r="http://schemas.openxmlformats.org/officeDocument/2006/relationships" xmlns:p="http://schemas.openxmlformats.org/presentationml/2006/main">
+  <p:cSld>
+    <p:spTree>
+      <p:nvGrpSpPr>
+        <p:cNvPr id="1" name=""/>
+        <p:cNvGrpSpPr/>
+        <p:nvPr/>
+      </p:nvGrpSpPr>
+      <p:grpSpPr>
+        <a:xfrm>
+          <a:off x="0" y="0"/>
+          <a:ext cx="0" cy="0"/>
+          <a:chOff x="0" y="0"/>
+          <a:chExt cx="0" cy="0"/>
+        </a:xfrm>
+      </p:grpSpPr>
+      <p:sp>
+        <p:nvSpPr>
+          <p:cNvPr id="2" name="Slide Number Placeholder 1">
+            <a:extLst>
+              <a:ext uri="{FF2B5EF4-FFF2-40B4-BE49-F238E27FC236}">
+                <a16:creationId xmlns:a16="http://schemas.microsoft.com/office/drawing/2014/main" id="{1BBFCC1E-7139-1098-04F6-62D9C18DCF81}"/>
+              </a:ext>
+            </a:extLst>
+          </p:cNvPr>
+          <p:cNvSpPr>
+            <a:spLocks noGrp="1"/>
+          </p:cNvSpPr>
+          <p:nvPr>
+            <p:ph type="sldNum" sz="quarter" idx="5"/>
+          </p:nvPr>
+        </p:nvSpPr>
+        <p:spPr/>
+        <p:txBody>
+          <a:bodyPr/>
+          <a:lstStyle/>
+          <a:p>
+            <a:fld id="{2BF067CD-8E6B-4360-9AA8-C5DF2A48A6D1}" type="slidenum">
+              <a:rPr lang="en-US" noProof="0" smtClean="0"/>
+              <a:pPr/>
+              <a:t>31</a:t>
+            </a:fld>
+            <a:endParaRPr lang="en-US" noProof="0" dirty="0"/>
+          </a:p>
+        </p:txBody>
+      </p:sp>
+      <p:sp>
+        <p:nvSpPr>
+          <p:cNvPr id="3" name="Text Placeholder 2">
+            <a:extLst>
+              <a:ext uri="{FF2B5EF4-FFF2-40B4-BE49-F238E27FC236}">
+                <a16:creationId xmlns:a16="http://schemas.microsoft.com/office/drawing/2014/main" id="{A1B50561-ADCC-E014-6E46-7C0052E24732}"/>
+              </a:ext>
+            </a:extLst>
+          </p:cNvPr>
+          <p:cNvSpPr>
+            <a:spLocks noGrp="1"/>
+          </p:cNvSpPr>
+          <p:nvPr>
+            <p:ph type="body" sz="quarter" idx="10"/>
+          </p:nvPr>
+        </p:nvSpPr>
+        <p:spPr/>
+        <p:txBody>
+          <a:bodyPr/>
+          <a:lstStyle/>
+          <a:p>
+            <a:r>
+              <a:rPr lang="bg-BG" dirty="0"/>
+              <a:t>Запазете отчета, за да може да се </a:t>
+            </a:r>
+            <a:r>
+              <a:rPr lang="bg-BG" b="1" dirty="0">
+                <a:solidFill>
+                  <a:schemeClr val="bg1"/>
+                </a:solidFill>
+              </a:rPr>
+              <a:t>визуализира</a:t>
+            </a:r>
+            <a:r>
+              <a:rPr lang="bg-BG" dirty="0"/>
+              <a:t> в </a:t>
+            </a:r>
+            <a:r>
+              <a:rPr lang="bg-BG" b="1" dirty="0">
+                <a:solidFill>
+                  <a:schemeClr val="bg1"/>
+                </a:solidFill>
+              </a:rPr>
+              <a:t>навигационния панел</a:t>
+            </a:r>
+            <a:r>
+              <a:rPr lang="bg-BG" dirty="0"/>
+              <a:t>:</a:t>
+            </a:r>
+            <a:endParaRPr lang="en-US" b="1" dirty="0">
+              <a:solidFill>
+                <a:schemeClr val="bg1"/>
+              </a:solidFill>
+            </a:endParaRPr>
+          </a:p>
+        </p:txBody>
+      </p:sp>
+      <p:sp>
+        <p:nvSpPr>
+          <p:cNvPr id="4" name="Title 3">
+            <a:extLst>
+              <a:ext uri="{FF2B5EF4-FFF2-40B4-BE49-F238E27FC236}">
+                <a16:creationId xmlns:a16="http://schemas.microsoft.com/office/drawing/2014/main" id="{34E5FC5B-A962-B76A-D4F0-13A84592CC15}"/>
+              </a:ext>
+            </a:extLst>
+          </p:cNvPr>
+          <p:cNvSpPr>
+            <a:spLocks noGrp="1"/>
+          </p:cNvSpPr>
+          <p:nvPr>
+            <p:ph type="title"/>
+          </p:nvPr>
+        </p:nvSpPr>
+        <p:spPr>
+          <a:xfrm>
+            <a:off x="189010" y="125627"/>
+            <a:ext cx="10270594" cy="882654"/>
+          </a:xfrm>
+        </p:spPr>
+        <p:txBody>
+          <a:bodyPr/>
+          <a:lstStyle/>
+          <a:p>
+            <a:r>
+              <a:rPr lang="bg-BG" dirty="0"/>
+              <a:t>Принтиране на отчет (1)</a:t>
+            </a:r>
+            <a:endParaRPr lang="en-US" dirty="0"/>
+          </a:p>
+        </p:txBody>
+      </p:sp>
+      <p:pic>
+        <p:nvPicPr>
+          <p:cNvPr id="8" name="Picture 7">
+            <a:extLst>
+              <a:ext uri="{FF2B5EF4-FFF2-40B4-BE49-F238E27FC236}">
+                <a16:creationId xmlns:a16="http://schemas.microsoft.com/office/drawing/2014/main" id="{1C77D312-1D1C-CD24-75BB-407972643743}"/>
+              </a:ext>
+            </a:extLst>
+          </p:cNvPr>
+          <p:cNvPicPr>
+            <a:picLocks noChangeAspect="1"/>
+          </p:cNvPicPr>
+          <p:nvPr/>
+        </p:nvPicPr>
+        <p:blipFill>
+          <a:blip r:embed="rId3"/>
+          <a:stretch>
+            <a:fillRect/>
+          </a:stretch>
+        </p:blipFill>
+        <p:spPr>
+          <a:xfrm>
+            <a:off x="1485256" y="2349000"/>
+            <a:ext cx="9221487" cy="2333951"/>
+          </a:xfrm>
+          <a:prstGeom prst="rect">
+            <a:avLst/>
+          </a:prstGeom>
+          <a:ln>
+            <a:solidFill>
+              <a:schemeClr val="bg2">
+                <a:lumMod val="75000"/>
+              </a:schemeClr>
+            </a:solidFill>
+          </a:ln>
+        </p:spPr>
+      </p:pic>
+      <p:pic>
+        <p:nvPicPr>
+          <p:cNvPr id="10" name="Picture 9">
+            <a:extLst>
+              <a:ext uri="{FF2B5EF4-FFF2-40B4-BE49-F238E27FC236}">
+                <a16:creationId xmlns:a16="http://schemas.microsoft.com/office/drawing/2014/main" id="{96945755-6B60-C88B-1C90-7433F7ECFA2F}"/>
+              </a:ext>
+            </a:extLst>
+          </p:cNvPr>
+          <p:cNvPicPr>
+            <a:picLocks noChangeAspect="1"/>
+          </p:cNvPicPr>
+          <p:nvPr/>
+        </p:nvPicPr>
+        <p:blipFill>
+          <a:blip r:embed="rId4"/>
+          <a:stretch>
+            <a:fillRect/>
+          </a:stretch>
+        </p:blipFill>
+        <p:spPr>
+          <a:xfrm>
+            <a:off x="2164418" y="5149428"/>
+            <a:ext cx="2784082" cy="1232647"/>
+          </a:xfrm>
+          <a:prstGeom prst="rect">
+            <a:avLst/>
+          </a:prstGeom>
+        </p:spPr>
+      </p:pic>
+      <p:pic>
+        <p:nvPicPr>
+          <p:cNvPr id="14" name="Picture 13">
+            <a:extLst>
+              <a:ext uri="{FF2B5EF4-FFF2-40B4-BE49-F238E27FC236}">
+                <a16:creationId xmlns:a16="http://schemas.microsoft.com/office/drawing/2014/main" id="{C9E1B1FD-3D97-7FD9-91EB-A5A1EACB32BB}"/>
+              </a:ext>
+            </a:extLst>
+          </p:cNvPr>
+          <p:cNvPicPr>
+            <a:picLocks noChangeAspect="1"/>
+          </p:cNvPicPr>
+          <p:nvPr/>
+        </p:nvPicPr>
+        <p:blipFill>
+          <a:blip r:embed="rId5"/>
+          <a:stretch>
+            <a:fillRect/>
+          </a:stretch>
+        </p:blipFill>
+        <p:spPr>
+          <a:xfrm>
+            <a:off x="6680480" y="4824000"/>
+            <a:ext cx="1864198" cy="1908373"/>
+          </a:xfrm>
+          <a:prstGeom prst="rect">
+            <a:avLst/>
+          </a:prstGeom>
+        </p:spPr>
+      </p:pic>
+      <p:sp>
+        <p:nvSpPr>
+          <p:cNvPr id="16" name="Arrow: Right 15">
+            <a:extLst>
+              <a:ext uri="{FF2B5EF4-FFF2-40B4-BE49-F238E27FC236}">
+                <a16:creationId xmlns:a16="http://schemas.microsoft.com/office/drawing/2014/main" id="{0358BFAA-0657-70F2-F3CF-1610EC144A93}"/>
+              </a:ext>
+            </a:extLst>
+          </p:cNvPr>
+          <p:cNvSpPr/>
+          <p:nvPr/>
+        </p:nvSpPr>
+        <p:spPr bwMode="auto">
+          <a:xfrm>
+            <a:off x="5548166" y="5549090"/>
+            <a:ext cx="630000" cy="433322"/>
+          </a:xfrm>
+          <a:prstGeom prst="rightArrow">
+            <a:avLst/>
+          </a:prstGeom>
+          <a:solidFill>
+            <a:schemeClr val="dk2">
+              <a:alpha val="80000"/>
+            </a:schemeClr>
+          </a:solidFill>
+          <a:ln w="19050">
+            <a:solidFill>
+              <a:schemeClr val="tx1">
+                <a:lumMod val="75000"/>
+                <a:alpha val="80000"/>
+              </a:schemeClr>
+            </a:solidFill>
+          </a:ln>
+          <a:effectLst/>
+        </p:spPr>
+        <p:style>
+          <a:lnRef idx="2">
+            <a:schemeClr val="accent1">
+              <a:shade val="50000"/>
+            </a:schemeClr>
+          </a:lnRef>
+          <a:fillRef idx="1001">
+            <a:schemeClr val="dk2"/>
+          </a:fillRef>
+          <a:effectRef idx="0">
+            <a:schemeClr val="accent1"/>
+          </a:effectRef>
+          <a:fontRef idx="minor">
+            <a:schemeClr val="lt1"/>
+          </a:fontRef>
+        </p:style>
+        <p:txBody>
+          <a:bodyPr rot="0" spcFirstLastPara="0" vertOverflow="overflow" horzOverflow="overflow" vert="horz" wrap="square" lIns="91440" tIns="45720" rIns="91440" bIns="45720" numCol="1" spcCol="0" rtlCol="0" fromWordArt="0" anchor="ctr" anchorCtr="0" forceAA="0" compatLnSpc="1">
+            <a:prstTxWarp prst="textNoShape">
+              <a:avLst/>
+            </a:prstTxWarp>
+            <a:noAutofit/>
+          </a:bodyPr>
+          <a:lstStyle/>
+          <a:p>
+            <a:pPr algn="ctr"/>
+            <a:endParaRPr lang="en-US" sz="2800" b="1" dirty="0">
+              <a:solidFill>
+                <a:srgbClr val="FFFFFF"/>
+              </a:solidFill>
+              <a:effectLst>
+                <a:outerShdw blurRad="38100" dist="38100" dir="2700000" algn="tl">
+                  <a:srgbClr val="000000">
+                    <a:alpha val="43137"/>
+                  </a:srgbClr>
+                </a:outerShdw>
+              </a:effectLst>
+            </a:endParaRPr>
+          </a:p>
+        </p:txBody>
+      </p:sp>
+    </p:spTree>
+    <p:extLst>
+      <p:ext uri="{BB962C8B-B14F-4D97-AF65-F5344CB8AC3E}">
+        <p14:creationId xmlns:p14="http://schemas.microsoft.com/office/powerpoint/2010/main" val="4130256999"/>
+      </p:ext>
+    </p:extLst>
+  </p:cSld>
+  <p:clrMapOvr>
+    <a:masterClrMapping/>
+  </p:clrMapOvr>
+  <mc:AlternateContent xmlns:mc="http://schemas.openxmlformats.org/markup-compatibility/2006" xmlns:p14="http://schemas.microsoft.com/office/powerpoint/2010/main">
+    <mc:Choice Requires="p14">
+      <p:transition spd="slow" p14:dur="2000" advClick="0" advTm="5000"/>
+    </mc:Choice>
+    <mc:Fallback xmlns="">
+      <p:transition spd="slow" advClick="0" advTm="5000"/>
+    </mc:Fallback>
+  </mc:AlternateContent>
+  <p:timing>
+    <p:tnLst>
+      <p:par>
+        <p:cTn id="1" dur="indefinite" restart="never" nodeType="tmRoot">
+          <p:childTnLst>
+            <p:seq concurrent="1" nextAc="seek">
+              <p:cTn id="2" dur="indefinite" nodeType="mainSeq">
+                <p:childTnLst>
+                  <p:par>
+                    <p:cTn id="3" fill="hold">
+                      <p:stCondLst>
+                        <p:cond delay="indefinite"/>
+                      </p:stCondLst>
+                      <p:childTnLst>
+                        <p:par>
+                          <p:cTn id="4" fill="hold">
+                            <p:stCondLst>
+                              <p:cond delay="0"/>
+                            </p:stCondLst>
+                            <p:childTnLst>
+                              <p:par>
+                                <p:cTn id="5" presetID="1" presetClass="entr" presetSubtype="0" fill="hold" grpId="0" nodeType="clickEffect">
+                                  <p:stCondLst>
+                                    <p:cond delay="0"/>
+                                  </p:stCondLst>
+                                  <p:childTnLst>
+                                    <p:set>
+                                      <p:cBhvr>
+                                        <p:cTn id="6" dur="1" fill="hold">
+                                          <p:stCondLst>
+                                            <p:cond delay="0"/>
+                                          </p:stCondLst>
+                                        </p:cTn>
+                                        <p:tgtEl>
+                                          <p:spTgt spid="16"/>
+                                        </p:tgtEl>
+                                        <p:attrNameLst>
+                                          <p:attrName>style.visibility</p:attrName>
+                                        </p:attrNameLst>
+                                      </p:cBhvr>
+                                      <p:to>
+                                        <p:strVal val="visible"/>
+                                      </p:to>
+                                    </p:set>
+                                  </p:childTnLst>
+                                </p:cTn>
+                              </p:par>
+                            </p:childTnLst>
+                          </p:cTn>
+                        </p:par>
+                      </p:childTnLst>
+                    </p:cTn>
+                  </p:par>
+                  <p:par>
+                    <p:cTn id="7" fill="hold">
+                      <p:stCondLst>
+                        <p:cond delay="indefinite"/>
+                      </p:stCondLst>
+                      <p:childTnLst>
+                        <p:par>
+                          <p:cTn id="8" fill="hold">
+                            <p:stCondLst>
+                              <p:cond delay="0"/>
+                            </p:stCondLst>
+                            <p:childTnLst>
+                              <p:par>
+                                <p:cTn id="9" presetID="1" presetClass="entr" presetSubtype="0" fill="hold" nodeType="clickEffect">
+                                  <p:stCondLst>
+                                    <p:cond delay="0"/>
+                                  </p:stCondLst>
+                                  <p:childTnLst>
+                                    <p:set>
+                                      <p:cBhvr>
+                                        <p:cTn id="10" dur="1" fill="hold">
+                                          <p:stCondLst>
+                                            <p:cond delay="0"/>
+                                          </p:stCondLst>
+                                        </p:cTn>
+                                        <p:tgtEl>
+                                          <p:spTgt spid="14"/>
+                                        </p:tgtEl>
+                                        <p:attrNameLst>
+                                          <p:attrName>style.visibility</p:attrName>
+                                        </p:attrNameLst>
+                                      </p:cBhvr>
+                                      <p:to>
+                                        <p:strVal val="visible"/>
+                                      </p:to>
+                                    </p:set>
+                                  </p:childTnLst>
+                                </p:cTn>
+                              </p:par>
+                            </p:childTnLst>
+                          </p:cTn>
+                        </p:par>
+                      </p:childTnLst>
+                    </p:cTn>
+                  </p:par>
+                </p:childTnLst>
+              </p:cTn>
+              <p:prevCondLst>
+                <p:cond evt="onPrev" delay="0">
+                  <p:tgtEl>
+                    <p:sldTgt/>
+                  </p:tgtEl>
+                </p:cond>
+              </p:prevCondLst>
+              <p:nextCondLst>
+                <p:cond evt="onNext" delay="0">
+                  <p:tgtEl>
+                    <p:sldTgt/>
+                  </p:tgtEl>
+                </p:cond>
+              </p:nextCondLst>
+            </p:seq>
+          </p:childTnLst>
+        </p:cTn>
+      </p:par>
+    </p:tnLst>
+    <p:bldLst>
+      <p:bldP spid="16" grpId="0" animBg="1"/>
+    </p:bldLst>
+  </p:timing>
+</p:sld>
+</file>
+
 <file path=ppt/slides/slide32.xml><?xml version="1.0" encoding="utf-8"?>
+<p:sld xmlns:a="http://schemas.openxmlformats.org/drawingml/2006/main" xmlns:r="http://schemas.openxmlformats.org/officeDocument/2006/relationships" xmlns:p="http://schemas.openxmlformats.org/presentationml/2006/main">
+  <p:cSld>
+    <p:spTree>
+      <p:nvGrpSpPr>
+        <p:cNvPr id="1" name=""/>
+        <p:cNvGrpSpPr/>
+        <p:nvPr/>
+      </p:nvGrpSpPr>
+      <p:grpSpPr>
+        <a:xfrm>
+          <a:off x="0" y="0"/>
+          <a:ext cx="0" cy="0"/>
+          <a:chOff x="0" y="0"/>
+          <a:chExt cx="0" cy="0"/>
+        </a:xfrm>
+      </p:grpSpPr>
+      <p:sp>
+        <p:nvSpPr>
+          <p:cNvPr id="2" name="Slide Number Placeholder 1">
+            <a:extLst>
+              <a:ext uri="{FF2B5EF4-FFF2-40B4-BE49-F238E27FC236}">
+                <a16:creationId xmlns:a16="http://schemas.microsoft.com/office/drawing/2014/main" id="{FECD067E-5FEF-DB2C-7CEF-12BED8BB6455}"/>
+              </a:ext>
+            </a:extLst>
+          </p:cNvPr>
+          <p:cNvSpPr>
+            <a:spLocks noGrp="1"/>
+          </p:cNvSpPr>
+          <p:nvPr>
+            <p:ph type="sldNum" sz="quarter" idx="5"/>
+          </p:nvPr>
+        </p:nvSpPr>
+        <p:spPr/>
+        <p:txBody>
+          <a:bodyPr/>
+          <a:lstStyle/>
+          <a:p>
+            <a:fld id="{2BF067CD-8E6B-4360-9AA8-C5DF2A48A6D1}" type="slidenum">
+              <a:rPr lang="en-US" noProof="0" smtClean="0"/>
+              <a:pPr/>
+              <a:t>32</a:t>
+            </a:fld>
+            <a:endParaRPr lang="en-US" noProof="0" dirty="0"/>
+          </a:p>
+        </p:txBody>
+      </p:sp>
+      <p:sp>
+        <p:nvSpPr>
+          <p:cNvPr id="3" name="Text Placeholder 2">
+            <a:extLst>
+              <a:ext uri="{FF2B5EF4-FFF2-40B4-BE49-F238E27FC236}">
+                <a16:creationId xmlns:a16="http://schemas.microsoft.com/office/drawing/2014/main" id="{D73EC829-C6BA-0919-EA24-26BFFDE8423B}"/>
+              </a:ext>
+            </a:extLst>
+          </p:cNvPr>
+          <p:cNvSpPr>
+            <a:spLocks noGrp="1"/>
+          </p:cNvSpPr>
+          <p:nvPr>
+            <p:ph type="body" sz="quarter" idx="10"/>
+          </p:nvPr>
+        </p:nvSpPr>
+        <p:spPr>
+          <a:xfrm>
+            <a:off x="190402" y="1196125"/>
+            <a:ext cx="9086701" cy="5528766"/>
+          </a:xfrm>
+        </p:spPr>
+        <p:txBody>
+          <a:bodyPr>
+            <a:normAutofit/>
+          </a:bodyPr>
+          <a:lstStyle/>
+          <a:p>
+            <a:r>
+              <a:rPr lang="bg-BG" sz="3200" dirty="0"/>
+              <a:t>В навигационния панел</a:t>
+            </a:r>
+            <a:r>
+              <a:rPr lang="en-US" sz="3200" dirty="0"/>
+              <a:t>, </a:t>
+            </a:r>
+            <a:r>
+              <a:rPr lang="bg-BG" sz="3200" dirty="0"/>
+              <a:t>с </a:t>
+            </a:r>
+            <a:r>
+              <a:rPr lang="bg-BG" sz="3200" b="1" dirty="0"/>
+              <a:t>десния бутон </a:t>
+            </a:r>
+            <a:r>
+              <a:rPr lang="bg-BG" sz="3200" dirty="0"/>
+              <a:t>натиснете </a:t>
+            </a:r>
+            <a:r>
+              <a:rPr lang="bg-BG" sz="3200" b="1" dirty="0"/>
+              <a:t>отчета</a:t>
+            </a:r>
+            <a:r>
+              <a:rPr lang="bg-BG" sz="3200" dirty="0"/>
+              <a:t> и след това изберете</a:t>
+            </a:r>
+            <a:r>
+              <a:rPr lang="en-US" sz="3200" dirty="0"/>
+              <a:t> [</a:t>
+            </a:r>
+            <a:r>
+              <a:rPr lang="en-US" sz="3200" b="1" dirty="0">
+                <a:latin typeface="Consolas" panose="020B0609020204030204" pitchFamily="49" charset="0"/>
+              </a:rPr>
+              <a:t>Print Preview</a:t>
+            </a:r>
+            <a:r>
+              <a:rPr lang="en-US" sz="3200" dirty="0"/>
+              <a:t>]</a:t>
+            </a:r>
+          </a:p>
+          <a:p>
+            <a:r>
+              <a:rPr lang="ru-RU" sz="3200" dirty="0"/>
+              <a:t>В раздела </a:t>
+            </a:r>
+            <a:r>
+              <a:rPr lang="ru-RU" sz="3200" b="1" dirty="0"/>
+              <a:t>Print Preview</a:t>
+            </a:r>
+            <a:r>
+              <a:rPr lang="ru-RU" sz="3200" dirty="0"/>
+              <a:t>, в групата </a:t>
+            </a:r>
+            <a:r>
+              <a:rPr lang="ru-RU" sz="3200" b="1" dirty="0"/>
+              <a:t>Page Layout</a:t>
+            </a:r>
+            <a:r>
+              <a:rPr lang="ru-RU" sz="3200" dirty="0"/>
+              <a:t>, натиснете </a:t>
+            </a:r>
+            <a:r>
+              <a:rPr lang="en-US" sz="3200" dirty="0"/>
+              <a:t>[</a:t>
+            </a:r>
+            <a:r>
+              <a:rPr lang="ru-RU" sz="3200" b="1" dirty="0">
+                <a:latin typeface="Consolas" panose="020B0609020204030204" pitchFamily="49" charset="0"/>
+              </a:rPr>
+              <a:t>Page Setup</a:t>
+            </a:r>
+            <a:r>
+              <a:rPr lang="en-US" sz="3200" dirty="0"/>
+              <a:t>]</a:t>
+            </a:r>
+            <a:r>
+              <a:rPr lang="ru-RU" sz="3200" b="1" dirty="0"/>
+              <a:t> </a:t>
+            </a:r>
+            <a:r>
+              <a:rPr lang="ru-RU" sz="3200" dirty="0"/>
+              <a:t>и задайте желаните от вас </a:t>
+            </a:r>
+            <a:r>
+              <a:rPr lang="ru-RU" sz="3200" b="1" dirty="0">
+                <a:solidFill>
+                  <a:schemeClr val="bg1"/>
+                </a:solidFill>
+              </a:rPr>
+              <a:t>настройки</a:t>
+            </a:r>
+            <a:endParaRPr lang="en-US" sz="3200" b="1" dirty="0">
+              <a:solidFill>
+                <a:schemeClr val="bg1"/>
+              </a:solidFill>
+            </a:endParaRPr>
+          </a:p>
+          <a:p>
+            <a:endParaRPr lang="en-US" sz="3200" dirty="0"/>
+          </a:p>
+        </p:txBody>
+      </p:sp>
+      <p:sp>
+        <p:nvSpPr>
+          <p:cNvPr id="4" name="Title 3">
+            <a:extLst>
+              <a:ext uri="{FF2B5EF4-FFF2-40B4-BE49-F238E27FC236}">
+                <a16:creationId xmlns:a16="http://schemas.microsoft.com/office/drawing/2014/main" id="{BCE18418-A933-66FE-D0F9-5250BC705612}"/>
+              </a:ext>
+            </a:extLst>
+          </p:cNvPr>
+          <p:cNvSpPr>
+            <a:spLocks noGrp="1"/>
+          </p:cNvSpPr>
+          <p:nvPr>
+            <p:ph type="title"/>
+          </p:nvPr>
+        </p:nvSpPr>
+        <p:spPr/>
+        <p:txBody>
+          <a:bodyPr/>
+          <a:lstStyle/>
+          <a:p>
+            <a:r>
+              <a:rPr lang="bg-BG" dirty="0"/>
+              <a:t>Принтиране на отчет (2)</a:t>
+            </a:r>
+            <a:endParaRPr lang="en-US" dirty="0"/>
+          </a:p>
+        </p:txBody>
+      </p:sp>
+      <p:pic>
+        <p:nvPicPr>
+          <p:cNvPr id="6" name="Picture 5">
+            <a:extLst>
+              <a:ext uri="{FF2B5EF4-FFF2-40B4-BE49-F238E27FC236}">
+                <a16:creationId xmlns:a16="http://schemas.microsoft.com/office/drawing/2014/main" id="{ECBC54D9-9C36-1013-C7AB-7295F1E9790D}"/>
+              </a:ext>
+            </a:extLst>
+          </p:cNvPr>
+          <p:cNvPicPr>
+            <a:picLocks noChangeAspect="1"/>
+          </p:cNvPicPr>
+          <p:nvPr/>
+        </p:nvPicPr>
+        <p:blipFill>
+          <a:blip r:embed="rId3"/>
+          <a:stretch>
+            <a:fillRect/>
+          </a:stretch>
+        </p:blipFill>
+        <p:spPr>
+          <a:xfrm>
+            <a:off x="9478944" y="2124000"/>
+            <a:ext cx="2457793" cy="4182059"/>
+          </a:xfrm>
+          <a:prstGeom prst="rect">
+            <a:avLst/>
+          </a:prstGeom>
+          <a:ln>
+            <a:solidFill>
+              <a:schemeClr val="bg2">
+                <a:lumMod val="75000"/>
+              </a:schemeClr>
+            </a:solidFill>
+          </a:ln>
+        </p:spPr>
+      </p:pic>
+      <p:sp>
+        <p:nvSpPr>
+          <p:cNvPr id="7" name="Rectangle: Rounded Corners 17">
+            <a:extLst>
+              <a:ext uri="{FF2B5EF4-FFF2-40B4-BE49-F238E27FC236}">
+                <a16:creationId xmlns:a16="http://schemas.microsoft.com/office/drawing/2014/main" id="{3FB1D585-2DCA-21C1-A54A-4D1A5516920D}"/>
+              </a:ext>
+            </a:extLst>
+          </p:cNvPr>
+          <p:cNvSpPr/>
+          <p:nvPr/>
+        </p:nvSpPr>
+        <p:spPr>
+          <a:xfrm>
+            <a:off x="10347840" y="5564927"/>
+            <a:ext cx="1485000" cy="315000"/>
+          </a:xfrm>
+          <a:prstGeom prst="roundRect">
+            <a:avLst>
+              <a:gd name="adj" fmla="val 5385"/>
+            </a:avLst>
+          </a:prstGeom>
+          <a:noFill/>
+          <a:ln w="57150">
+            <a:solidFill>
+              <a:schemeClr val="tx1"/>
+            </a:solidFill>
+            <a:prstDash val="solid"/>
+          </a:ln>
+        </p:spPr>
+        <p:style>
+          <a:lnRef idx="2">
+            <a:schemeClr val="accent1">
+              <a:shade val="50000"/>
+            </a:schemeClr>
+          </a:lnRef>
+          <a:fillRef idx="1">
+            <a:schemeClr val="accent1"/>
+          </a:fillRef>
+          <a:effectRef idx="0">
+            <a:schemeClr val="accent1"/>
+          </a:effectRef>
+          <a:fontRef idx="minor">
+            <a:schemeClr val="lt1"/>
+          </a:fontRef>
+        </p:style>
+        <p:txBody>
+          <a:bodyPr rtlCol="0" anchor="t"/>
+          <a:lstStyle/>
+          <a:p>
+            <a:pPr algn="ctr"/>
+            <a:endParaRPr lang="en-US" sz="2799" b="1" dirty="0">
+              <a:solidFill>
+                <a:srgbClr val="FBEEDC"/>
+              </a:solidFill>
+              <a:effectLst>
+                <a:outerShdw blurRad="38100" dist="38100" dir="2700000" algn="tl">
+                  <a:srgbClr val="000000">
+                    <a:alpha val="43137"/>
+                  </a:srgbClr>
+                </a:outerShdw>
+              </a:effectLst>
+              <a:latin typeface="Consolas" panose="020B0609020204030204" pitchFamily="49" charset="0"/>
+            </a:endParaRPr>
+          </a:p>
+        </p:txBody>
+      </p:sp>
+      <p:pic>
+        <p:nvPicPr>
+          <p:cNvPr id="1026" name="Picture 2" descr="Page setup dialog box">
+            <a:extLst>
+              <a:ext uri="{FF2B5EF4-FFF2-40B4-BE49-F238E27FC236}">
+                <a16:creationId xmlns:a16="http://schemas.microsoft.com/office/drawing/2014/main" id="{40364E96-BAB7-2CD8-A430-55CCCA13AB4E}"/>
+              </a:ext>
+            </a:extLst>
+          </p:cNvPr>
+          <p:cNvPicPr>
+            <a:picLocks noChangeAspect="1" noChangeArrowheads="1"/>
+          </p:cNvPicPr>
+          <p:nvPr/>
+        </p:nvPicPr>
+        <p:blipFill>
+          <a:blip r:embed="rId4">
+            <a:extLst>
+              <a:ext uri="{28A0092B-C50C-407E-A947-70E740481C1C}">
+                <a14:useLocalDpi xmlns:a14="http://schemas.microsoft.com/office/drawing/2010/main" val="0"/>
+              </a:ext>
+            </a:extLst>
+          </a:blip>
+          <a:srcRect/>
+          <a:stretch>
+            <a:fillRect/>
+          </a:stretch>
+        </p:blipFill>
+        <p:spPr bwMode="auto">
+          <a:xfrm>
+            <a:off x="3926625" y="3935718"/>
+            <a:ext cx="2799376" cy="2868282"/>
+          </a:xfrm>
+          <a:prstGeom prst="rect">
+            <a:avLst/>
+          </a:prstGeom>
+          <a:noFill/>
+          <a:extLst>
+            <a:ext uri="{909E8E84-426E-40DD-AFC4-6F175D3DCCD1}">
+              <a14:hiddenFill xmlns:a14="http://schemas.microsoft.com/office/drawing/2010/main">
+                <a:solidFill>
+                  <a:srgbClr val="FFFFFF"/>
+                </a:solidFill>
+              </a14:hiddenFill>
+            </a:ext>
+          </a:extLst>
+        </p:spPr>
+      </p:pic>
+    </p:spTree>
+    <p:extLst>
+      <p:ext uri="{BB962C8B-B14F-4D97-AF65-F5344CB8AC3E}">
+        <p14:creationId xmlns:p14="http://schemas.microsoft.com/office/powerpoint/2010/main" val="4236486738"/>
+      </p:ext>
+    </p:extLst>
+  </p:cSld>
+  <p:clrMapOvr>
+    <a:masterClrMapping/>
+  </p:clrMapOvr>
+  <mc:AlternateContent xmlns:mc="http://schemas.openxmlformats.org/markup-compatibility/2006" xmlns:p14="http://schemas.microsoft.com/office/powerpoint/2010/main">
+    <mc:Choice Requires="p14">
+      <p:transition spd="slow" p14:dur="2000" advClick="0" advTm="5000"/>
+    </mc:Choice>
+    <mc:Fallback xmlns="">
+      <p:transition spd="slow" advClick="0" advTm="5000"/>
+    </mc:Fallback>
+  </mc:AlternateContent>
+  <p:timing>
+    <p:tnLst>
+      <p:par>
+        <p:cTn id="1" dur="indefinite" restart="never" nodeType="tmRoot">
+          <p:childTnLst>
+            <p:seq concurrent="1" nextAc="seek">
+              <p:cTn id="2" dur="indefinite" nodeType="mainSeq">
+                <p:childTnLst>
+                  <p:par>
+                    <p:cTn id="3" fill="hold">
+                      <p:stCondLst>
+                        <p:cond delay="indefinite"/>
+                      </p:stCondLst>
+                      <p:childTnLst>
+                        <p:par>
+                          <p:cTn id="4" fill="hold">
+                            <p:stCondLst>
+                              <p:cond delay="0"/>
+                            </p:stCondLst>
+                            <p:childTnLst>
+                              <p:par>
+                                <p:cTn id="5" presetID="1" presetClass="entr" presetSubtype="0" fill="hold" grpId="0" nodeType="clickEffect">
+                                  <p:stCondLst>
+                                    <p:cond delay="0"/>
+                                  </p:stCondLst>
+                                  <p:childTnLst>
+                                    <p:set>
+                                      <p:cBhvr>
+                                        <p:cTn id="6" dur="1" fill="hold">
+                                          <p:stCondLst>
+                                            <p:cond delay="0"/>
+                                          </p:stCondLst>
+                                        </p:cTn>
+                                        <p:tgtEl>
+                                          <p:spTgt spid="7"/>
+                                        </p:tgtEl>
+                                        <p:attrNameLst>
+                                          <p:attrName>style.visibility</p:attrName>
+                                        </p:attrNameLst>
+                                      </p:cBhvr>
+                                      <p:to>
+                                        <p:strVal val="visible"/>
+                                      </p:to>
+                                    </p:set>
+                                  </p:childTnLst>
+                                </p:cTn>
+                              </p:par>
+                            </p:childTnLst>
+                          </p:cTn>
+                        </p:par>
+                      </p:childTnLst>
+                    </p:cTn>
+                  </p:par>
+                  <p:par>
+                    <p:cTn id="7" fill="hold">
+                      <p:stCondLst>
+                        <p:cond delay="indefinite"/>
+                      </p:stCondLst>
+                      <p:childTnLst>
+                        <p:par>
+                          <p:cTn id="8" fill="hold">
+                            <p:stCondLst>
+                              <p:cond delay="0"/>
+                            </p:stCondLst>
+                            <p:childTnLst>
+                              <p:par>
+                                <p:cTn id="9" presetID="1" presetClass="entr" presetSubtype="0" fill="hold" nodeType="clickEffect">
+                                  <p:stCondLst>
+                                    <p:cond delay="0"/>
+                                  </p:stCondLst>
+                                  <p:childTnLst>
+                                    <p:set>
+                                      <p:cBhvr>
+                                        <p:cTn id="10" dur="1" fill="hold">
+                                          <p:stCondLst>
+                                            <p:cond delay="0"/>
+                                          </p:stCondLst>
+                                        </p:cTn>
+                                        <p:tgtEl>
+                                          <p:spTgt spid="3">
+                                            <p:txEl>
+                                              <p:pRg st="1" end="1"/>
+                                            </p:txEl>
+                                          </p:spTgt>
+                                        </p:tgtEl>
+                                        <p:attrNameLst>
+                                          <p:attrName>style.visibility</p:attrName>
+                                        </p:attrNameLst>
+                                      </p:cBhvr>
+                                      <p:to>
+                                        <p:strVal val="visible"/>
+                                      </p:to>
+                                    </p:set>
+                                  </p:childTnLst>
+                                </p:cTn>
+                              </p:par>
+                              <p:par>
+                                <p:cTn id="11" presetID="1" presetClass="entr" presetSubtype="0" fill="hold" nodeType="withEffect">
+                                  <p:stCondLst>
+                                    <p:cond delay="0"/>
+                                  </p:stCondLst>
+                                  <p:childTnLst>
+                                    <p:set>
+                                      <p:cBhvr>
+                                        <p:cTn id="12" dur="1" fill="hold">
+                                          <p:stCondLst>
+                                            <p:cond delay="0"/>
+                                          </p:stCondLst>
+                                        </p:cTn>
+                                        <p:tgtEl>
+                                          <p:spTgt spid="1026"/>
+                                        </p:tgtEl>
+                                        <p:attrNameLst>
+                                          <p:attrName>style.visibility</p:attrName>
+                                        </p:attrNameLst>
+                                      </p:cBhvr>
+                                      <p:to>
+                                        <p:strVal val="visible"/>
+                                      </p:to>
+                                    </p:set>
+                                  </p:childTnLst>
+                                </p:cTn>
+                              </p:par>
+                            </p:childTnLst>
+                          </p:cTn>
+                        </p:par>
+                      </p:childTnLst>
+                    </p:cTn>
+                  </p:par>
+                </p:childTnLst>
+              </p:cTn>
+              <p:prevCondLst>
+                <p:cond evt="onPrev" delay="0">
+                  <p:tgtEl>
+                    <p:sldTgt/>
+                  </p:tgtEl>
+                </p:cond>
+              </p:prevCondLst>
+              <p:nextCondLst>
+                <p:cond evt="onNext" delay="0">
+                  <p:tgtEl>
+                    <p:sldTgt/>
+                  </p:tgtEl>
+                </p:cond>
+              </p:nextCondLst>
+            </p:seq>
+          </p:childTnLst>
+        </p:cTn>
+      </p:par>
+    </p:tnLst>
+    <p:bldLst>
+      <p:bldP spid="7" grpId="0" animBg="1"/>
+    </p:bldLst>
+  </p:timing>
+</p:sld>
+</file>
+
+<file path=ppt/slides/slide33.xml><?xml version="1.0" encoding="utf-8"?>
+<p:sld xmlns:a="http://schemas.openxmlformats.org/drawingml/2006/main" xmlns:r="http://schemas.openxmlformats.org/officeDocument/2006/relationships" xmlns:p="http://schemas.openxmlformats.org/presentationml/2006/main">
+  <p:cSld>
+    <p:spTree>
+      <p:nvGrpSpPr>
+        <p:cNvPr id="1" name=""/>
+        <p:cNvGrpSpPr/>
+        <p:nvPr/>
+      </p:nvGrpSpPr>
+      <p:grpSpPr>
+        <a:xfrm>
+          <a:off x="0" y="0"/>
+          <a:ext cx="0" cy="0"/>
+          <a:chOff x="0" y="0"/>
+          <a:chExt cx="0" cy="0"/>
+        </a:xfrm>
+      </p:grpSpPr>
+      <p:sp>
+        <p:nvSpPr>
+          <p:cNvPr id="2" name="Slide Number Placeholder 1">
+            <a:extLst>
+              <a:ext uri="{FF2B5EF4-FFF2-40B4-BE49-F238E27FC236}">
+                <a16:creationId xmlns:a16="http://schemas.microsoft.com/office/drawing/2014/main" id="{FECD067E-5FEF-DB2C-7CEF-12BED8BB6455}"/>
+              </a:ext>
+            </a:extLst>
+          </p:cNvPr>
+          <p:cNvSpPr>
+            <a:spLocks noGrp="1"/>
+          </p:cNvSpPr>
+          <p:nvPr>
+            <p:ph type="sldNum" sz="quarter" idx="5"/>
+          </p:nvPr>
+        </p:nvSpPr>
+        <p:spPr>
+          <a:xfrm>
+            <a:off x="11753030" y="6507000"/>
+            <a:ext cx="367414" cy="297000"/>
+          </a:xfrm>
+        </p:spPr>
+        <p:txBody>
+          <a:bodyPr/>
+          <a:lstStyle/>
+          <a:p>
+            <a:fld id="{2BF067CD-8E6B-4360-9AA8-C5DF2A48A6D1}" type="slidenum">
+              <a:rPr lang="en-US" noProof="0" smtClean="0"/>
+              <a:pPr/>
+              <a:t>33</a:t>
+            </a:fld>
+            <a:endParaRPr lang="en-US" noProof="0" dirty="0"/>
+          </a:p>
+        </p:txBody>
+      </p:sp>
+      <p:sp>
+        <p:nvSpPr>
+          <p:cNvPr id="3" name="Text Placeholder 2">
+            <a:extLst>
+              <a:ext uri="{FF2B5EF4-FFF2-40B4-BE49-F238E27FC236}">
+                <a16:creationId xmlns:a16="http://schemas.microsoft.com/office/drawing/2014/main" id="{D73EC829-C6BA-0919-EA24-26BFFDE8423B}"/>
+              </a:ext>
+            </a:extLst>
+          </p:cNvPr>
+          <p:cNvSpPr>
+            <a:spLocks noGrp="1"/>
+          </p:cNvSpPr>
+          <p:nvPr>
+            <p:ph type="body" sz="quarter" idx="10"/>
+          </p:nvPr>
+        </p:nvSpPr>
+        <p:spPr>
+          <a:xfrm>
+            <a:off x="190402" y="1196125"/>
+            <a:ext cx="11818096" cy="5528766"/>
+          </a:xfrm>
+        </p:spPr>
+        <p:txBody>
+          <a:bodyPr>
+            <a:normAutofit/>
+          </a:bodyPr>
+          <a:lstStyle/>
+          <a:p>
+            <a:r>
+              <a:rPr lang="bg-BG" dirty="0"/>
+              <a:t>За да принтирате отчета натиснете </a:t>
+            </a:r>
+            <a:r>
+              <a:rPr lang="en-US" dirty="0"/>
+              <a:t>[</a:t>
+            </a:r>
+            <a:r>
+              <a:rPr lang="en-US" b="1" dirty="0">
+                <a:latin typeface="Consolas" panose="020B0609020204030204" pitchFamily="49" charset="0"/>
+              </a:rPr>
+              <a:t>File</a:t>
+            </a:r>
+            <a:r>
+              <a:rPr lang="en-US" dirty="0"/>
+              <a:t>] -&gt; [</a:t>
+            </a:r>
+            <a:r>
+              <a:rPr lang="en-US" b="1" dirty="0">
+                <a:latin typeface="Consolas" panose="020B0609020204030204" pitchFamily="49" charset="0"/>
+              </a:rPr>
+              <a:t>Print</a:t>
+            </a:r>
+            <a:r>
+              <a:rPr lang="en-US" dirty="0"/>
+              <a:t>]</a:t>
+            </a:r>
+          </a:p>
+          <a:p>
+            <a:pPr lvl="1"/>
+            <a:r>
+              <a:rPr lang="bg-BG" dirty="0"/>
+              <a:t>Натискайки </a:t>
+            </a:r>
+            <a:r>
+              <a:rPr lang="en-US" dirty="0"/>
+              <a:t>[</a:t>
+            </a:r>
+            <a:r>
+              <a:rPr lang="en-US" b="1" dirty="0">
+                <a:latin typeface="Consolas" panose="020B0609020204030204" pitchFamily="49" charset="0"/>
+              </a:rPr>
+              <a:t>Print Preview</a:t>
+            </a:r>
+            <a:r>
+              <a:rPr lang="en-US" dirty="0"/>
+              <a:t>], </a:t>
+            </a:r>
+            <a:r>
+              <a:rPr lang="bg-BG" dirty="0"/>
+              <a:t>ще се визуализира начинът, по който ще изглежда </a:t>
+            </a:r>
+            <a:r>
+              <a:rPr lang="bg-BG" b="1" dirty="0">
+                <a:solidFill>
+                  <a:schemeClr val="bg1"/>
+                </a:solidFill>
+              </a:rPr>
+              <a:t>отчетът</a:t>
+            </a:r>
+            <a:r>
+              <a:rPr lang="bg-BG" dirty="0"/>
+              <a:t> при принтиране</a:t>
+            </a:r>
+            <a:endParaRPr lang="en-US" b="1" dirty="0">
+              <a:solidFill>
+                <a:schemeClr val="bg1"/>
+              </a:solidFill>
+            </a:endParaRPr>
+          </a:p>
+        </p:txBody>
+      </p:sp>
+      <p:sp>
+        <p:nvSpPr>
+          <p:cNvPr id="4" name="Title 3">
+            <a:extLst>
+              <a:ext uri="{FF2B5EF4-FFF2-40B4-BE49-F238E27FC236}">
+                <a16:creationId xmlns:a16="http://schemas.microsoft.com/office/drawing/2014/main" id="{BCE18418-A933-66FE-D0F9-5250BC705612}"/>
+              </a:ext>
+            </a:extLst>
+          </p:cNvPr>
+          <p:cNvSpPr>
+            <a:spLocks noGrp="1"/>
+          </p:cNvSpPr>
+          <p:nvPr>
+            <p:ph type="title"/>
+          </p:nvPr>
+        </p:nvSpPr>
+        <p:spPr>
+          <a:xfrm>
+            <a:off x="190406" y="100750"/>
+            <a:ext cx="10270594" cy="882654"/>
+          </a:xfrm>
+        </p:spPr>
+        <p:txBody>
+          <a:bodyPr/>
+          <a:lstStyle/>
+          <a:p>
+            <a:r>
+              <a:rPr lang="bg-BG" dirty="0"/>
+              <a:t>Принтиране на отчет (</a:t>
+            </a:r>
+            <a:r>
+              <a:rPr lang="en-US" dirty="0"/>
+              <a:t>3</a:t>
+            </a:r>
+            <a:r>
+              <a:rPr lang="bg-BG" dirty="0"/>
+              <a:t>)</a:t>
+            </a:r>
+            <a:endParaRPr lang="en-US" dirty="0"/>
+          </a:p>
+        </p:txBody>
+      </p:sp>
+      <p:pic>
+        <p:nvPicPr>
+          <p:cNvPr id="11" name="Picture 10">
+            <a:extLst>
+              <a:ext uri="{FF2B5EF4-FFF2-40B4-BE49-F238E27FC236}">
+                <a16:creationId xmlns:a16="http://schemas.microsoft.com/office/drawing/2014/main" id="{72A96C9A-7466-DA63-DB58-F89E09A64AE4}"/>
+              </a:ext>
+            </a:extLst>
+          </p:cNvPr>
+          <p:cNvPicPr>
+            <a:picLocks noChangeAspect="1"/>
+          </p:cNvPicPr>
+          <p:nvPr/>
+        </p:nvPicPr>
+        <p:blipFill>
+          <a:blip r:embed="rId3"/>
+          <a:stretch>
+            <a:fillRect/>
+          </a:stretch>
+        </p:blipFill>
+        <p:spPr>
+          <a:xfrm>
+            <a:off x="471000" y="3104221"/>
+            <a:ext cx="4905000" cy="3551373"/>
+          </a:xfrm>
+          <a:prstGeom prst="rect">
+            <a:avLst/>
+          </a:prstGeom>
+        </p:spPr>
+      </p:pic>
+      <p:sp>
+        <p:nvSpPr>
+          <p:cNvPr id="12" name="Rectangle: Rounded Corners 17">
+            <a:extLst>
+              <a:ext uri="{FF2B5EF4-FFF2-40B4-BE49-F238E27FC236}">
+                <a16:creationId xmlns:a16="http://schemas.microsoft.com/office/drawing/2014/main" id="{AF90E82F-D386-2D93-3378-0BF2CFBE0353}"/>
+              </a:ext>
+            </a:extLst>
+          </p:cNvPr>
+          <p:cNvSpPr/>
+          <p:nvPr/>
+        </p:nvSpPr>
+        <p:spPr>
+          <a:xfrm>
+            <a:off x="1821000" y="5004000"/>
+            <a:ext cx="2700000" cy="405000"/>
+          </a:xfrm>
+          <a:prstGeom prst="roundRect">
+            <a:avLst>
+              <a:gd name="adj" fmla="val 5385"/>
+            </a:avLst>
+          </a:prstGeom>
+          <a:noFill/>
+          <a:ln w="57150">
+            <a:solidFill>
+              <a:schemeClr val="tx1"/>
+            </a:solidFill>
+            <a:prstDash val="solid"/>
+          </a:ln>
+        </p:spPr>
+        <p:style>
+          <a:lnRef idx="2">
+            <a:schemeClr val="accent1">
+              <a:shade val="50000"/>
+            </a:schemeClr>
+          </a:lnRef>
+          <a:fillRef idx="1">
+            <a:schemeClr val="accent1"/>
+          </a:fillRef>
+          <a:effectRef idx="0">
+            <a:schemeClr val="accent1"/>
+          </a:effectRef>
+          <a:fontRef idx="minor">
+            <a:schemeClr val="lt1"/>
+          </a:fontRef>
+        </p:style>
+        <p:txBody>
+          <a:bodyPr rtlCol="0" anchor="t"/>
+          <a:lstStyle/>
+          <a:p>
+            <a:pPr algn="ctr"/>
+            <a:endParaRPr lang="en-US" sz="2799" b="1" dirty="0">
+              <a:solidFill>
+                <a:srgbClr val="FBEEDC"/>
+              </a:solidFill>
+              <a:effectLst>
+                <a:outerShdw blurRad="38100" dist="38100" dir="2700000" algn="tl">
+                  <a:srgbClr val="000000">
+                    <a:alpha val="43137"/>
+                  </a:srgbClr>
+                </a:outerShdw>
+              </a:effectLst>
+              <a:latin typeface="Consolas" panose="020B0609020204030204" pitchFamily="49" charset="0"/>
+            </a:endParaRPr>
+          </a:p>
+        </p:txBody>
+      </p:sp>
+      <p:sp>
+        <p:nvSpPr>
+          <p:cNvPr id="13" name="Arrow: Right 12">
+            <a:extLst>
+              <a:ext uri="{FF2B5EF4-FFF2-40B4-BE49-F238E27FC236}">
+                <a16:creationId xmlns:a16="http://schemas.microsoft.com/office/drawing/2014/main" id="{C5D0676E-B4F5-B3CE-0A3C-3A7162EAD791}"/>
+              </a:ext>
+            </a:extLst>
+          </p:cNvPr>
+          <p:cNvSpPr/>
+          <p:nvPr/>
+        </p:nvSpPr>
+        <p:spPr bwMode="auto">
+          <a:xfrm>
+            <a:off x="5736000" y="4689000"/>
+            <a:ext cx="540000" cy="450000"/>
+          </a:xfrm>
+          <a:prstGeom prst="rightArrow">
+            <a:avLst/>
+          </a:prstGeom>
+          <a:solidFill>
+            <a:schemeClr val="dk2">
+              <a:alpha val="80000"/>
+            </a:schemeClr>
+          </a:solidFill>
+          <a:ln w="19050">
+            <a:solidFill>
+              <a:schemeClr val="tx1">
+                <a:lumMod val="75000"/>
+                <a:alpha val="80000"/>
+              </a:schemeClr>
+            </a:solidFill>
+          </a:ln>
+          <a:effectLst/>
+        </p:spPr>
+        <p:style>
+          <a:lnRef idx="2">
+            <a:schemeClr val="accent1">
+              <a:shade val="50000"/>
+            </a:schemeClr>
+          </a:lnRef>
+          <a:fillRef idx="1001">
+            <a:schemeClr val="dk2"/>
+          </a:fillRef>
+          <a:effectRef idx="0">
+            <a:schemeClr val="accent1"/>
+          </a:effectRef>
+          <a:fontRef idx="minor">
+            <a:schemeClr val="lt1"/>
+          </a:fontRef>
+        </p:style>
+        <p:txBody>
+          <a:bodyPr rot="0" spcFirstLastPara="0" vertOverflow="overflow" horzOverflow="overflow" vert="horz" wrap="square" lIns="91440" tIns="45720" rIns="91440" bIns="45720" numCol="1" spcCol="0" rtlCol="0" fromWordArt="0" anchor="ctr" anchorCtr="0" forceAA="0" compatLnSpc="1">
+            <a:prstTxWarp prst="textNoShape">
+              <a:avLst/>
+            </a:prstTxWarp>
+            <a:noAutofit/>
+          </a:bodyPr>
+          <a:lstStyle/>
+          <a:p>
+            <a:pPr algn="ctr"/>
+            <a:endParaRPr lang="en-US" sz="2800" b="1" dirty="0">
+              <a:solidFill>
+                <a:srgbClr val="FFFFFF"/>
+              </a:solidFill>
+              <a:effectLst>
+                <a:outerShdw blurRad="38100" dist="38100" dir="2700000" algn="tl">
+                  <a:srgbClr val="000000">
+                    <a:alpha val="43137"/>
+                  </a:srgbClr>
+                </a:outerShdw>
+              </a:effectLst>
+            </a:endParaRPr>
+          </a:p>
+        </p:txBody>
+      </p:sp>
+      <p:pic>
+        <p:nvPicPr>
+          <p:cNvPr id="15" name="Picture 14">
+            <a:extLst>
+              <a:ext uri="{FF2B5EF4-FFF2-40B4-BE49-F238E27FC236}">
+                <a16:creationId xmlns:a16="http://schemas.microsoft.com/office/drawing/2014/main" id="{34F9AA41-6A5E-9843-4BF2-135D739EEF5C}"/>
+              </a:ext>
+            </a:extLst>
+          </p:cNvPr>
+          <p:cNvPicPr>
+            <a:picLocks noChangeAspect="1"/>
+          </p:cNvPicPr>
+          <p:nvPr/>
+        </p:nvPicPr>
+        <p:blipFill>
+          <a:blip r:embed="rId4"/>
+          <a:stretch>
+            <a:fillRect/>
+          </a:stretch>
+        </p:blipFill>
+        <p:spPr>
+          <a:xfrm>
+            <a:off x="6591000" y="3104221"/>
+            <a:ext cx="5193414" cy="3554793"/>
+          </a:xfrm>
+          <a:prstGeom prst="rect">
+            <a:avLst/>
+          </a:prstGeom>
+          <a:ln>
+            <a:solidFill>
+              <a:schemeClr val="bg2">
+                <a:lumMod val="75000"/>
+              </a:schemeClr>
+            </a:solidFill>
+          </a:ln>
+        </p:spPr>
+      </p:pic>
+    </p:spTree>
+    <p:extLst>
+      <p:ext uri="{BB962C8B-B14F-4D97-AF65-F5344CB8AC3E}">
+        <p14:creationId xmlns:p14="http://schemas.microsoft.com/office/powerpoint/2010/main" val="238970424"/>
+      </p:ext>
+    </p:extLst>
+  </p:cSld>
+  <p:clrMapOvr>
+    <a:masterClrMapping/>
+  </p:clrMapOvr>
+  <mc:AlternateContent xmlns:mc="http://schemas.openxmlformats.org/markup-compatibility/2006" xmlns:p14="http://schemas.microsoft.com/office/powerpoint/2010/main">
+    <mc:Choice Requires="p14">
+      <p:transition spd="slow" p14:dur="2000" advClick="0" advTm="5000"/>
+    </mc:Choice>
+    <mc:Fallback xmlns="">
+      <p:transition spd="slow" advClick="0" advTm="5000"/>
+    </mc:Fallback>
+  </mc:AlternateContent>
+  <p:timing>
+    <p:tnLst>
+      <p:par>
+        <p:cTn id="1" dur="indefinite" restart="never" nodeType="tmRoot">
+          <p:childTnLst>
+            <p:seq concurrent="1" nextAc="seek">
+              <p:cTn id="2" dur="indefinite" nodeType="mainSeq">
+                <p:childTnLst>
+                  <p:par>
+                    <p:cTn id="3" fill="hold">
+                      <p:stCondLst>
+                        <p:cond delay="indefinite"/>
+                      </p:stCondLst>
+                      <p:childTnLst>
+                        <p:par>
+                          <p:cTn id="4" fill="hold">
+                            <p:stCondLst>
+                              <p:cond delay="0"/>
+                            </p:stCondLst>
+                            <p:childTnLst>
+                              <p:par>
+                                <p:cTn id="5" presetID="1" presetClass="entr" presetSubtype="0" fill="hold" nodeType="clickEffect">
+                                  <p:stCondLst>
+                                    <p:cond delay="0"/>
+                                  </p:stCondLst>
+                                  <p:childTnLst>
+                                    <p:set>
+                                      <p:cBhvr>
+                                        <p:cTn id="6" dur="1" fill="hold">
+                                          <p:stCondLst>
+                                            <p:cond delay="0"/>
+                                          </p:stCondLst>
+                                        </p:cTn>
+                                        <p:tgtEl>
+                                          <p:spTgt spid="3">
+                                            <p:txEl>
+                                              <p:pRg st="1" end="1"/>
+                                            </p:txEl>
+                                          </p:spTgt>
+                                        </p:tgtEl>
+                                        <p:attrNameLst>
+                                          <p:attrName>style.visibility</p:attrName>
+                                        </p:attrNameLst>
+                                      </p:cBhvr>
+                                      <p:to>
+                                        <p:strVal val="visible"/>
+                                      </p:to>
+                                    </p:set>
+                                  </p:childTnLst>
+                                </p:cTn>
+                              </p:par>
+                              <p:par>
+                                <p:cTn id="7" presetID="1" presetClass="entr" presetSubtype="0" fill="hold" grpId="0" nodeType="withEffect">
+                                  <p:stCondLst>
+                                    <p:cond delay="0"/>
+                                  </p:stCondLst>
+                                  <p:childTnLst>
+                                    <p:set>
+                                      <p:cBhvr>
+                                        <p:cTn id="8" dur="1" fill="hold">
+                                          <p:stCondLst>
+                                            <p:cond delay="0"/>
+                                          </p:stCondLst>
+                                        </p:cTn>
+                                        <p:tgtEl>
+                                          <p:spTgt spid="12"/>
+                                        </p:tgtEl>
+                                        <p:attrNameLst>
+                                          <p:attrName>style.visibility</p:attrName>
+                                        </p:attrNameLst>
+                                      </p:cBhvr>
+                                      <p:to>
+                                        <p:strVal val="visible"/>
+                                      </p:to>
+                                    </p:set>
+                                  </p:childTnLst>
+                                </p:cTn>
+                              </p:par>
+                            </p:childTnLst>
+                          </p:cTn>
+                        </p:par>
+                      </p:childTnLst>
+                    </p:cTn>
+                  </p:par>
+                  <p:par>
+                    <p:cTn id="9" fill="hold">
+                      <p:stCondLst>
+                        <p:cond delay="indefinite"/>
+                      </p:stCondLst>
+                      <p:childTnLst>
+                        <p:par>
+                          <p:cTn id="10" fill="hold">
+                            <p:stCondLst>
+                              <p:cond delay="0"/>
+                            </p:stCondLst>
+                            <p:childTnLst>
+                              <p:par>
+                                <p:cTn id="11" presetID="1" presetClass="entr" presetSubtype="0" fill="hold" grpId="0" nodeType="clickEffect">
+                                  <p:stCondLst>
+                                    <p:cond delay="0"/>
+                                  </p:stCondLst>
+                                  <p:childTnLst>
+                                    <p:set>
+                                      <p:cBhvr>
+                                        <p:cTn id="12" dur="1" fill="hold">
+                                          <p:stCondLst>
+                                            <p:cond delay="0"/>
+                                          </p:stCondLst>
+                                        </p:cTn>
+                                        <p:tgtEl>
+                                          <p:spTgt spid="13"/>
+                                        </p:tgtEl>
+                                        <p:attrNameLst>
+                                          <p:attrName>style.visibility</p:attrName>
+                                        </p:attrNameLst>
+                                      </p:cBhvr>
+                                      <p:to>
+                                        <p:strVal val="visible"/>
+                                      </p:to>
+                                    </p:set>
+                                  </p:childTnLst>
+                                </p:cTn>
+                              </p:par>
+                            </p:childTnLst>
+                          </p:cTn>
+                        </p:par>
+                      </p:childTnLst>
+                    </p:cTn>
+                  </p:par>
+                  <p:par>
+                    <p:cTn id="13" fill="hold">
+                      <p:stCondLst>
+                        <p:cond delay="indefinite"/>
+                      </p:stCondLst>
+                      <p:childTnLst>
+                        <p:par>
+                          <p:cTn id="14" fill="hold">
+                            <p:stCondLst>
+                              <p:cond delay="0"/>
+                            </p:stCondLst>
+                            <p:childTnLst>
+                              <p:par>
+                                <p:cTn id="15" presetID="1" presetClass="entr" presetSubtype="0" fill="hold" nodeType="clickEffect">
+                                  <p:stCondLst>
+                                    <p:cond delay="0"/>
+                                  </p:stCondLst>
+                                  <p:childTnLst>
+                                    <p:set>
+                                      <p:cBhvr>
+                                        <p:cTn id="16" dur="1" fill="hold">
+                                          <p:stCondLst>
+                                            <p:cond delay="0"/>
+                                          </p:stCondLst>
+                                        </p:cTn>
+                                        <p:tgtEl>
+                                          <p:spTgt spid="15"/>
+                                        </p:tgtEl>
+                                        <p:attrNameLst>
+                                          <p:attrName>style.visibility</p:attrName>
+                                        </p:attrNameLst>
+                                      </p:cBhvr>
+                                      <p:to>
+                                        <p:strVal val="visible"/>
+                                      </p:to>
+                                    </p:set>
+                                  </p:childTnLst>
+                                </p:cTn>
+                              </p:par>
+                            </p:childTnLst>
+                          </p:cTn>
+                        </p:par>
+                      </p:childTnLst>
+                    </p:cTn>
+                  </p:par>
+                </p:childTnLst>
+              </p:cTn>
+              <p:prevCondLst>
+                <p:cond evt="onPrev" delay="0">
+                  <p:tgtEl>
+                    <p:sldTgt/>
+                  </p:tgtEl>
+                </p:cond>
+              </p:prevCondLst>
+              <p:nextCondLst>
+                <p:cond evt="onNext" delay="0">
+                  <p:tgtEl>
+                    <p:sldTgt/>
+                  </p:tgtEl>
+                </p:cond>
+              </p:nextCondLst>
+            </p:seq>
+          </p:childTnLst>
+        </p:cTn>
+      </p:par>
+    </p:tnLst>
+    <p:bldLst>
+      <p:bldP spid="12" grpId="0" animBg="1"/>
+      <p:bldP spid="13" grpId="0" animBg="1"/>
+    </p:bldLst>
+  </p:timing>
+</p:sld>
+</file>
+
+<file path=ppt/slides/slide34.xml><?xml version="1.0" encoding="utf-8"?>
+<p:sld xmlns:a="http://schemas.openxmlformats.org/drawingml/2006/main" xmlns:r="http://schemas.openxmlformats.org/officeDocument/2006/relationships" xmlns:p="http://schemas.openxmlformats.org/presentationml/2006/main">
+  <p:cSld>
+    <p:spTree>
+      <p:nvGrpSpPr>
+        <p:cNvPr id="1" name=""/>
+        <p:cNvGrpSpPr/>
+        <p:nvPr/>
+      </p:nvGrpSpPr>
+      <p:grpSpPr>
+        <a:xfrm>
+          <a:off x="0" y="0"/>
+          <a:ext cx="0" cy="0"/>
+          <a:chOff x="0" y="0"/>
+          <a:chExt cx="0" cy="0"/>
+        </a:xfrm>
+      </p:grpSpPr>
+      <p:sp>
+        <p:nvSpPr>
+          <p:cNvPr id="2" name="Slide Number Placeholder 1">
+            <a:extLst>
+              <a:ext uri="{FF2B5EF4-FFF2-40B4-BE49-F238E27FC236}">
+                <a16:creationId xmlns:a16="http://schemas.microsoft.com/office/drawing/2014/main" id="{4F312530-5CE5-A8C8-3FA5-D75EBCA8E8E2}"/>
+              </a:ext>
+            </a:extLst>
+          </p:cNvPr>
+          <p:cNvSpPr>
+            <a:spLocks noGrp="1"/>
+          </p:cNvSpPr>
+          <p:nvPr>
+            <p:ph type="sldNum" sz="quarter" idx="5"/>
+          </p:nvPr>
+        </p:nvSpPr>
+        <p:spPr/>
+        <p:txBody>
+          <a:bodyPr/>
+          <a:lstStyle/>
+          <a:p>
+            <a:fld id="{2BF067CD-8E6B-4360-9AA8-C5DF2A48A6D1}" type="slidenum">
+              <a:rPr lang="en-US" noProof="0" smtClean="0"/>
+              <a:pPr/>
+              <a:t>34</a:t>
+            </a:fld>
+            <a:endParaRPr lang="en-US" noProof="0" dirty="0"/>
+          </a:p>
+        </p:txBody>
+      </p:sp>
+      <p:sp>
+        <p:nvSpPr>
+          <p:cNvPr id="3" name="Text Placeholder 2">
+            <a:extLst>
+              <a:ext uri="{FF2B5EF4-FFF2-40B4-BE49-F238E27FC236}">
+                <a16:creationId xmlns:a16="http://schemas.microsoft.com/office/drawing/2014/main" id="{07B317BD-BDB0-1546-14AC-3C7FA0A5769C}"/>
+              </a:ext>
+            </a:extLst>
+          </p:cNvPr>
+          <p:cNvSpPr>
+            <a:spLocks noGrp="1"/>
+          </p:cNvSpPr>
+          <p:nvPr>
+            <p:ph type="body" sz="quarter" idx="10"/>
+          </p:nvPr>
+        </p:nvSpPr>
+        <p:spPr/>
+        <p:txBody>
+          <a:bodyPr/>
+          <a:lstStyle/>
+          <a:p>
+            <a:r>
+              <a:rPr lang="bg-BG" dirty="0"/>
+              <a:t>Изберете </a:t>
+            </a:r>
+            <a:r>
+              <a:rPr lang="en-US" dirty="0"/>
+              <a:t>[</a:t>
+            </a:r>
+            <a:r>
+              <a:rPr lang="en-US" b="1" dirty="0">
+                <a:latin typeface="Consolas" panose="020B0609020204030204" pitchFamily="49" charset="0"/>
+              </a:rPr>
+              <a:t>Quick Print</a:t>
+            </a:r>
+            <a:r>
+              <a:rPr lang="en-US" dirty="0"/>
+              <a:t>] </a:t>
+            </a:r>
+            <a:r>
+              <a:rPr lang="bg-BG" dirty="0"/>
+              <a:t>и следвайте </a:t>
+            </a:r>
+            <a:r>
+              <a:rPr lang="bg-BG" b="1" dirty="0"/>
+              <a:t>стъпките</a:t>
+            </a:r>
+            <a:r>
+              <a:rPr lang="bg-BG" dirty="0"/>
+              <a:t>, за да отпечатате </a:t>
+            </a:r>
+            <a:r>
+              <a:rPr lang="bg-BG" b="1" dirty="0"/>
+              <a:t>отчета</a:t>
+            </a:r>
+            <a:r>
+              <a:rPr lang="bg-BG" dirty="0"/>
+              <a:t> чрез </a:t>
+            </a:r>
+            <a:r>
+              <a:rPr lang="bg-BG" b="1" dirty="0"/>
+              <a:t>вашия принтер</a:t>
+            </a:r>
+            <a:r>
+              <a:rPr lang="bg-BG" dirty="0"/>
+              <a:t>:</a:t>
+            </a:r>
+            <a:endParaRPr lang="en-US" dirty="0"/>
+          </a:p>
+        </p:txBody>
+      </p:sp>
+      <p:sp>
+        <p:nvSpPr>
+          <p:cNvPr id="4" name="Title 3">
+            <a:extLst>
+              <a:ext uri="{FF2B5EF4-FFF2-40B4-BE49-F238E27FC236}">
+                <a16:creationId xmlns:a16="http://schemas.microsoft.com/office/drawing/2014/main" id="{8DC8E320-BCCE-43D9-0BBF-C88E26251E51}"/>
+              </a:ext>
+            </a:extLst>
+          </p:cNvPr>
+          <p:cNvSpPr>
+            <a:spLocks noGrp="1"/>
+          </p:cNvSpPr>
+          <p:nvPr>
+            <p:ph type="title"/>
+          </p:nvPr>
+        </p:nvSpPr>
+        <p:spPr/>
+        <p:txBody>
+          <a:bodyPr/>
+          <a:lstStyle/>
+          <a:p>
+            <a:r>
+              <a:rPr lang="bg-BG" dirty="0"/>
+              <a:t>Принтиране на отчет (</a:t>
+            </a:r>
+            <a:r>
+              <a:rPr lang="en-US" dirty="0"/>
+              <a:t>4</a:t>
+            </a:r>
+            <a:r>
+              <a:rPr lang="bg-BG" dirty="0"/>
+              <a:t>)</a:t>
+            </a:r>
+            <a:endParaRPr lang="en-US" dirty="0"/>
+          </a:p>
+        </p:txBody>
+      </p:sp>
+      <p:pic>
+        <p:nvPicPr>
+          <p:cNvPr id="6" name="Picture 5">
+            <a:extLst>
+              <a:ext uri="{FF2B5EF4-FFF2-40B4-BE49-F238E27FC236}">
+                <a16:creationId xmlns:a16="http://schemas.microsoft.com/office/drawing/2014/main" id="{A8AE423B-507D-3629-4001-4039CB0575F1}"/>
+              </a:ext>
+            </a:extLst>
+          </p:cNvPr>
+          <p:cNvPicPr>
+            <a:picLocks noChangeAspect="1"/>
+          </p:cNvPicPr>
+          <p:nvPr/>
+        </p:nvPicPr>
+        <p:blipFill>
+          <a:blip r:embed="rId2"/>
+          <a:stretch>
+            <a:fillRect/>
+          </a:stretch>
+        </p:blipFill>
+        <p:spPr>
+          <a:xfrm>
+            <a:off x="3604315" y="3069000"/>
+            <a:ext cx="4983370" cy="2880000"/>
+          </a:xfrm>
+          <a:prstGeom prst="rect">
+            <a:avLst/>
+          </a:prstGeom>
+        </p:spPr>
+      </p:pic>
+    </p:spTree>
+    <p:extLst>
+      <p:ext uri="{BB962C8B-B14F-4D97-AF65-F5344CB8AC3E}">
+        <p14:creationId xmlns:p14="http://schemas.microsoft.com/office/powerpoint/2010/main" val="3956137415"/>
+      </p:ext>
+    </p:extLst>
+  </p:cSld>
+  <p:clrMapOvr>
+    <a:masterClrMapping/>
+  </p:clrMapOvr>
+  <mc:AlternateContent xmlns:mc="http://schemas.openxmlformats.org/markup-compatibility/2006" xmlns:p14="http://schemas.microsoft.com/office/powerpoint/2010/main">
+    <mc:Choice Requires="p14">
+      <p:transition spd="slow" p14:dur="2000" advClick="0" advTm="5000"/>
+    </mc:Choice>
+    <mc:Fallback xmlns="">
+      <p:transition spd="slow" advClick="0" advTm="5000"/>
+    </mc:Fallback>
+  </mc:AlternateContent>
+</p:sld>
+</file>
+
+<file path=ppt/slides/slide35.xml><?xml version="1.0" encoding="utf-8"?>
 <p:sld xmlns:a="http://schemas.openxmlformats.org/drawingml/2006/main" xmlns:r="http://schemas.openxmlformats.org/officeDocument/2006/relationships" xmlns:p="http://schemas.openxmlformats.org/presentationml/2006/main">
   <p:cSld>
     <p:spTree>
@@ -20253,7 +22119,7 @@
             <a:fld id="{2BF067CD-8E6B-4360-9AA8-C5DF2A48A6D1}" type="slidenum">
               <a:rPr lang="en-US" noProof="0" smtClean="0"/>
               <a:pPr/>
-              <a:t>32</a:t>
+              <a:t>35</a:t>
             </a:fld>
             <a:endParaRPr lang="en-US" noProof="0" dirty="0"/>
           </a:p>
@@ -20586,7 +22452,7 @@
 </p:sld>
 </file>
 
-<file path=ppt/slides/slide33.xml><?xml version="1.0" encoding="utf-8"?>
+<file path=ppt/slides/slide36.xml><?xml version="1.0" encoding="utf-8"?>
 <p:sld xmlns:a="http://schemas.openxmlformats.org/drawingml/2006/main" xmlns:r="http://schemas.openxmlformats.org/officeDocument/2006/relationships" xmlns:p="http://schemas.openxmlformats.org/presentationml/2006/main">
   <p:cSld>
     <p:spTree>
@@ -20776,7 +22642,7 @@
 </p:sld>
 </file>
 
-<file path=ppt/slides/slide34.xml><?xml version="1.0" encoding="utf-8"?>
+<file path=ppt/slides/slide37.xml><?xml version="1.0" encoding="utf-8"?>
 <p:sld xmlns:a="http://schemas.openxmlformats.org/drawingml/2006/main" xmlns:r="http://schemas.openxmlformats.org/officeDocument/2006/relationships" xmlns:p="http://schemas.openxmlformats.org/presentationml/2006/main">
   <p:cSld>
     <p:spTree>
@@ -21132,7 +22998,7 @@
             <a:fld id="{2BF067CD-8E6B-4360-9AA8-C5DF2A48A6D1}" type="slidenum">
               <a:rPr lang="en-US" noProof="0" smtClean="0"/>
               <a:pPr/>
-              <a:t>34</a:t>
+              <a:t>37</a:t>
             </a:fld>
             <a:endParaRPr lang="en-US" noProof="0" dirty="0"/>
           </a:p>
@@ -21613,7 +23479,7 @@
         </p:blipFill>
         <p:spPr>
           <a:xfrm>
-            <a:off x="876000" y="1494000"/>
+            <a:off x="1481290" y="1511089"/>
             <a:ext cx="9229420" cy="4842911"/>
           </a:xfrm>
           <a:prstGeom prst="rect">

</xml_diff>